<commit_message>
create gen corrected and email confimation ui
</commit_message>
<xml_diff>
--- a/cmpe275-Ppt.pptx
+++ b/cmpe275-Ppt.pptx
@@ -2,18 +2,16 @@
 <file path=ppt/presentation.xml><?xml version="1.0" encoding="utf-8"?>
 <p:presentation xmlns:a="http://schemas.openxmlformats.org/drawingml/2006/main" xmlns:r="http://schemas.openxmlformats.org/officeDocument/2006/relationships" xmlns:p="http://schemas.openxmlformats.org/presentationml/2006/main" saveSubsetFonts="1" autoCompressPictures="0">
   <p:sldMasterIdLst>
-    <p:sldMasterId id="2147483648" r:id="rId1"/>
+    <p:sldMasterId id="2147484281" r:id="rId1"/>
   </p:sldMasterIdLst>
   <p:sldIdLst>
     <p:sldId id="257" r:id="rId2"/>
     <p:sldId id="258" r:id="rId3"/>
     <p:sldId id="259" r:id="rId4"/>
     <p:sldId id="260" r:id="rId5"/>
-    <p:sldId id="262" r:id="rId6"/>
-    <p:sldId id="263" r:id="rId7"/>
-    <p:sldId id="264" r:id="rId8"/>
-    <p:sldId id="265" r:id="rId9"/>
-    <p:sldId id="261" r:id="rId10"/>
+    <p:sldId id="263" r:id="rId6"/>
+    <p:sldId id="264" r:id="rId7"/>
+    <p:sldId id="267" r:id="rId8"/>
   </p:sldIdLst>
   <p:sldSz cx="12192000" cy="6858000"/>
   <p:notesSz cx="6858000" cy="9144000"/>
@@ -112,12 +110,25 @@
       </a:defRPr>
     </a:lvl9pPr>
   </p:defaultTextStyle>
+  <p:extLst>
+    <p:ext uri="{EFAFB233-063F-42B5-8137-9DF3F51BA10A}">
+      <p15:sldGuideLst xmlns:p15="http://schemas.microsoft.com/office/powerpoint/2012/main"/>
+    </p:ext>
+  </p:extLst>
 </p:presentation>
 </file>
 
 <file path=ppt/slideLayouts/slideLayout1.xml><?xml version="1.0" encoding="utf-8"?>
-<p:sldLayout xmlns:a="http://schemas.openxmlformats.org/drawingml/2006/main" xmlns:r="http://schemas.openxmlformats.org/officeDocument/2006/relationships" xmlns:p="http://schemas.openxmlformats.org/presentationml/2006/main" type="title" preserve="1">
+<p:sldLayout xmlns:a="http://schemas.openxmlformats.org/drawingml/2006/main" xmlns:r="http://schemas.openxmlformats.org/officeDocument/2006/relationships" xmlns:p="http://schemas.openxmlformats.org/presentationml/2006/main" showMasterSp="0" type="title" preserve="1">
   <p:cSld name="Title Slide">
+    <p:bg>
+      <p:bgPr>
+        <a:solidFill>
+          <a:schemeClr val="bg2"/>
+        </a:solidFill>
+        <a:effectLst/>
+      </p:bgPr>
+    </p:bg>
     <p:spTree>
       <p:nvGrpSpPr>
         <p:cNvPr id="1" name=""/>
@@ -134,13 +145,7 @@
       </p:grpSpPr>
       <p:sp>
         <p:nvSpPr>
-          <p:cNvPr id="2" name="Title 1">
-            <a:extLst>
-              <a:ext uri="{FF2B5EF4-FFF2-40B4-BE49-F238E27FC236}">
-                <a16:creationId xmlns:a16="http://schemas.microsoft.com/office/drawing/2014/main" id="{ED9E81E2-3A43-1043-ABAF-5E4A57D06171}"/>
-              </a:ext>
-            </a:extLst>
-          </p:cNvPr>
+          <p:cNvPr id="2" name="Title 1"/>
           <p:cNvSpPr>
             <a:spLocks noGrp="1"/>
           </p:cNvSpPr>
@@ -150,15 +155,21 @@
         </p:nvSpPr>
         <p:spPr>
           <a:xfrm>
-            <a:off x="1524000" y="1122363"/>
-            <a:ext cx="9144000" cy="2387600"/>
-          </a:xfrm>
-        </p:spPr>
-        <p:txBody>
-          <a:bodyPr anchor="b"/>
+            <a:off x="1915128" y="1788454"/>
+            <a:ext cx="8361229" cy="2098226"/>
+          </a:xfrm>
+        </p:spPr>
+        <p:txBody>
+          <a:bodyPr anchor="b">
+            <a:noAutofit/>
+          </a:bodyPr>
           <a:lstStyle>
             <a:lvl1pPr algn="ctr">
-              <a:defRPr sz="6000"/>
+              <a:defRPr sz="7200" cap="all" baseline="0">
+                <a:solidFill>
+                  <a:schemeClr val="tx2"/>
+                </a:solidFill>
+              </a:defRPr>
             </a:lvl1pPr>
           </a:lstStyle>
           <a:p>
@@ -166,18 +177,13 @@
               <a:rPr lang="en-US"/>
               <a:t>Click to edit Master title style</a:t>
             </a:r>
-          </a:p>
-        </p:txBody>
-      </p:sp>
-      <p:sp>
-        <p:nvSpPr>
-          <p:cNvPr id="3" name="Subtitle 2">
-            <a:extLst>
-              <a:ext uri="{FF2B5EF4-FFF2-40B4-BE49-F238E27FC236}">
-                <a16:creationId xmlns:a16="http://schemas.microsoft.com/office/drawing/2014/main" id="{8F017136-AE4D-814B-A057-8B4578212A10}"/>
-              </a:ext>
-            </a:extLst>
-          </p:cNvPr>
+            <a:endParaRPr lang="en-US" dirty="0"/>
+          </a:p>
+        </p:txBody>
+      </p:sp>
+      <p:sp>
+        <p:nvSpPr>
+          <p:cNvPr id="3" name="Subtitle 2"/>
           <p:cNvSpPr>
             <a:spLocks noGrp="1"/>
           </p:cNvSpPr>
@@ -187,16 +193,27 @@
         </p:nvSpPr>
         <p:spPr>
           <a:xfrm>
-            <a:off x="1524000" y="3602038"/>
-            <a:ext cx="9144000" cy="1655762"/>
-          </a:xfrm>
-        </p:spPr>
-        <p:txBody>
-          <a:bodyPr/>
+            <a:off x="2679906" y="3956279"/>
+            <a:ext cx="6831673" cy="1086237"/>
+          </a:xfrm>
+        </p:spPr>
+        <p:txBody>
+          <a:bodyPr>
+            <a:normAutofit/>
+          </a:bodyPr>
           <a:lstStyle>
             <a:lvl1pPr marL="0" indent="0" algn="ctr">
-              <a:buNone/>
-              <a:defRPr sz="2400"/>
+              <a:lnSpc>
+                <a:spcPct val="112000"/>
+              </a:lnSpc>
+              <a:spcBef>
+                <a:spcPts val="0"/>
+              </a:spcBef>
+              <a:spcAft>
+                <a:spcPts val="0"/>
+              </a:spcAft>
+              <a:buNone/>
+              <a:defRPr sz="2300"/>
             </a:lvl1pPr>
             <a:lvl2pPr marL="457200" indent="0" algn="ctr">
               <a:buNone/>
@@ -236,18 +253,13 @@
               <a:rPr lang="en-US"/>
               <a:t>Click to edit Master subtitle style</a:t>
             </a:r>
-          </a:p>
-        </p:txBody>
-      </p:sp>
-      <p:sp>
-        <p:nvSpPr>
-          <p:cNvPr id="4" name="Date Placeholder 3">
-            <a:extLst>
-              <a:ext uri="{FF2B5EF4-FFF2-40B4-BE49-F238E27FC236}">
-                <a16:creationId xmlns:a16="http://schemas.microsoft.com/office/drawing/2014/main" id="{7E3AF5F0-D5FB-0A48-B2CE-E293B9F31558}"/>
-              </a:ext>
-            </a:extLst>
-          </p:cNvPr>
+            <a:endParaRPr lang="en-US" dirty="0"/>
+          </a:p>
+        </p:txBody>
+      </p:sp>
+      <p:sp>
+        <p:nvSpPr>
+          <p:cNvPr id="4" name="Date Placeholder 3"/>
           <p:cNvSpPr>
             <a:spLocks noGrp="1"/>
           </p:cNvSpPr>
@@ -255,14 +267,27 @@
             <p:ph type="dt" sz="half" idx="10"/>
           </p:nvPr>
         </p:nvSpPr>
-        <p:spPr/>
+        <p:spPr>
+          <a:xfrm>
+            <a:off x="752858" y="6453386"/>
+            <a:ext cx="1607944" cy="404614"/>
+          </a:xfrm>
+        </p:spPr>
         <p:txBody>
           <a:bodyPr/>
-          <a:lstStyle/>
+          <a:lstStyle>
+            <a:lvl1pPr>
+              <a:defRPr baseline="0">
+                <a:solidFill>
+                  <a:schemeClr val="tx2"/>
+                </a:solidFill>
+              </a:defRPr>
+            </a:lvl1pPr>
+          </a:lstStyle>
           <a:p>
             <a:fld id="{D858EF06-04DE-9048-AB9F-32A682F238EA}" type="datetimeFigureOut">
               <a:rPr lang="en-US" smtClean="0"/>
-              <a:t>5/7/18</a:t>
+              <a:t>5/8/18</a:t>
             </a:fld>
             <a:endParaRPr lang="en-US"/>
           </a:p>
@@ -270,13 +295,7 @@
       </p:sp>
       <p:sp>
         <p:nvSpPr>
-          <p:cNvPr id="5" name="Footer Placeholder 4">
-            <a:extLst>
-              <a:ext uri="{FF2B5EF4-FFF2-40B4-BE49-F238E27FC236}">
-                <a16:creationId xmlns:a16="http://schemas.microsoft.com/office/drawing/2014/main" id="{056BB80D-247A-2142-B0C0-87CF6D13427B}"/>
-              </a:ext>
-            </a:extLst>
-          </p:cNvPr>
+          <p:cNvPr id="5" name="Footer Placeholder 4"/>
           <p:cNvSpPr>
             <a:spLocks noGrp="1"/>
           </p:cNvSpPr>
@@ -284,10 +303,23 @@
             <p:ph type="ftr" sz="quarter" idx="11"/>
           </p:nvPr>
         </p:nvSpPr>
-        <p:spPr/>
+        <p:spPr>
+          <a:xfrm>
+            <a:off x="2584054" y="6453386"/>
+            <a:ext cx="7023377" cy="404614"/>
+          </a:xfrm>
+        </p:spPr>
         <p:txBody>
           <a:bodyPr/>
-          <a:lstStyle/>
+          <a:lstStyle>
+            <a:lvl1pPr algn="ctr">
+              <a:defRPr baseline="0">
+                <a:solidFill>
+                  <a:schemeClr val="tx2"/>
+                </a:solidFill>
+              </a:defRPr>
+            </a:lvl1pPr>
+          </a:lstStyle>
           <a:p>
             <a:endParaRPr lang="en-US"/>
           </a:p>
@@ -295,13 +327,7 @@
       </p:sp>
       <p:sp>
         <p:nvSpPr>
-          <p:cNvPr id="6" name="Slide Number Placeholder 5">
-            <a:extLst>
-              <a:ext uri="{FF2B5EF4-FFF2-40B4-BE49-F238E27FC236}">
-                <a16:creationId xmlns:a16="http://schemas.microsoft.com/office/drawing/2014/main" id="{8B0C47FE-7B22-744F-862B-D258EFEBB335}"/>
-              </a:ext>
-            </a:extLst>
-          </p:cNvPr>
+          <p:cNvPr id="6" name="Slide Number Placeholder 5"/>
           <p:cNvSpPr>
             <a:spLocks noGrp="1"/>
           </p:cNvSpPr>
@@ -309,10 +335,23 @@
             <p:ph type="sldNum" sz="quarter" idx="12"/>
           </p:nvPr>
         </p:nvSpPr>
-        <p:spPr/>
+        <p:spPr>
+          <a:xfrm>
+            <a:off x="9830683" y="6453386"/>
+            <a:ext cx="1596292" cy="404614"/>
+          </a:xfrm>
+        </p:spPr>
         <p:txBody>
           <a:bodyPr/>
-          <a:lstStyle/>
+          <a:lstStyle>
+            <a:lvl1pPr>
+              <a:defRPr baseline="0">
+                <a:solidFill>
+                  <a:schemeClr val="tx2"/>
+                </a:solidFill>
+              </a:defRPr>
+            </a:lvl1pPr>
+          </a:lstStyle>
           <a:p>
             <a:fld id="{61CA0BAA-152F-944B-B9D5-BB63EA66D2DB}" type="slidenum">
               <a:rPr lang="en-US" smtClean="0"/>
@@ -322,15 +361,144 @@
           </a:p>
         </p:txBody>
       </p:sp>
+      <p:grpSp>
+        <p:nvGrpSpPr>
+          <p:cNvPr id="7" name="Group 6"/>
+          <p:cNvGrpSpPr/>
+          <p:nvPr/>
+        </p:nvGrpSpPr>
+        <p:grpSpPr>
+          <a:xfrm>
+            <a:off x="752858" y="744469"/>
+            <a:ext cx="10674117" cy="5349671"/>
+            <a:chOff x="752858" y="744469"/>
+            <a:chExt cx="10674117" cy="5349671"/>
+          </a:xfrm>
+        </p:grpSpPr>
+        <p:sp>
+          <p:nvSpPr>
+            <p:cNvPr id="11" name="Freeform 6"/>
+            <p:cNvSpPr/>
+            <p:nvPr/>
+          </p:nvSpPr>
+          <p:spPr bwMode="auto">
+            <a:xfrm>
+              <a:off x="8151962" y="1685652"/>
+              <a:ext cx="3275013" cy="4408488"/>
+            </a:xfrm>
+            <a:custGeom>
+              <a:avLst/>
+              <a:gdLst/>
+              <a:ahLst/>
+              <a:cxnLst/>
+              <a:rect l="l" t="t" r="r" b="b"/>
+              <a:pathLst>
+                <a:path w="10000" h="10000">
+                  <a:moveTo>
+                    <a:pt x="8761" y="0"/>
+                  </a:moveTo>
+                  <a:lnTo>
+                    <a:pt x="10000" y="0"/>
+                  </a:lnTo>
+                  <a:lnTo>
+                    <a:pt x="10000" y="10000"/>
+                  </a:lnTo>
+                  <a:lnTo>
+                    <a:pt x="0" y="10000"/>
+                  </a:lnTo>
+                  <a:lnTo>
+                    <a:pt x="0" y="9126"/>
+                  </a:lnTo>
+                  <a:lnTo>
+                    <a:pt x="8761" y="9127"/>
+                  </a:lnTo>
+                  <a:lnTo>
+                    <a:pt x="8761" y="0"/>
+                  </a:lnTo>
+                  <a:close/>
+                </a:path>
+              </a:pathLst>
+            </a:custGeom>
+            <a:solidFill>
+              <a:schemeClr val="tx2"/>
+            </a:solidFill>
+            <a:ln w="0">
+              <a:noFill/>
+              <a:prstDash val="solid"/>
+              <a:round/>
+              <a:headEnd/>
+              <a:tailEnd/>
+            </a:ln>
+          </p:spPr>
+        </p:sp>
+        <p:sp>
+          <p:nvSpPr>
+            <p:cNvPr id="14" name="Freeform 6"/>
+            <p:cNvSpPr/>
+            <p:nvPr/>
+          </p:nvSpPr>
+          <p:spPr bwMode="auto">
+            <a:xfrm flipH="1" flipV="1">
+              <a:off x="752858" y="744469"/>
+              <a:ext cx="3275668" cy="4408488"/>
+            </a:xfrm>
+            <a:custGeom>
+              <a:avLst/>
+              <a:gdLst/>
+              <a:ahLst/>
+              <a:cxnLst/>
+              <a:rect l="l" t="t" r="r" b="b"/>
+              <a:pathLst>
+                <a:path w="10002" h="10000">
+                  <a:moveTo>
+                    <a:pt x="8763" y="0"/>
+                  </a:moveTo>
+                  <a:lnTo>
+                    <a:pt x="10002" y="0"/>
+                  </a:lnTo>
+                  <a:lnTo>
+                    <a:pt x="10002" y="10000"/>
+                  </a:lnTo>
+                  <a:lnTo>
+                    <a:pt x="2" y="10000"/>
+                  </a:lnTo>
+                  <a:cubicBezTo>
+                    <a:pt x="-2" y="9698"/>
+                    <a:pt x="4" y="9427"/>
+                    <a:pt x="0" y="9125"/>
+                  </a:cubicBezTo>
+                  <a:lnTo>
+                    <a:pt x="8763" y="9128"/>
+                  </a:lnTo>
+                  <a:lnTo>
+                    <a:pt x="8763" y="0"/>
+                  </a:lnTo>
+                  <a:close/>
+                </a:path>
+              </a:pathLst>
+            </a:custGeom>
+            <a:solidFill>
+              <a:schemeClr val="tx2"/>
+            </a:solidFill>
+            <a:ln w="0">
+              <a:noFill/>
+              <a:prstDash val="solid"/>
+              <a:round/>
+              <a:headEnd/>
+              <a:tailEnd/>
+            </a:ln>
+          </p:spPr>
+        </p:sp>
+      </p:grpSp>
     </p:spTree>
     <p:extLst>
       <p:ext uri="{BB962C8B-B14F-4D97-AF65-F5344CB8AC3E}">
-        <p14:creationId xmlns:p14="http://schemas.microsoft.com/office/powerpoint/2010/main" val="2555252886"/>
+        <p14:creationId xmlns:p14="http://schemas.microsoft.com/office/powerpoint/2010/main" val="1468242452"/>
       </p:ext>
     </p:extLst>
   </p:cSld>
   <p:clrMapOvr>
-    <a:masterClrMapping/>
+    <a:overrideClrMapping bg1="lt1" tx1="dk1" bg2="lt2" tx2="dk2" accent1="accent1" accent2="accent2" accent3="accent3" accent4="accent4" accent5="accent5" accent6="accent6" hlink="hlink" folHlink="folHlink"/>
   </p:clrMapOvr>
 </p:sldLayout>
 </file>
@@ -354,13 +522,7 @@
       </p:grpSpPr>
       <p:sp>
         <p:nvSpPr>
-          <p:cNvPr id="2" name="Title 1">
-            <a:extLst>
-              <a:ext uri="{FF2B5EF4-FFF2-40B4-BE49-F238E27FC236}">
-                <a16:creationId xmlns:a16="http://schemas.microsoft.com/office/drawing/2014/main" id="{66D2241B-B767-8A49-9525-AEA43206A248}"/>
-              </a:ext>
-            </a:extLst>
-          </p:cNvPr>
+          <p:cNvPr id="2" name="Title 1"/>
           <p:cNvSpPr>
             <a:spLocks noGrp="1"/>
           </p:cNvSpPr>
@@ -377,18 +539,13 @@
               <a:rPr lang="en-US"/>
               <a:t>Click to edit Master title style</a:t>
             </a:r>
-          </a:p>
-        </p:txBody>
-      </p:sp>
-      <p:sp>
-        <p:nvSpPr>
-          <p:cNvPr id="3" name="Vertical Text Placeholder 2">
-            <a:extLst>
-              <a:ext uri="{FF2B5EF4-FFF2-40B4-BE49-F238E27FC236}">
-                <a16:creationId xmlns:a16="http://schemas.microsoft.com/office/drawing/2014/main" id="{16650B16-8296-794B-A3E6-840B062E52F4}"/>
-              </a:ext>
-            </a:extLst>
-          </p:cNvPr>
+            <a:endParaRPr lang="en-US" dirty="0"/>
+          </a:p>
+        </p:txBody>
+      </p:sp>
+      <p:sp>
+        <p:nvSpPr>
+          <p:cNvPr id="3" name="Vertical Text Placeholder 2"/>
           <p:cNvSpPr>
             <a:spLocks noGrp="1"/>
           </p:cNvSpPr>
@@ -396,7 +553,12 @@
             <p:ph type="body" orient="vert" idx="1"/>
           </p:nvPr>
         </p:nvSpPr>
-        <p:spPr/>
+        <p:spPr>
+          <a:xfrm>
+            <a:off x="1371600" y="2295525"/>
+            <a:ext cx="9601200" cy="3571875"/>
+          </a:xfrm>
+        </p:spPr>
         <p:txBody>
           <a:bodyPr vert="eaVert"/>
           <a:lstStyle/>
@@ -434,18 +596,13 @@
               <a:rPr lang="en-US"/>
               <a:t>Fifth level</a:t>
             </a:r>
-          </a:p>
-        </p:txBody>
-      </p:sp>
-      <p:sp>
-        <p:nvSpPr>
-          <p:cNvPr id="4" name="Date Placeholder 3">
-            <a:extLst>
-              <a:ext uri="{FF2B5EF4-FFF2-40B4-BE49-F238E27FC236}">
-                <a16:creationId xmlns:a16="http://schemas.microsoft.com/office/drawing/2014/main" id="{0E396394-9BA7-7149-AC6A-54888AB87617}"/>
-              </a:ext>
-            </a:extLst>
-          </p:cNvPr>
+            <a:endParaRPr lang="en-US" dirty="0"/>
+          </a:p>
+        </p:txBody>
+      </p:sp>
+      <p:sp>
+        <p:nvSpPr>
+          <p:cNvPr id="4" name="Date Placeholder 3"/>
           <p:cNvSpPr>
             <a:spLocks noGrp="1"/>
           </p:cNvSpPr>
@@ -460,7 +617,7 @@
           <a:p>
             <a:fld id="{D858EF06-04DE-9048-AB9F-32A682F238EA}" type="datetimeFigureOut">
               <a:rPr lang="en-US" smtClean="0"/>
-              <a:t>5/7/18</a:t>
+              <a:t>5/8/18</a:t>
             </a:fld>
             <a:endParaRPr lang="en-US"/>
           </a:p>
@@ -468,13 +625,7 @@
       </p:sp>
       <p:sp>
         <p:nvSpPr>
-          <p:cNvPr id="5" name="Footer Placeholder 4">
-            <a:extLst>
-              <a:ext uri="{FF2B5EF4-FFF2-40B4-BE49-F238E27FC236}">
-                <a16:creationId xmlns:a16="http://schemas.microsoft.com/office/drawing/2014/main" id="{977463B7-67A3-DB40-B205-B7AD20EC8B59}"/>
-              </a:ext>
-            </a:extLst>
-          </p:cNvPr>
+          <p:cNvPr id="5" name="Footer Placeholder 4"/>
           <p:cNvSpPr>
             <a:spLocks noGrp="1"/>
           </p:cNvSpPr>
@@ -493,13 +644,7 @@
       </p:sp>
       <p:sp>
         <p:nvSpPr>
-          <p:cNvPr id="6" name="Slide Number Placeholder 5">
-            <a:extLst>
-              <a:ext uri="{FF2B5EF4-FFF2-40B4-BE49-F238E27FC236}">
-                <a16:creationId xmlns:a16="http://schemas.microsoft.com/office/drawing/2014/main" id="{2DBBA5EC-6957-8642-9EC7-785D07264518}"/>
-              </a:ext>
-            </a:extLst>
-          </p:cNvPr>
+          <p:cNvPr id="6" name="Slide Number Placeholder 5"/>
           <p:cNvSpPr>
             <a:spLocks noGrp="1"/>
           </p:cNvSpPr>
@@ -523,7 +668,7 @@
     </p:spTree>
     <p:extLst>
       <p:ext uri="{BB962C8B-B14F-4D97-AF65-F5344CB8AC3E}">
-        <p14:creationId xmlns:p14="http://schemas.microsoft.com/office/powerpoint/2010/main" val="203057805"/>
+        <p14:creationId xmlns:p14="http://schemas.microsoft.com/office/powerpoint/2010/main" val="1812832898"/>
       </p:ext>
     </p:extLst>
   </p:cSld>
@@ -552,13 +697,7 @@
       </p:grpSpPr>
       <p:sp>
         <p:nvSpPr>
-          <p:cNvPr id="2" name="Vertical Title 1">
-            <a:extLst>
-              <a:ext uri="{FF2B5EF4-FFF2-40B4-BE49-F238E27FC236}">
-                <a16:creationId xmlns:a16="http://schemas.microsoft.com/office/drawing/2014/main" id="{6A7859B2-FDBF-2742-9CB0-572C7D772E5C}"/>
-              </a:ext>
-            </a:extLst>
-          </p:cNvPr>
+          <p:cNvPr id="2" name="Vertical Title 1"/>
           <p:cNvSpPr>
             <a:spLocks noGrp="1"/>
           </p:cNvSpPr>
@@ -568,8 +707,8 @@
         </p:nvSpPr>
         <p:spPr>
           <a:xfrm>
-            <a:off x="8724900" y="365125"/>
-            <a:ext cx="2628900" cy="5811838"/>
+            <a:off x="9596561" y="624156"/>
+            <a:ext cx="1565766" cy="5243244"/>
           </a:xfrm>
         </p:spPr>
         <p:txBody>
@@ -580,18 +719,13 @@
               <a:rPr lang="en-US"/>
               <a:t>Click to edit Master title style</a:t>
             </a:r>
-          </a:p>
-        </p:txBody>
-      </p:sp>
-      <p:sp>
-        <p:nvSpPr>
-          <p:cNvPr id="3" name="Vertical Text Placeholder 2">
-            <a:extLst>
-              <a:ext uri="{FF2B5EF4-FFF2-40B4-BE49-F238E27FC236}">
-                <a16:creationId xmlns:a16="http://schemas.microsoft.com/office/drawing/2014/main" id="{FFB171ED-0C59-CD47-888F-731EE77DED99}"/>
-              </a:ext>
-            </a:extLst>
-          </p:cNvPr>
+            <a:endParaRPr lang="en-US" dirty="0"/>
+          </a:p>
+        </p:txBody>
+      </p:sp>
+      <p:sp>
+        <p:nvSpPr>
+          <p:cNvPr id="3" name="Vertical Text Placeholder 2"/>
           <p:cNvSpPr>
             <a:spLocks noGrp="1"/>
           </p:cNvSpPr>
@@ -601,8 +735,8 @@
         </p:nvSpPr>
         <p:spPr>
           <a:xfrm>
-            <a:off x="838200" y="365125"/>
-            <a:ext cx="7734300" cy="5811838"/>
+            <a:off x="1371600" y="624156"/>
+            <a:ext cx="8179641" cy="5243244"/>
           </a:xfrm>
         </p:spPr>
         <p:txBody>
@@ -642,18 +776,13 @@
               <a:rPr lang="en-US"/>
               <a:t>Fifth level</a:t>
             </a:r>
-          </a:p>
-        </p:txBody>
-      </p:sp>
-      <p:sp>
-        <p:nvSpPr>
-          <p:cNvPr id="4" name="Date Placeholder 3">
-            <a:extLst>
-              <a:ext uri="{FF2B5EF4-FFF2-40B4-BE49-F238E27FC236}">
-                <a16:creationId xmlns:a16="http://schemas.microsoft.com/office/drawing/2014/main" id="{414F02E1-71D4-6140-903B-B3A674FD724E}"/>
-              </a:ext>
-            </a:extLst>
-          </p:cNvPr>
+            <a:endParaRPr lang="en-US" dirty="0"/>
+          </a:p>
+        </p:txBody>
+      </p:sp>
+      <p:sp>
+        <p:nvSpPr>
+          <p:cNvPr id="4" name="Date Placeholder 3"/>
           <p:cNvSpPr>
             <a:spLocks noGrp="1"/>
           </p:cNvSpPr>
@@ -668,7 +797,7 @@
           <a:p>
             <a:fld id="{D858EF06-04DE-9048-AB9F-32A682F238EA}" type="datetimeFigureOut">
               <a:rPr lang="en-US" smtClean="0"/>
-              <a:t>5/7/18</a:t>
+              <a:t>5/8/18</a:t>
             </a:fld>
             <a:endParaRPr lang="en-US"/>
           </a:p>
@@ -676,13 +805,7 @@
       </p:sp>
       <p:sp>
         <p:nvSpPr>
-          <p:cNvPr id="5" name="Footer Placeholder 4">
-            <a:extLst>
-              <a:ext uri="{FF2B5EF4-FFF2-40B4-BE49-F238E27FC236}">
-                <a16:creationId xmlns:a16="http://schemas.microsoft.com/office/drawing/2014/main" id="{E50F67FC-0EC0-184F-AF55-11DA963F28C6}"/>
-              </a:ext>
-            </a:extLst>
-          </p:cNvPr>
+          <p:cNvPr id="5" name="Footer Placeholder 4"/>
           <p:cNvSpPr>
             <a:spLocks noGrp="1"/>
           </p:cNvSpPr>
@@ -701,13 +824,7 @@
       </p:sp>
       <p:sp>
         <p:nvSpPr>
-          <p:cNvPr id="6" name="Slide Number Placeholder 5">
-            <a:extLst>
-              <a:ext uri="{FF2B5EF4-FFF2-40B4-BE49-F238E27FC236}">
-                <a16:creationId xmlns:a16="http://schemas.microsoft.com/office/drawing/2014/main" id="{C0395907-83E2-C248-9AF3-02B4928416B3}"/>
-              </a:ext>
-            </a:extLst>
-          </p:cNvPr>
+          <p:cNvPr id="6" name="Slide Number Placeholder 5"/>
           <p:cNvSpPr>
             <a:spLocks noGrp="1"/>
           </p:cNvSpPr>
@@ -731,7 +848,7 @@
     </p:spTree>
     <p:extLst>
       <p:ext uri="{BB962C8B-B14F-4D97-AF65-F5344CB8AC3E}">
-        <p14:creationId xmlns:p14="http://schemas.microsoft.com/office/powerpoint/2010/main" val="3556402080"/>
+        <p14:creationId xmlns:p14="http://schemas.microsoft.com/office/powerpoint/2010/main" val="1011227132"/>
       </p:ext>
     </p:extLst>
   </p:cSld>
@@ -760,13 +877,7 @@
       </p:grpSpPr>
       <p:sp>
         <p:nvSpPr>
-          <p:cNvPr id="2" name="Title 1">
-            <a:extLst>
-              <a:ext uri="{FF2B5EF4-FFF2-40B4-BE49-F238E27FC236}">
-                <a16:creationId xmlns:a16="http://schemas.microsoft.com/office/drawing/2014/main" id="{6AD8D267-84BD-9C49-AED2-FD943E2F3E89}"/>
-              </a:ext>
-            </a:extLst>
-          </p:cNvPr>
+          <p:cNvPr id="2" name="Title 1"/>
           <p:cNvSpPr>
             <a:spLocks noGrp="1"/>
           </p:cNvSpPr>
@@ -783,18 +894,13 @@
               <a:rPr lang="en-US"/>
               <a:t>Click to edit Master title style</a:t>
             </a:r>
-          </a:p>
-        </p:txBody>
-      </p:sp>
-      <p:sp>
-        <p:nvSpPr>
-          <p:cNvPr id="3" name="Content Placeholder 2">
-            <a:extLst>
-              <a:ext uri="{FF2B5EF4-FFF2-40B4-BE49-F238E27FC236}">
-                <a16:creationId xmlns:a16="http://schemas.microsoft.com/office/drawing/2014/main" id="{38F85488-4231-8F4D-A9C7-29F3E82C10FC}"/>
-              </a:ext>
-            </a:extLst>
-          </p:cNvPr>
+            <a:endParaRPr lang="en-US" dirty="0"/>
+          </a:p>
+        </p:txBody>
+      </p:sp>
+      <p:sp>
+        <p:nvSpPr>
+          <p:cNvPr id="3" name="Content Placeholder 2"/>
           <p:cNvSpPr>
             <a:spLocks noGrp="1"/>
           </p:cNvSpPr>
@@ -840,18 +946,13 @@
               <a:rPr lang="en-US"/>
               <a:t>Fifth level</a:t>
             </a:r>
-          </a:p>
-        </p:txBody>
-      </p:sp>
-      <p:sp>
-        <p:nvSpPr>
-          <p:cNvPr id="4" name="Date Placeholder 3">
-            <a:extLst>
-              <a:ext uri="{FF2B5EF4-FFF2-40B4-BE49-F238E27FC236}">
-                <a16:creationId xmlns:a16="http://schemas.microsoft.com/office/drawing/2014/main" id="{17B2972B-F181-874D-9657-896BE09993FA}"/>
-              </a:ext>
-            </a:extLst>
-          </p:cNvPr>
+            <a:endParaRPr lang="en-US" dirty="0"/>
+          </a:p>
+        </p:txBody>
+      </p:sp>
+      <p:sp>
+        <p:nvSpPr>
+          <p:cNvPr id="4" name="Date Placeholder 3"/>
           <p:cNvSpPr>
             <a:spLocks noGrp="1"/>
           </p:cNvSpPr>
@@ -866,7 +967,7 @@
           <a:p>
             <a:fld id="{D858EF06-04DE-9048-AB9F-32A682F238EA}" type="datetimeFigureOut">
               <a:rPr lang="en-US" smtClean="0"/>
-              <a:t>5/7/18</a:t>
+              <a:t>5/8/18</a:t>
             </a:fld>
             <a:endParaRPr lang="en-US"/>
           </a:p>
@@ -874,13 +975,7 @@
       </p:sp>
       <p:sp>
         <p:nvSpPr>
-          <p:cNvPr id="5" name="Footer Placeholder 4">
-            <a:extLst>
-              <a:ext uri="{FF2B5EF4-FFF2-40B4-BE49-F238E27FC236}">
-                <a16:creationId xmlns:a16="http://schemas.microsoft.com/office/drawing/2014/main" id="{02B102A8-23D5-124A-9E73-18649DDDC532}"/>
-              </a:ext>
-            </a:extLst>
-          </p:cNvPr>
+          <p:cNvPr id="5" name="Footer Placeholder 4"/>
           <p:cNvSpPr>
             <a:spLocks noGrp="1"/>
           </p:cNvSpPr>
@@ -899,13 +994,7 @@
       </p:sp>
       <p:sp>
         <p:nvSpPr>
-          <p:cNvPr id="6" name="Slide Number Placeholder 5">
-            <a:extLst>
-              <a:ext uri="{FF2B5EF4-FFF2-40B4-BE49-F238E27FC236}">
-                <a16:creationId xmlns:a16="http://schemas.microsoft.com/office/drawing/2014/main" id="{49CEF18B-5442-F242-871B-50EC48C5B0A4}"/>
-              </a:ext>
-            </a:extLst>
-          </p:cNvPr>
+          <p:cNvPr id="6" name="Slide Number Placeholder 5"/>
           <p:cNvSpPr>
             <a:spLocks noGrp="1"/>
           </p:cNvSpPr>
@@ -929,7 +1018,7 @@
     </p:spTree>
     <p:extLst>
       <p:ext uri="{BB962C8B-B14F-4D97-AF65-F5344CB8AC3E}">
-        <p14:creationId xmlns:p14="http://schemas.microsoft.com/office/powerpoint/2010/main" val="3749934580"/>
+        <p14:creationId xmlns:p14="http://schemas.microsoft.com/office/powerpoint/2010/main" val="271705115"/>
       </p:ext>
     </p:extLst>
   </p:cSld>
@@ -940,8 +1029,13 @@
 </file>
 
 <file path=ppt/slideLayouts/slideLayout3.xml><?xml version="1.0" encoding="utf-8"?>
-<p:sldLayout xmlns:a="http://schemas.openxmlformats.org/drawingml/2006/main" xmlns:r="http://schemas.openxmlformats.org/officeDocument/2006/relationships" xmlns:p="http://schemas.openxmlformats.org/presentationml/2006/main" type="secHead" preserve="1">
+<p:sldLayout xmlns:a="http://schemas.openxmlformats.org/drawingml/2006/main" xmlns:r="http://schemas.openxmlformats.org/officeDocument/2006/relationships" xmlns:p="http://schemas.openxmlformats.org/presentationml/2006/main" showMasterSp="0" type="secHead" preserve="1">
   <p:cSld name="Section Header">
+    <p:bg>
+      <p:bgRef idx="1001">
+        <a:schemeClr val="bg2"/>
+      </p:bgRef>
+    </p:bg>
     <p:spTree>
       <p:nvGrpSpPr>
         <p:cNvPr id="1" name=""/>
@@ -958,13 +1052,7 @@
       </p:grpSpPr>
       <p:sp>
         <p:nvSpPr>
-          <p:cNvPr id="2" name="Title 1">
-            <a:extLst>
-              <a:ext uri="{FF2B5EF4-FFF2-40B4-BE49-F238E27FC236}">
-                <a16:creationId xmlns:a16="http://schemas.microsoft.com/office/drawing/2014/main" id="{70661B31-36B8-984C-AC0F-37519DBE0AEF}"/>
-              </a:ext>
-            </a:extLst>
-          </p:cNvPr>
+          <p:cNvPr id="2" name="Title 1"/>
           <p:cNvSpPr>
             <a:spLocks noGrp="1"/>
           </p:cNvSpPr>
@@ -974,15 +1062,21 @@
         </p:nvSpPr>
         <p:spPr>
           <a:xfrm>
-            <a:off x="831850" y="1709738"/>
-            <a:ext cx="10515600" cy="2852737"/>
-          </a:xfrm>
-        </p:spPr>
-        <p:txBody>
-          <a:bodyPr anchor="b"/>
+            <a:off x="765025" y="1301360"/>
+            <a:ext cx="9612971" cy="2852737"/>
+          </a:xfrm>
+        </p:spPr>
+        <p:txBody>
+          <a:bodyPr anchor="b">
+            <a:normAutofit/>
+          </a:bodyPr>
           <a:lstStyle>
-            <a:lvl1pPr>
-              <a:defRPr sz="6000"/>
+            <a:lvl1pPr algn="r">
+              <a:defRPr sz="7200" cap="all" baseline="0">
+                <a:solidFill>
+                  <a:schemeClr val="tx2"/>
+                </a:solidFill>
+              </a:defRPr>
             </a:lvl1pPr>
           </a:lstStyle>
           <a:p>
@@ -990,18 +1084,13 @@
               <a:rPr lang="en-US"/>
               <a:t>Click to edit Master title style</a:t>
             </a:r>
-          </a:p>
-        </p:txBody>
-      </p:sp>
-      <p:sp>
-        <p:nvSpPr>
-          <p:cNvPr id="3" name="Text Placeholder 2">
-            <a:extLst>
-              <a:ext uri="{FF2B5EF4-FFF2-40B4-BE49-F238E27FC236}">
-                <a16:creationId xmlns:a16="http://schemas.microsoft.com/office/drawing/2014/main" id="{28E809EC-0E13-8043-A9D5-37B3C9AB5850}"/>
-              </a:ext>
-            </a:extLst>
-          </p:cNvPr>
+            <a:endParaRPr lang="en-US" dirty="0"/>
+          </a:p>
+        </p:txBody>
+      </p:sp>
+      <p:sp>
+        <p:nvSpPr>
+          <p:cNvPr id="3" name="Text Placeholder 2"/>
           <p:cNvSpPr>
             <a:spLocks noGrp="1"/>
           </p:cNvSpPr>
@@ -1011,20 +1100,27 @@
         </p:nvSpPr>
         <p:spPr>
           <a:xfrm>
-            <a:off x="831850" y="4589463"/>
-            <a:ext cx="10515600" cy="1500187"/>
+            <a:off x="765025" y="4216328"/>
+            <a:ext cx="9612971" cy="1143324"/>
           </a:xfrm>
         </p:spPr>
         <p:txBody>
           <a:bodyPr/>
           <a:lstStyle>
-            <a:lvl1pPr marL="0" indent="0">
+            <a:lvl1pPr marL="0" indent="0" algn="r">
+              <a:lnSpc>
+                <a:spcPct val="112000"/>
+              </a:lnSpc>
+              <a:spcBef>
+                <a:spcPts val="0"/>
+              </a:spcBef>
+              <a:spcAft>
+                <a:spcPts val="0"/>
+              </a:spcAft>
               <a:buNone/>
               <a:defRPr sz="2400">
                 <a:solidFill>
-                  <a:schemeClr val="tx1">
-                    <a:tint val="75000"/>
-                  </a:schemeClr>
+                  <a:schemeClr val="tx2"/>
                 </a:solidFill>
               </a:defRPr>
             </a:lvl1pPr>
@@ -1120,13 +1216,7 @@
       </p:sp>
       <p:sp>
         <p:nvSpPr>
-          <p:cNvPr id="4" name="Date Placeholder 3">
-            <a:extLst>
-              <a:ext uri="{FF2B5EF4-FFF2-40B4-BE49-F238E27FC236}">
-                <a16:creationId xmlns:a16="http://schemas.microsoft.com/office/drawing/2014/main" id="{C0C24E98-CA73-6647-8375-80970167E5F0}"/>
-              </a:ext>
-            </a:extLst>
-          </p:cNvPr>
+          <p:cNvPr id="4" name="Date Placeholder 3"/>
           <p:cNvSpPr>
             <a:spLocks noGrp="1"/>
           </p:cNvSpPr>
@@ -1134,14 +1224,27 @@
             <p:ph type="dt" sz="half" idx="10"/>
           </p:nvPr>
         </p:nvSpPr>
-        <p:spPr/>
+        <p:spPr>
+          <a:xfrm>
+            <a:off x="738908" y="6453386"/>
+            <a:ext cx="1622409" cy="404614"/>
+          </a:xfrm>
+        </p:spPr>
         <p:txBody>
           <a:bodyPr/>
-          <a:lstStyle/>
+          <a:lstStyle>
+            <a:lvl1pPr>
+              <a:defRPr>
+                <a:solidFill>
+                  <a:schemeClr val="tx2"/>
+                </a:solidFill>
+              </a:defRPr>
+            </a:lvl1pPr>
+          </a:lstStyle>
           <a:p>
             <a:fld id="{D858EF06-04DE-9048-AB9F-32A682F238EA}" type="datetimeFigureOut">
               <a:rPr lang="en-US" smtClean="0"/>
-              <a:t>5/7/18</a:t>
+              <a:t>5/8/18</a:t>
             </a:fld>
             <a:endParaRPr lang="en-US"/>
           </a:p>
@@ -1149,13 +1252,7 @@
       </p:sp>
       <p:sp>
         <p:nvSpPr>
-          <p:cNvPr id="5" name="Footer Placeholder 4">
-            <a:extLst>
-              <a:ext uri="{FF2B5EF4-FFF2-40B4-BE49-F238E27FC236}">
-                <a16:creationId xmlns:a16="http://schemas.microsoft.com/office/drawing/2014/main" id="{0954332B-4F49-CA46-8253-E9149C084B18}"/>
-              </a:ext>
-            </a:extLst>
-          </p:cNvPr>
+          <p:cNvPr id="5" name="Footer Placeholder 4"/>
           <p:cNvSpPr>
             <a:spLocks noGrp="1"/>
           </p:cNvSpPr>
@@ -1163,10 +1260,23 @@
             <p:ph type="ftr" sz="quarter" idx="11"/>
           </p:nvPr>
         </p:nvSpPr>
-        <p:spPr/>
+        <p:spPr>
+          <a:xfrm>
+            <a:off x="2584312" y="6453386"/>
+            <a:ext cx="7023377" cy="404614"/>
+          </a:xfrm>
+        </p:spPr>
         <p:txBody>
           <a:bodyPr/>
-          <a:lstStyle/>
+          <a:lstStyle>
+            <a:lvl1pPr algn="ctr">
+              <a:defRPr>
+                <a:solidFill>
+                  <a:schemeClr val="tx2"/>
+                </a:solidFill>
+              </a:defRPr>
+            </a:lvl1pPr>
+          </a:lstStyle>
           <a:p>
             <a:endParaRPr lang="en-US"/>
           </a:p>
@@ -1174,13 +1284,7 @@
       </p:sp>
       <p:sp>
         <p:nvSpPr>
-          <p:cNvPr id="6" name="Slide Number Placeholder 5">
-            <a:extLst>
-              <a:ext uri="{FF2B5EF4-FFF2-40B4-BE49-F238E27FC236}">
-                <a16:creationId xmlns:a16="http://schemas.microsoft.com/office/drawing/2014/main" id="{2B4FD57E-5ED9-A54F-8187-7854CEF799EE}"/>
-              </a:ext>
-            </a:extLst>
-          </p:cNvPr>
+          <p:cNvPr id="6" name="Slide Number Placeholder 5"/>
           <p:cNvSpPr>
             <a:spLocks noGrp="1"/>
           </p:cNvSpPr>
@@ -1188,10 +1292,23 @@
             <p:ph type="sldNum" sz="quarter" idx="12"/>
           </p:nvPr>
         </p:nvSpPr>
-        <p:spPr/>
+        <p:spPr>
+          <a:xfrm>
+            <a:off x="9830683" y="6453386"/>
+            <a:ext cx="1596292" cy="404614"/>
+          </a:xfrm>
+        </p:spPr>
         <p:txBody>
           <a:bodyPr/>
-          <a:lstStyle/>
+          <a:lstStyle>
+            <a:lvl1pPr>
+              <a:defRPr>
+                <a:solidFill>
+                  <a:schemeClr val="tx2"/>
+                </a:solidFill>
+              </a:defRPr>
+            </a:lvl1pPr>
+          </a:lstStyle>
           <a:p>
             <a:fld id="{61CA0BAA-152F-944B-B9D5-BB63EA66D2DB}" type="slidenum">
               <a:rPr lang="en-US" smtClean="0"/>
@@ -1201,15 +1318,71 @@
           </a:p>
         </p:txBody>
       </p:sp>
+      <p:sp>
+        <p:nvSpPr>
+          <p:cNvPr id="7" name="Freeform 6" title="Crop Mark"/>
+          <p:cNvSpPr/>
+          <p:nvPr/>
+        </p:nvSpPr>
+        <p:spPr bwMode="auto">
+          <a:xfrm>
+            <a:off x="8151962" y="1685652"/>
+            <a:ext cx="3275013" cy="4408488"/>
+          </a:xfrm>
+          <a:custGeom>
+            <a:avLst/>
+            <a:gdLst/>
+            <a:ahLst/>
+            <a:cxnLst/>
+            <a:rect l="0" t="0" r="r" b="b"/>
+            <a:pathLst>
+              <a:path w="4125" h="5554">
+                <a:moveTo>
+                  <a:pt x="3614" y="0"/>
+                </a:moveTo>
+                <a:lnTo>
+                  <a:pt x="4125" y="0"/>
+                </a:lnTo>
+                <a:lnTo>
+                  <a:pt x="4125" y="5554"/>
+                </a:lnTo>
+                <a:lnTo>
+                  <a:pt x="0" y="5554"/>
+                </a:lnTo>
+                <a:lnTo>
+                  <a:pt x="0" y="5074"/>
+                </a:lnTo>
+                <a:lnTo>
+                  <a:pt x="3614" y="5074"/>
+                </a:lnTo>
+                <a:lnTo>
+                  <a:pt x="3614" y="0"/>
+                </a:lnTo>
+                <a:close/>
+              </a:path>
+            </a:pathLst>
+          </a:custGeom>
+          <a:solidFill>
+            <a:schemeClr val="tx2"/>
+          </a:solidFill>
+          <a:ln w="0">
+            <a:noFill/>
+            <a:prstDash val="solid"/>
+            <a:round/>
+            <a:headEnd/>
+            <a:tailEnd/>
+          </a:ln>
+        </p:spPr>
+      </p:sp>
     </p:spTree>
     <p:extLst>
       <p:ext uri="{BB962C8B-B14F-4D97-AF65-F5344CB8AC3E}">
-        <p14:creationId xmlns:p14="http://schemas.microsoft.com/office/powerpoint/2010/main" val="1209517437"/>
+        <p14:creationId xmlns:p14="http://schemas.microsoft.com/office/powerpoint/2010/main" val="1342207575"/>
       </p:ext>
     </p:extLst>
   </p:cSld>
   <p:clrMapOvr>
-    <a:masterClrMapping/>
+    <a:overrideClrMapping bg1="dk1" tx1="lt1" bg2="dk2" tx2="lt2" accent1="accent1" accent2="accent2" accent3="accent3" accent4="accent4" accent5="accent5" accent6="accent6" hlink="hlink" folHlink="folHlink"/>
   </p:clrMapOvr>
 </p:sldLayout>
 </file>
@@ -1233,18 +1406,229 @@
       </p:grpSpPr>
       <p:sp>
         <p:nvSpPr>
-          <p:cNvPr id="2" name="Title 1">
-            <a:extLst>
-              <a:ext uri="{FF2B5EF4-FFF2-40B4-BE49-F238E27FC236}">
-                <a16:creationId xmlns:a16="http://schemas.microsoft.com/office/drawing/2014/main" id="{10593A22-7262-3443-BEC0-C087CD2457CB}"/>
-              </a:ext>
-            </a:extLst>
-          </p:cNvPr>
+          <p:cNvPr id="2" name="Title 1"/>
           <p:cNvSpPr>
             <a:spLocks noGrp="1"/>
           </p:cNvSpPr>
           <p:nvPr>
             <p:ph type="title"/>
+          </p:nvPr>
+        </p:nvSpPr>
+        <p:spPr/>
+        <p:txBody>
+          <a:bodyPr/>
+          <a:lstStyle>
+            <a:lvl1pPr>
+              <a:defRPr>
+                <a:solidFill>
+                  <a:schemeClr val="tx2"/>
+                </a:solidFill>
+              </a:defRPr>
+            </a:lvl1pPr>
+          </a:lstStyle>
+          <a:p>
+            <a:r>
+              <a:rPr lang="en-US"/>
+              <a:t>Click to edit Master title style</a:t>
+            </a:r>
+            <a:endParaRPr lang="en-US" dirty="0"/>
+          </a:p>
+        </p:txBody>
+      </p:sp>
+      <p:sp>
+        <p:nvSpPr>
+          <p:cNvPr id="3" name="Content Placeholder 2"/>
+          <p:cNvSpPr>
+            <a:spLocks noGrp="1"/>
+          </p:cNvSpPr>
+          <p:nvPr>
+            <p:ph sz="half" idx="1"/>
+          </p:nvPr>
+        </p:nvSpPr>
+        <p:spPr>
+          <a:xfrm>
+            <a:off x="1371600" y="2285999"/>
+            <a:ext cx="4447786" cy="3581401"/>
+          </a:xfrm>
+        </p:spPr>
+        <p:txBody>
+          <a:bodyPr/>
+          <a:lstStyle>
+            <a:lvl1pPr>
+              <a:defRPr baseline="0">
+                <a:solidFill>
+                  <a:schemeClr val="tx2"/>
+                </a:solidFill>
+              </a:defRPr>
+            </a:lvl1pPr>
+            <a:lvl2pPr>
+              <a:defRPr baseline="0">
+                <a:solidFill>
+                  <a:schemeClr val="tx2"/>
+                </a:solidFill>
+              </a:defRPr>
+            </a:lvl2pPr>
+            <a:lvl3pPr>
+              <a:defRPr baseline="0">
+                <a:solidFill>
+                  <a:schemeClr val="tx2"/>
+                </a:solidFill>
+              </a:defRPr>
+            </a:lvl3pPr>
+            <a:lvl4pPr>
+              <a:defRPr baseline="0">
+                <a:solidFill>
+                  <a:schemeClr val="tx2"/>
+                </a:solidFill>
+              </a:defRPr>
+            </a:lvl4pPr>
+            <a:lvl5pPr>
+              <a:defRPr baseline="0">
+                <a:solidFill>
+                  <a:schemeClr val="tx2"/>
+                </a:solidFill>
+              </a:defRPr>
+            </a:lvl5pPr>
+          </a:lstStyle>
+          <a:p>
+            <a:pPr lvl="0"/>
+            <a:r>
+              <a:rPr lang="en-US"/>
+              <a:t>Edit Master text styles</a:t>
+            </a:r>
+          </a:p>
+          <a:p>
+            <a:pPr lvl="1"/>
+            <a:r>
+              <a:rPr lang="en-US"/>
+              <a:t>Second level</a:t>
+            </a:r>
+          </a:p>
+          <a:p>
+            <a:pPr lvl="2"/>
+            <a:r>
+              <a:rPr lang="en-US"/>
+              <a:t>Third level</a:t>
+            </a:r>
+          </a:p>
+          <a:p>
+            <a:pPr lvl="3"/>
+            <a:r>
+              <a:rPr lang="en-US"/>
+              <a:t>Fourth level</a:t>
+            </a:r>
+          </a:p>
+          <a:p>
+            <a:pPr lvl="4"/>
+            <a:r>
+              <a:rPr lang="en-US"/>
+              <a:t>Fifth level</a:t>
+            </a:r>
+            <a:endParaRPr lang="en-US" dirty="0"/>
+          </a:p>
+        </p:txBody>
+      </p:sp>
+      <p:sp>
+        <p:nvSpPr>
+          <p:cNvPr id="4" name="Content Placeholder 3"/>
+          <p:cNvSpPr>
+            <a:spLocks noGrp="1"/>
+          </p:cNvSpPr>
+          <p:nvPr>
+            <p:ph sz="half" idx="2"/>
+          </p:nvPr>
+        </p:nvSpPr>
+        <p:spPr>
+          <a:xfrm>
+            <a:off x="6525403" y="2285999"/>
+            <a:ext cx="4447786" cy="3581401"/>
+          </a:xfrm>
+        </p:spPr>
+        <p:txBody>
+          <a:bodyPr/>
+          <a:lstStyle>
+            <a:lvl1pPr>
+              <a:defRPr>
+                <a:solidFill>
+                  <a:schemeClr val="tx2"/>
+                </a:solidFill>
+              </a:defRPr>
+            </a:lvl1pPr>
+            <a:lvl2pPr>
+              <a:defRPr>
+                <a:solidFill>
+                  <a:schemeClr val="tx2"/>
+                </a:solidFill>
+              </a:defRPr>
+            </a:lvl2pPr>
+            <a:lvl3pPr>
+              <a:defRPr>
+                <a:solidFill>
+                  <a:schemeClr val="tx2"/>
+                </a:solidFill>
+              </a:defRPr>
+            </a:lvl3pPr>
+            <a:lvl4pPr>
+              <a:defRPr>
+                <a:solidFill>
+                  <a:schemeClr val="tx2"/>
+                </a:solidFill>
+              </a:defRPr>
+            </a:lvl4pPr>
+            <a:lvl5pPr>
+              <a:defRPr>
+                <a:solidFill>
+                  <a:schemeClr val="tx2"/>
+                </a:solidFill>
+              </a:defRPr>
+            </a:lvl5pPr>
+          </a:lstStyle>
+          <a:p>
+            <a:pPr lvl="0"/>
+            <a:r>
+              <a:rPr lang="en-US"/>
+              <a:t>Edit Master text styles</a:t>
+            </a:r>
+          </a:p>
+          <a:p>
+            <a:pPr lvl="1"/>
+            <a:r>
+              <a:rPr lang="en-US"/>
+              <a:t>Second level</a:t>
+            </a:r>
+          </a:p>
+          <a:p>
+            <a:pPr lvl="2"/>
+            <a:r>
+              <a:rPr lang="en-US"/>
+              <a:t>Third level</a:t>
+            </a:r>
+          </a:p>
+          <a:p>
+            <a:pPr lvl="3"/>
+            <a:r>
+              <a:rPr lang="en-US"/>
+              <a:t>Fourth level</a:t>
+            </a:r>
+          </a:p>
+          <a:p>
+            <a:pPr lvl="4"/>
+            <a:r>
+              <a:rPr lang="en-US"/>
+              <a:t>Fifth level</a:t>
+            </a:r>
+            <a:endParaRPr lang="en-US" dirty="0"/>
+          </a:p>
+        </p:txBody>
+      </p:sp>
+      <p:sp>
+        <p:nvSpPr>
+          <p:cNvPr id="5" name="Date Placeholder 4"/>
+          <p:cNvSpPr>
+            <a:spLocks noGrp="1"/>
+          </p:cNvSpPr>
+          <p:nvPr>
+            <p:ph type="dt" sz="half" idx="10"/>
           </p:nvPr>
         </p:nvSpPr>
         <p:spPr/>
@@ -1252,200 +1636,36 @@
           <a:bodyPr/>
           <a:lstStyle/>
           <a:p>
-            <a:r>
-              <a:rPr lang="en-US"/>
-              <a:t>Click to edit Master title style</a:t>
-            </a:r>
-          </a:p>
-        </p:txBody>
-      </p:sp>
-      <p:sp>
-        <p:nvSpPr>
-          <p:cNvPr id="3" name="Content Placeholder 2">
-            <a:extLst>
-              <a:ext uri="{FF2B5EF4-FFF2-40B4-BE49-F238E27FC236}">
-                <a16:creationId xmlns:a16="http://schemas.microsoft.com/office/drawing/2014/main" id="{5413F6ED-5A32-B34B-93DB-0AC696456582}"/>
-              </a:ext>
-            </a:extLst>
-          </p:cNvPr>
-          <p:cNvSpPr>
-            <a:spLocks noGrp="1"/>
-          </p:cNvSpPr>
-          <p:nvPr>
-            <p:ph sz="half" idx="1"/>
-          </p:nvPr>
-        </p:nvSpPr>
-        <p:spPr>
-          <a:xfrm>
-            <a:off x="838200" y="1825625"/>
-            <a:ext cx="5181600" cy="4351338"/>
-          </a:xfrm>
-        </p:spPr>
+            <a:fld id="{D858EF06-04DE-9048-AB9F-32A682F238EA}" type="datetimeFigureOut">
+              <a:rPr lang="en-US" smtClean="0"/>
+              <a:t>5/8/18</a:t>
+            </a:fld>
+            <a:endParaRPr lang="en-US"/>
+          </a:p>
+        </p:txBody>
+      </p:sp>
+      <p:sp>
+        <p:nvSpPr>
+          <p:cNvPr id="6" name="Footer Placeholder 5"/>
+          <p:cNvSpPr>
+            <a:spLocks noGrp="1"/>
+          </p:cNvSpPr>
+          <p:nvPr>
+            <p:ph type="ftr" sz="quarter" idx="11"/>
+          </p:nvPr>
+        </p:nvSpPr>
+        <p:spPr/>
         <p:txBody>
           <a:bodyPr/>
           <a:lstStyle/>
           <a:p>
-            <a:pPr lvl="0"/>
-            <a:r>
-              <a:rPr lang="en-US"/>
-              <a:t>Edit Master text styles</a:t>
-            </a:r>
-          </a:p>
-          <a:p>
-            <a:pPr lvl="1"/>
-            <a:r>
-              <a:rPr lang="en-US"/>
-              <a:t>Second level</a:t>
-            </a:r>
-          </a:p>
-          <a:p>
-            <a:pPr lvl="2"/>
-            <a:r>
-              <a:rPr lang="en-US"/>
-              <a:t>Third level</a:t>
-            </a:r>
-          </a:p>
-          <a:p>
-            <a:pPr lvl="3"/>
-            <a:r>
-              <a:rPr lang="en-US"/>
-              <a:t>Fourth level</a:t>
-            </a:r>
-          </a:p>
-          <a:p>
-            <a:pPr lvl="4"/>
-            <a:r>
-              <a:rPr lang="en-US"/>
-              <a:t>Fifth level</a:t>
-            </a:r>
-          </a:p>
-        </p:txBody>
-      </p:sp>
-      <p:sp>
-        <p:nvSpPr>
-          <p:cNvPr id="4" name="Content Placeholder 3">
-            <a:extLst>
-              <a:ext uri="{FF2B5EF4-FFF2-40B4-BE49-F238E27FC236}">
-                <a16:creationId xmlns:a16="http://schemas.microsoft.com/office/drawing/2014/main" id="{7E56C59C-ECA8-B042-BE19-28DC471D2746}"/>
-              </a:ext>
-            </a:extLst>
-          </p:cNvPr>
-          <p:cNvSpPr>
-            <a:spLocks noGrp="1"/>
-          </p:cNvSpPr>
-          <p:nvPr>
-            <p:ph sz="half" idx="2"/>
-          </p:nvPr>
-        </p:nvSpPr>
-        <p:spPr>
-          <a:xfrm>
-            <a:off x="6172200" y="1825625"/>
-            <a:ext cx="5181600" cy="4351338"/>
-          </a:xfrm>
-        </p:spPr>
-        <p:txBody>
-          <a:bodyPr/>
-          <a:lstStyle/>
-          <a:p>
-            <a:pPr lvl="0"/>
-            <a:r>
-              <a:rPr lang="en-US"/>
-              <a:t>Edit Master text styles</a:t>
-            </a:r>
-          </a:p>
-          <a:p>
-            <a:pPr lvl="1"/>
-            <a:r>
-              <a:rPr lang="en-US"/>
-              <a:t>Second level</a:t>
-            </a:r>
-          </a:p>
-          <a:p>
-            <a:pPr lvl="2"/>
-            <a:r>
-              <a:rPr lang="en-US"/>
-              <a:t>Third level</a:t>
-            </a:r>
-          </a:p>
-          <a:p>
-            <a:pPr lvl="3"/>
-            <a:r>
-              <a:rPr lang="en-US"/>
-              <a:t>Fourth level</a:t>
-            </a:r>
-          </a:p>
-          <a:p>
-            <a:pPr lvl="4"/>
-            <a:r>
-              <a:rPr lang="en-US"/>
-              <a:t>Fifth level</a:t>
-            </a:r>
-          </a:p>
-        </p:txBody>
-      </p:sp>
-      <p:sp>
-        <p:nvSpPr>
-          <p:cNvPr id="5" name="Date Placeholder 4">
-            <a:extLst>
-              <a:ext uri="{FF2B5EF4-FFF2-40B4-BE49-F238E27FC236}">
-                <a16:creationId xmlns:a16="http://schemas.microsoft.com/office/drawing/2014/main" id="{C1590D30-946D-3846-BE9B-10AD55366F1C}"/>
-              </a:ext>
-            </a:extLst>
-          </p:cNvPr>
-          <p:cNvSpPr>
-            <a:spLocks noGrp="1"/>
-          </p:cNvSpPr>
-          <p:nvPr>
-            <p:ph type="dt" sz="half" idx="10"/>
-          </p:nvPr>
-        </p:nvSpPr>
-        <p:spPr/>
-        <p:txBody>
-          <a:bodyPr/>
-          <a:lstStyle/>
-          <a:p>
-            <a:fld id="{D858EF06-04DE-9048-AB9F-32A682F238EA}" type="datetimeFigureOut">
-              <a:rPr lang="en-US" smtClean="0"/>
-              <a:t>5/7/18</a:t>
-            </a:fld>
             <a:endParaRPr lang="en-US"/>
           </a:p>
         </p:txBody>
       </p:sp>
       <p:sp>
         <p:nvSpPr>
-          <p:cNvPr id="6" name="Footer Placeholder 5">
-            <a:extLst>
-              <a:ext uri="{FF2B5EF4-FFF2-40B4-BE49-F238E27FC236}">
-                <a16:creationId xmlns:a16="http://schemas.microsoft.com/office/drawing/2014/main" id="{B551A1B4-A54D-7F48-8F69-C3DAB5C76167}"/>
-              </a:ext>
-            </a:extLst>
-          </p:cNvPr>
-          <p:cNvSpPr>
-            <a:spLocks noGrp="1"/>
-          </p:cNvSpPr>
-          <p:nvPr>
-            <p:ph type="ftr" sz="quarter" idx="11"/>
-          </p:nvPr>
-        </p:nvSpPr>
-        <p:spPr/>
-        <p:txBody>
-          <a:bodyPr/>
-          <a:lstStyle/>
-          <a:p>
-            <a:endParaRPr lang="en-US"/>
-          </a:p>
-        </p:txBody>
-      </p:sp>
-      <p:sp>
-        <p:nvSpPr>
-          <p:cNvPr id="7" name="Slide Number Placeholder 6">
-            <a:extLst>
-              <a:ext uri="{FF2B5EF4-FFF2-40B4-BE49-F238E27FC236}">
-                <a16:creationId xmlns:a16="http://schemas.microsoft.com/office/drawing/2014/main" id="{26F2C363-4EA4-874D-83E7-9940CD8E43DB}"/>
-              </a:ext>
-            </a:extLst>
-          </p:cNvPr>
+          <p:cNvPr id="7" name="Slide Number Placeholder 6"/>
           <p:cNvSpPr>
             <a:spLocks noGrp="1"/>
           </p:cNvSpPr>
@@ -1469,13 +1689,18 @@
     </p:spTree>
     <p:extLst>
       <p:ext uri="{BB962C8B-B14F-4D97-AF65-F5344CB8AC3E}">
-        <p14:creationId xmlns:p14="http://schemas.microsoft.com/office/powerpoint/2010/main" val="2532057980"/>
+        <p14:creationId xmlns:p14="http://schemas.microsoft.com/office/powerpoint/2010/main" val="2083418154"/>
       </p:ext>
     </p:extLst>
   </p:cSld>
   <p:clrMapOvr>
     <a:masterClrMapping/>
   </p:clrMapOvr>
+  <p:extLst>
+    <p:ext uri="{DCECCB84-F9BA-43D5-87BE-67443E8EF086}">
+      <p15:sldGuideLst xmlns:p15="http://schemas.microsoft.com/office/powerpoint/2012/main"/>
+    </p:ext>
+  </p:extLst>
 </p:sldLayout>
 </file>
 
@@ -1498,13 +1723,7 @@
       </p:grpSpPr>
       <p:sp>
         <p:nvSpPr>
-          <p:cNvPr id="2" name="Title 1">
-            <a:extLst>
-              <a:ext uri="{FF2B5EF4-FFF2-40B4-BE49-F238E27FC236}">
-                <a16:creationId xmlns:a16="http://schemas.microsoft.com/office/drawing/2014/main" id="{B230CFE4-1DE0-AB47-9793-50FA473A21AF}"/>
-              </a:ext>
-            </a:extLst>
-          </p:cNvPr>
+          <p:cNvPr id="2" name="Title 1"/>
           <p:cNvSpPr>
             <a:spLocks noGrp="1"/>
           </p:cNvSpPr>
@@ -1514,30 +1733,33 @@
         </p:nvSpPr>
         <p:spPr>
           <a:xfrm>
-            <a:off x="839788" y="365125"/>
-            <a:ext cx="10515600" cy="1325563"/>
+            <a:off x="1371600" y="685800"/>
+            <a:ext cx="9601200" cy="1485900"/>
           </a:xfrm>
         </p:spPr>
         <p:txBody>
           <a:bodyPr/>
-          <a:lstStyle/>
+          <a:lstStyle>
+            <a:lvl1pPr>
+              <a:defRPr>
+                <a:solidFill>
+                  <a:schemeClr val="tx2"/>
+                </a:solidFill>
+              </a:defRPr>
+            </a:lvl1pPr>
+          </a:lstStyle>
           <a:p>
             <a:r>
               <a:rPr lang="en-US"/>
               <a:t>Click to edit Master title style</a:t>
             </a:r>
-          </a:p>
-        </p:txBody>
-      </p:sp>
-      <p:sp>
-        <p:nvSpPr>
-          <p:cNvPr id="3" name="Text Placeholder 2">
-            <a:extLst>
-              <a:ext uri="{FF2B5EF4-FFF2-40B4-BE49-F238E27FC236}">
-                <a16:creationId xmlns:a16="http://schemas.microsoft.com/office/drawing/2014/main" id="{357D3550-52E8-4144-85B6-ADF48D6E7865}"/>
-              </a:ext>
-            </a:extLst>
-          </p:cNvPr>
+            <a:endParaRPr lang="en-US" dirty="0"/>
+          </a:p>
+        </p:txBody>
+      </p:sp>
+      <p:sp>
+        <p:nvSpPr>
+          <p:cNvPr id="3" name="Text Placeholder 2"/>
           <p:cNvSpPr>
             <a:spLocks noGrp="1"/>
           </p:cNvSpPr>
@@ -1547,16 +1769,31 @@
         </p:nvSpPr>
         <p:spPr>
           <a:xfrm>
-            <a:off x="839788" y="1681163"/>
-            <a:ext cx="5157787" cy="823912"/>
-          </a:xfrm>
-        </p:spPr>
-        <p:txBody>
-          <a:bodyPr anchor="b"/>
+            <a:off x="1371600" y="2340864"/>
+            <a:ext cx="4443984" cy="823912"/>
+          </a:xfrm>
+        </p:spPr>
+        <p:txBody>
+          <a:bodyPr anchor="b">
+            <a:noAutofit/>
+          </a:bodyPr>
           <a:lstStyle>
             <a:lvl1pPr marL="0" indent="0">
-              <a:buNone/>
-              <a:defRPr sz="2400" b="1"/>
+              <a:lnSpc>
+                <a:spcPct val="84000"/>
+              </a:lnSpc>
+              <a:spcBef>
+                <a:spcPts val="0"/>
+              </a:spcBef>
+              <a:spcAft>
+                <a:spcPts val="0"/>
+              </a:spcAft>
+              <a:buNone/>
+              <a:defRPr sz="3000" b="0" baseline="0">
+                <a:solidFill>
+                  <a:schemeClr val="tx2"/>
+                </a:solidFill>
+              </a:defRPr>
             </a:lvl1pPr>
             <a:lvl2pPr marL="457200" indent="0">
               <a:buNone/>
@@ -1602,13 +1839,7 @@
       </p:sp>
       <p:sp>
         <p:nvSpPr>
-          <p:cNvPr id="4" name="Content Placeholder 3">
-            <a:extLst>
-              <a:ext uri="{FF2B5EF4-FFF2-40B4-BE49-F238E27FC236}">
-                <a16:creationId xmlns:a16="http://schemas.microsoft.com/office/drawing/2014/main" id="{F5503DB8-9807-8B47-95E1-095B464C0158}"/>
-              </a:ext>
-            </a:extLst>
-          </p:cNvPr>
+          <p:cNvPr id="4" name="Content Placeholder 3"/>
           <p:cNvSpPr>
             <a:spLocks noGrp="1"/>
           </p:cNvSpPr>
@@ -1618,13 +1849,49 @@
         </p:nvSpPr>
         <p:spPr>
           <a:xfrm>
-            <a:off x="839788" y="2505075"/>
-            <a:ext cx="5157787" cy="3684588"/>
+            <a:off x="1371600" y="3305207"/>
+            <a:ext cx="4443984" cy="2562193"/>
           </a:xfrm>
         </p:spPr>
         <p:txBody>
           <a:bodyPr/>
-          <a:lstStyle/>
+          <a:lstStyle>
+            <a:lvl1pPr>
+              <a:defRPr baseline="0">
+                <a:solidFill>
+                  <a:schemeClr val="tx2"/>
+                </a:solidFill>
+              </a:defRPr>
+            </a:lvl1pPr>
+            <a:lvl2pPr>
+              <a:defRPr baseline="0">
+                <a:solidFill>
+                  <a:schemeClr val="tx2"/>
+                </a:solidFill>
+              </a:defRPr>
+            </a:lvl2pPr>
+            <a:lvl3pPr>
+              <a:defRPr baseline="0">
+                <a:solidFill>
+                  <a:schemeClr val="tx2"/>
+                </a:solidFill>
+              </a:defRPr>
+            </a:lvl3pPr>
+            <a:lvl4pPr>
+              <a:defRPr baseline="0">
+                <a:solidFill>
+                  <a:schemeClr val="tx2"/>
+                </a:solidFill>
+              </a:defRPr>
+            </a:lvl4pPr>
+            <a:lvl5pPr>
+              <a:defRPr baseline="0">
+                <a:solidFill>
+                  <a:schemeClr val="tx2"/>
+                </a:solidFill>
+              </a:defRPr>
+            </a:lvl5pPr>
+          </a:lstStyle>
           <a:p>
             <a:pPr lvl="0"/>
             <a:r>
@@ -1659,18 +1926,13 @@
               <a:rPr lang="en-US"/>
               <a:t>Fifth level</a:t>
             </a:r>
-          </a:p>
-        </p:txBody>
-      </p:sp>
-      <p:sp>
-        <p:nvSpPr>
-          <p:cNvPr id="5" name="Text Placeholder 4">
-            <a:extLst>
-              <a:ext uri="{FF2B5EF4-FFF2-40B4-BE49-F238E27FC236}">
-                <a16:creationId xmlns:a16="http://schemas.microsoft.com/office/drawing/2014/main" id="{A93ED410-8BBF-2744-922D-642B97384A9F}"/>
-              </a:ext>
-            </a:extLst>
-          </p:cNvPr>
+            <a:endParaRPr lang="en-US" dirty="0"/>
+          </a:p>
+        </p:txBody>
+      </p:sp>
+      <p:sp>
+        <p:nvSpPr>
+          <p:cNvPr id="5" name="Text Placeholder 4"/>
           <p:cNvSpPr>
             <a:spLocks noGrp="1"/>
           </p:cNvSpPr>
@@ -1680,16 +1942,31 @@
         </p:nvSpPr>
         <p:spPr>
           <a:xfrm>
-            <a:off x="6172200" y="1681163"/>
-            <a:ext cx="5183188" cy="823912"/>
-          </a:xfrm>
-        </p:spPr>
-        <p:txBody>
-          <a:bodyPr anchor="b"/>
+            <a:off x="6525014" y="2340864"/>
+            <a:ext cx="4443984" cy="823912"/>
+          </a:xfrm>
+        </p:spPr>
+        <p:txBody>
+          <a:bodyPr anchor="b">
+            <a:noAutofit/>
+          </a:bodyPr>
           <a:lstStyle>
             <a:lvl1pPr marL="0" indent="0">
-              <a:buNone/>
-              <a:defRPr sz="2400" b="1"/>
+              <a:lnSpc>
+                <a:spcPct val="84000"/>
+              </a:lnSpc>
+              <a:spcBef>
+                <a:spcPts val="0"/>
+              </a:spcBef>
+              <a:spcAft>
+                <a:spcPts val="0"/>
+              </a:spcAft>
+              <a:buNone/>
+              <a:defRPr sz="3000" b="0" baseline="0">
+                <a:solidFill>
+                  <a:schemeClr val="tx2"/>
+                </a:solidFill>
+              </a:defRPr>
             </a:lvl1pPr>
             <a:lvl2pPr marL="457200" indent="0">
               <a:buNone/>
@@ -1735,13 +2012,7 @@
       </p:sp>
       <p:sp>
         <p:nvSpPr>
-          <p:cNvPr id="6" name="Content Placeholder 5">
-            <a:extLst>
-              <a:ext uri="{FF2B5EF4-FFF2-40B4-BE49-F238E27FC236}">
-                <a16:creationId xmlns:a16="http://schemas.microsoft.com/office/drawing/2014/main" id="{60F12374-547D-9C43-A6EB-DB0837244225}"/>
-              </a:ext>
-            </a:extLst>
-          </p:cNvPr>
+          <p:cNvPr id="6" name="Content Placeholder 5"/>
           <p:cNvSpPr>
             <a:spLocks noGrp="1"/>
           </p:cNvSpPr>
@@ -1751,64 +2022,118 @@
         </p:nvSpPr>
         <p:spPr>
           <a:xfrm>
-            <a:off x="6172200" y="2505075"/>
-            <a:ext cx="5183188" cy="3684588"/>
-          </a:xfrm>
-        </p:spPr>
+            <a:off x="6525014" y="3305207"/>
+            <a:ext cx="4443984" cy="2562193"/>
+          </a:xfrm>
+        </p:spPr>
+        <p:txBody>
+          <a:bodyPr/>
+          <a:lstStyle>
+            <a:lvl1pPr>
+              <a:defRPr baseline="0">
+                <a:solidFill>
+                  <a:schemeClr val="tx2"/>
+                </a:solidFill>
+              </a:defRPr>
+            </a:lvl1pPr>
+            <a:lvl2pPr>
+              <a:defRPr baseline="0">
+                <a:solidFill>
+                  <a:schemeClr val="tx2"/>
+                </a:solidFill>
+              </a:defRPr>
+            </a:lvl2pPr>
+            <a:lvl3pPr>
+              <a:defRPr baseline="0">
+                <a:solidFill>
+                  <a:schemeClr val="tx2"/>
+                </a:solidFill>
+              </a:defRPr>
+            </a:lvl3pPr>
+            <a:lvl4pPr>
+              <a:defRPr baseline="0">
+                <a:solidFill>
+                  <a:schemeClr val="tx2"/>
+                </a:solidFill>
+              </a:defRPr>
+            </a:lvl4pPr>
+            <a:lvl5pPr>
+              <a:defRPr baseline="0">
+                <a:solidFill>
+                  <a:schemeClr val="tx2"/>
+                </a:solidFill>
+              </a:defRPr>
+            </a:lvl5pPr>
+          </a:lstStyle>
+          <a:p>
+            <a:pPr lvl="0"/>
+            <a:r>
+              <a:rPr lang="en-US"/>
+              <a:t>Edit Master text styles</a:t>
+            </a:r>
+          </a:p>
+          <a:p>
+            <a:pPr lvl="1"/>
+            <a:r>
+              <a:rPr lang="en-US"/>
+              <a:t>Second level</a:t>
+            </a:r>
+          </a:p>
+          <a:p>
+            <a:pPr lvl="2"/>
+            <a:r>
+              <a:rPr lang="en-US"/>
+              <a:t>Third level</a:t>
+            </a:r>
+          </a:p>
+          <a:p>
+            <a:pPr lvl="3"/>
+            <a:r>
+              <a:rPr lang="en-US"/>
+              <a:t>Fourth level</a:t>
+            </a:r>
+          </a:p>
+          <a:p>
+            <a:pPr lvl="4"/>
+            <a:r>
+              <a:rPr lang="en-US"/>
+              <a:t>Fifth level</a:t>
+            </a:r>
+            <a:endParaRPr lang="en-US" dirty="0"/>
+          </a:p>
+        </p:txBody>
+      </p:sp>
+      <p:sp>
+        <p:nvSpPr>
+          <p:cNvPr id="7" name="Date Placeholder 6"/>
+          <p:cNvSpPr>
+            <a:spLocks noGrp="1"/>
+          </p:cNvSpPr>
+          <p:nvPr>
+            <p:ph type="dt" sz="half" idx="10"/>
+          </p:nvPr>
+        </p:nvSpPr>
+        <p:spPr/>
         <p:txBody>
           <a:bodyPr/>
           <a:lstStyle/>
           <a:p>
-            <a:pPr lvl="0"/>
-            <a:r>
-              <a:rPr lang="en-US"/>
-              <a:t>Edit Master text styles</a:t>
-            </a:r>
-          </a:p>
-          <a:p>
-            <a:pPr lvl="1"/>
-            <a:r>
-              <a:rPr lang="en-US"/>
-              <a:t>Second level</a:t>
-            </a:r>
-          </a:p>
-          <a:p>
-            <a:pPr lvl="2"/>
-            <a:r>
-              <a:rPr lang="en-US"/>
-              <a:t>Third level</a:t>
-            </a:r>
-          </a:p>
-          <a:p>
-            <a:pPr lvl="3"/>
-            <a:r>
-              <a:rPr lang="en-US"/>
-              <a:t>Fourth level</a:t>
-            </a:r>
-          </a:p>
-          <a:p>
-            <a:pPr lvl="4"/>
-            <a:r>
-              <a:rPr lang="en-US"/>
-              <a:t>Fifth level</a:t>
-            </a:r>
-          </a:p>
-        </p:txBody>
-      </p:sp>
-      <p:sp>
-        <p:nvSpPr>
-          <p:cNvPr id="7" name="Date Placeholder 6">
-            <a:extLst>
-              <a:ext uri="{FF2B5EF4-FFF2-40B4-BE49-F238E27FC236}">
-                <a16:creationId xmlns:a16="http://schemas.microsoft.com/office/drawing/2014/main" id="{2E4F9A7C-D49A-9642-8E18-E2A3ADF549B7}"/>
-              </a:ext>
-            </a:extLst>
-          </p:cNvPr>
-          <p:cNvSpPr>
-            <a:spLocks noGrp="1"/>
-          </p:cNvSpPr>
-          <p:nvPr>
-            <p:ph type="dt" sz="half" idx="10"/>
+            <a:fld id="{D858EF06-04DE-9048-AB9F-32A682F238EA}" type="datetimeFigureOut">
+              <a:rPr lang="en-US" smtClean="0"/>
+              <a:t>5/8/18</a:t>
+            </a:fld>
+            <a:endParaRPr lang="en-US"/>
+          </a:p>
+        </p:txBody>
+      </p:sp>
+      <p:sp>
+        <p:nvSpPr>
+          <p:cNvPr id="8" name="Footer Placeholder 7"/>
+          <p:cNvSpPr>
+            <a:spLocks noGrp="1"/>
+          </p:cNvSpPr>
+          <p:nvPr>
+            <p:ph type="ftr" sz="quarter" idx="11"/>
           </p:nvPr>
         </p:nvSpPr>
         <p:spPr/>
@@ -1816,48 +2141,13 @@
           <a:bodyPr/>
           <a:lstStyle/>
           <a:p>
-            <a:fld id="{D858EF06-04DE-9048-AB9F-32A682F238EA}" type="datetimeFigureOut">
-              <a:rPr lang="en-US" smtClean="0"/>
-              <a:t>5/7/18</a:t>
-            </a:fld>
             <a:endParaRPr lang="en-US"/>
           </a:p>
         </p:txBody>
       </p:sp>
       <p:sp>
         <p:nvSpPr>
-          <p:cNvPr id="8" name="Footer Placeholder 7">
-            <a:extLst>
-              <a:ext uri="{FF2B5EF4-FFF2-40B4-BE49-F238E27FC236}">
-                <a16:creationId xmlns:a16="http://schemas.microsoft.com/office/drawing/2014/main" id="{C56CBDD8-31C4-9A46-BB87-333673AE4CB8}"/>
-              </a:ext>
-            </a:extLst>
-          </p:cNvPr>
-          <p:cNvSpPr>
-            <a:spLocks noGrp="1"/>
-          </p:cNvSpPr>
-          <p:nvPr>
-            <p:ph type="ftr" sz="quarter" idx="11"/>
-          </p:nvPr>
-        </p:nvSpPr>
-        <p:spPr/>
-        <p:txBody>
-          <a:bodyPr/>
-          <a:lstStyle/>
-          <a:p>
-            <a:endParaRPr lang="en-US"/>
-          </a:p>
-        </p:txBody>
-      </p:sp>
-      <p:sp>
-        <p:nvSpPr>
-          <p:cNvPr id="9" name="Slide Number Placeholder 8">
-            <a:extLst>
-              <a:ext uri="{FF2B5EF4-FFF2-40B4-BE49-F238E27FC236}">
-                <a16:creationId xmlns:a16="http://schemas.microsoft.com/office/drawing/2014/main" id="{CD0E17F8-68BD-DB4C-8B3B-C3AFB55A0137}"/>
-              </a:ext>
-            </a:extLst>
-          </p:cNvPr>
+          <p:cNvPr id="9" name="Slide Number Placeholder 8"/>
           <p:cNvSpPr>
             <a:spLocks noGrp="1"/>
           </p:cNvSpPr>
@@ -1881,13 +2171,18 @@
     </p:spTree>
     <p:extLst>
       <p:ext uri="{BB962C8B-B14F-4D97-AF65-F5344CB8AC3E}">
-        <p14:creationId xmlns:p14="http://schemas.microsoft.com/office/powerpoint/2010/main" val="921777304"/>
+        <p14:creationId xmlns:p14="http://schemas.microsoft.com/office/powerpoint/2010/main" val="1764314519"/>
       </p:ext>
     </p:extLst>
   </p:cSld>
   <p:clrMapOvr>
     <a:masterClrMapping/>
   </p:clrMapOvr>
+  <p:extLst>
+    <p:ext uri="{DCECCB84-F9BA-43D5-87BE-67443E8EF086}">
+      <p15:sldGuideLst xmlns:p15="http://schemas.microsoft.com/office/powerpoint/2012/main"/>
+    </p:ext>
+  </p:extLst>
 </p:sldLayout>
 </file>
 
@@ -1910,13 +2205,7 @@
       </p:grpSpPr>
       <p:sp>
         <p:nvSpPr>
-          <p:cNvPr id="2" name="Title 1">
-            <a:extLst>
-              <a:ext uri="{FF2B5EF4-FFF2-40B4-BE49-F238E27FC236}">
-                <a16:creationId xmlns:a16="http://schemas.microsoft.com/office/drawing/2014/main" id="{D1C22122-BD8A-194F-8F1E-C45CF1681A62}"/>
-              </a:ext>
-            </a:extLst>
-          </p:cNvPr>
+          <p:cNvPr id="2" name="Title 1"/>
           <p:cNvSpPr>
             <a:spLocks noGrp="1"/>
           </p:cNvSpPr>
@@ -1933,18 +2222,13 @@
               <a:rPr lang="en-US"/>
               <a:t>Click to edit Master title style</a:t>
             </a:r>
-          </a:p>
-        </p:txBody>
-      </p:sp>
-      <p:sp>
-        <p:nvSpPr>
-          <p:cNvPr id="3" name="Date Placeholder 2">
-            <a:extLst>
-              <a:ext uri="{FF2B5EF4-FFF2-40B4-BE49-F238E27FC236}">
-                <a16:creationId xmlns:a16="http://schemas.microsoft.com/office/drawing/2014/main" id="{D67E2515-763B-8B41-91A4-1E79792A5F96}"/>
-              </a:ext>
-            </a:extLst>
-          </p:cNvPr>
+            <a:endParaRPr lang="en-US" dirty="0"/>
+          </a:p>
+        </p:txBody>
+      </p:sp>
+      <p:sp>
+        <p:nvSpPr>
+          <p:cNvPr id="3" name="Date Placeholder 2"/>
           <p:cNvSpPr>
             <a:spLocks noGrp="1"/>
           </p:cNvSpPr>
@@ -1959,7 +2243,7 @@
           <a:p>
             <a:fld id="{D858EF06-04DE-9048-AB9F-32A682F238EA}" type="datetimeFigureOut">
               <a:rPr lang="en-US" smtClean="0"/>
-              <a:t>5/7/18</a:t>
+              <a:t>5/8/18</a:t>
             </a:fld>
             <a:endParaRPr lang="en-US"/>
           </a:p>
@@ -1967,13 +2251,7 @@
       </p:sp>
       <p:sp>
         <p:nvSpPr>
-          <p:cNvPr id="4" name="Footer Placeholder 3">
-            <a:extLst>
-              <a:ext uri="{FF2B5EF4-FFF2-40B4-BE49-F238E27FC236}">
-                <a16:creationId xmlns:a16="http://schemas.microsoft.com/office/drawing/2014/main" id="{6D7A8008-B084-864E-B582-F25C5C130328}"/>
-              </a:ext>
-            </a:extLst>
-          </p:cNvPr>
+          <p:cNvPr id="4" name="Footer Placeholder 3"/>
           <p:cNvSpPr>
             <a:spLocks noGrp="1"/>
           </p:cNvSpPr>
@@ -1992,13 +2270,7 @@
       </p:sp>
       <p:sp>
         <p:nvSpPr>
-          <p:cNvPr id="5" name="Slide Number Placeholder 4">
-            <a:extLst>
-              <a:ext uri="{FF2B5EF4-FFF2-40B4-BE49-F238E27FC236}">
-                <a16:creationId xmlns:a16="http://schemas.microsoft.com/office/drawing/2014/main" id="{F2F65D0A-2A6B-754B-8B50-CD5233E0C24E}"/>
-              </a:ext>
-            </a:extLst>
-          </p:cNvPr>
+          <p:cNvPr id="5" name="Slide Number Placeholder 4"/>
           <p:cNvSpPr>
             <a:spLocks noGrp="1"/>
           </p:cNvSpPr>
@@ -2022,7 +2294,7 @@
     </p:spTree>
     <p:extLst>
       <p:ext uri="{BB962C8B-B14F-4D97-AF65-F5344CB8AC3E}">
-        <p14:creationId xmlns:p14="http://schemas.microsoft.com/office/powerpoint/2010/main" val="1295011588"/>
+        <p14:creationId xmlns:p14="http://schemas.microsoft.com/office/powerpoint/2010/main" val="130224823"/>
       </p:ext>
     </p:extLst>
   </p:cSld>
@@ -2051,13 +2323,7 @@
       </p:grpSpPr>
       <p:sp>
         <p:nvSpPr>
-          <p:cNvPr id="2" name="Date Placeholder 1">
-            <a:extLst>
-              <a:ext uri="{FF2B5EF4-FFF2-40B4-BE49-F238E27FC236}">
-                <a16:creationId xmlns:a16="http://schemas.microsoft.com/office/drawing/2014/main" id="{89B25335-70FA-DE41-9600-6DE2289F0BA7}"/>
-              </a:ext>
-            </a:extLst>
-          </p:cNvPr>
+          <p:cNvPr id="2" name="Date Placeholder 1"/>
           <p:cNvSpPr>
             <a:spLocks noGrp="1"/>
           </p:cNvSpPr>
@@ -2072,7 +2338,7 @@
           <a:p>
             <a:fld id="{D858EF06-04DE-9048-AB9F-32A682F238EA}" type="datetimeFigureOut">
               <a:rPr lang="en-US" smtClean="0"/>
-              <a:t>5/7/18</a:t>
+              <a:t>5/8/18</a:t>
             </a:fld>
             <a:endParaRPr lang="en-US"/>
           </a:p>
@@ -2080,13 +2346,7 @@
       </p:sp>
       <p:sp>
         <p:nvSpPr>
-          <p:cNvPr id="3" name="Footer Placeholder 2">
-            <a:extLst>
-              <a:ext uri="{FF2B5EF4-FFF2-40B4-BE49-F238E27FC236}">
-                <a16:creationId xmlns:a16="http://schemas.microsoft.com/office/drawing/2014/main" id="{1B0DAFD2-DD9E-984B-A53F-70B347165DC0}"/>
-              </a:ext>
-            </a:extLst>
-          </p:cNvPr>
+          <p:cNvPr id="3" name="Footer Placeholder 2"/>
           <p:cNvSpPr>
             <a:spLocks noGrp="1"/>
           </p:cNvSpPr>
@@ -2105,13 +2365,7 @@
       </p:sp>
       <p:sp>
         <p:nvSpPr>
-          <p:cNvPr id="4" name="Slide Number Placeholder 3">
-            <a:extLst>
-              <a:ext uri="{FF2B5EF4-FFF2-40B4-BE49-F238E27FC236}">
-                <a16:creationId xmlns:a16="http://schemas.microsoft.com/office/drawing/2014/main" id="{1E2DEE47-D742-5E4A-A5FE-5E0F88F66733}"/>
-              </a:ext>
-            </a:extLst>
-          </p:cNvPr>
+          <p:cNvPr id="4" name="Slide Number Placeholder 3"/>
           <p:cNvSpPr>
             <a:spLocks noGrp="1"/>
           </p:cNvSpPr>
@@ -2135,7 +2389,7 @@
     </p:spTree>
     <p:extLst>
       <p:ext uri="{BB962C8B-B14F-4D97-AF65-F5344CB8AC3E}">
-        <p14:creationId xmlns:p14="http://schemas.microsoft.com/office/powerpoint/2010/main" val="1127597868"/>
+        <p14:creationId xmlns:p14="http://schemas.microsoft.com/office/powerpoint/2010/main" val="2712417021"/>
       </p:ext>
     </p:extLst>
   </p:cSld>
@@ -2146,7 +2400,7 @@
 </file>
 
 <file path=ppt/slideLayouts/slideLayout8.xml><?xml version="1.0" encoding="utf-8"?>
-<p:sldLayout xmlns:a="http://schemas.openxmlformats.org/drawingml/2006/main" xmlns:r="http://schemas.openxmlformats.org/officeDocument/2006/relationships" xmlns:p="http://schemas.openxmlformats.org/presentationml/2006/main" type="objTx" preserve="1">
+<p:sldLayout xmlns:a="http://schemas.openxmlformats.org/drawingml/2006/main" xmlns:r="http://schemas.openxmlformats.org/officeDocument/2006/relationships" xmlns:p="http://schemas.openxmlformats.org/presentationml/2006/main" showMasterSp="0" type="objTx" preserve="1">
   <p:cSld name="Content with Caption">
     <p:spTree>
       <p:nvGrpSpPr>
@@ -2164,13 +2418,45 @@
       </p:grpSpPr>
       <p:sp>
         <p:nvSpPr>
-          <p:cNvPr id="2" name="Title 1">
-            <a:extLst>
-              <a:ext uri="{FF2B5EF4-FFF2-40B4-BE49-F238E27FC236}">
-                <a16:creationId xmlns:a16="http://schemas.microsoft.com/office/drawing/2014/main" id="{32C5304E-76E2-DD4C-92B1-A05D72E15F94}"/>
-              </a:ext>
-            </a:extLst>
-          </p:cNvPr>
+          <p:cNvPr id="8" name="Rectangle 7" title="Background Shape"/>
+          <p:cNvSpPr/>
+          <p:nvPr/>
+        </p:nvSpPr>
+        <p:spPr>
+          <a:xfrm>
+            <a:off x="0" y="376"/>
+            <a:ext cx="5303520" cy="6857624"/>
+          </a:xfrm>
+          <a:prstGeom prst="rect">
+            <a:avLst/>
+          </a:prstGeom>
+          <a:solidFill>
+            <a:schemeClr val="accent1"/>
+          </a:solidFill>
+          <a:ln>
+            <a:noFill/>
+          </a:ln>
+        </p:spPr>
+        <p:style>
+          <a:lnRef idx="2">
+            <a:schemeClr val="accent1">
+              <a:shade val="50000"/>
+            </a:schemeClr>
+          </a:lnRef>
+          <a:fillRef idx="1">
+            <a:schemeClr val="accent1"/>
+          </a:fillRef>
+          <a:effectRef idx="0">
+            <a:schemeClr val="accent1"/>
+          </a:effectRef>
+          <a:fontRef idx="minor">
+            <a:schemeClr val="lt1"/>
+          </a:fontRef>
+        </p:style>
+      </p:sp>
+      <p:sp>
+        <p:nvSpPr>
+          <p:cNvPr id="2" name="Title 1"/>
           <p:cNvSpPr>
             <a:spLocks noGrp="1"/>
           </p:cNvSpPr>
@@ -2180,15 +2466,24 @@
         </p:nvSpPr>
         <p:spPr>
           <a:xfrm>
-            <a:off x="839788" y="457200"/>
-            <a:ext cx="3932237" cy="1600200"/>
-          </a:xfrm>
-        </p:spPr>
-        <p:txBody>
-          <a:bodyPr anchor="b"/>
+            <a:off x="723900" y="685800"/>
+            <a:ext cx="3855720" cy="2157884"/>
+          </a:xfrm>
+        </p:spPr>
+        <p:txBody>
+          <a:bodyPr anchor="t">
+            <a:noAutofit/>
+          </a:bodyPr>
           <a:lstStyle>
             <a:lvl1pPr>
-              <a:defRPr sz="3200"/>
+              <a:lnSpc>
+                <a:spcPct val="84000"/>
+              </a:lnSpc>
+              <a:defRPr sz="4800" baseline="0">
+                <a:solidFill>
+                  <a:schemeClr val="tx2"/>
+                </a:solidFill>
+              </a:defRPr>
             </a:lvl1pPr>
           </a:lstStyle>
           <a:p>
@@ -2196,18 +2491,13 @@
               <a:rPr lang="en-US"/>
               <a:t>Click to edit Master title style</a:t>
             </a:r>
-          </a:p>
-        </p:txBody>
-      </p:sp>
-      <p:sp>
-        <p:nvSpPr>
-          <p:cNvPr id="3" name="Content Placeholder 2">
-            <a:extLst>
-              <a:ext uri="{FF2B5EF4-FFF2-40B4-BE49-F238E27FC236}">
-                <a16:creationId xmlns:a16="http://schemas.microsoft.com/office/drawing/2014/main" id="{E8F939E2-4EB1-1442-BE7F-FC6052C8D4BE}"/>
-              </a:ext>
-            </a:extLst>
-          </p:cNvPr>
+            <a:endParaRPr lang="en-US" dirty="0"/>
+          </a:p>
+        </p:txBody>
+      </p:sp>
+      <p:sp>
+        <p:nvSpPr>
+          <p:cNvPr id="3" name="Content Placeholder 2"/>
           <p:cNvSpPr>
             <a:spLocks noGrp="1"/>
           </p:cNvSpPr>
@@ -2217,39 +2507,39 @@
         </p:nvSpPr>
         <p:spPr>
           <a:xfrm>
-            <a:off x="5183188" y="987425"/>
-            <a:ext cx="6172200" cy="4873625"/>
+            <a:off x="6256020" y="685801"/>
+            <a:ext cx="5212080" cy="5175250"/>
           </a:xfrm>
         </p:spPr>
         <p:txBody>
           <a:bodyPr/>
           <a:lstStyle>
             <a:lvl1pPr>
-              <a:defRPr sz="3200"/>
+              <a:defRPr sz="2000"/>
             </a:lvl1pPr>
             <a:lvl2pPr>
-              <a:defRPr sz="2800"/>
+              <a:defRPr sz="2000"/>
             </a:lvl2pPr>
             <a:lvl3pPr>
-              <a:defRPr sz="2400"/>
+              <a:defRPr sz="1800"/>
             </a:lvl3pPr>
             <a:lvl4pPr>
-              <a:defRPr sz="2000"/>
+              <a:defRPr sz="1800"/>
             </a:lvl4pPr>
             <a:lvl5pPr>
-              <a:defRPr sz="2000"/>
+              <a:defRPr sz="1600"/>
             </a:lvl5pPr>
             <a:lvl6pPr>
-              <a:defRPr sz="2000"/>
+              <a:defRPr sz="1600"/>
             </a:lvl6pPr>
             <a:lvl7pPr>
-              <a:defRPr sz="2000"/>
+              <a:defRPr sz="1600"/>
             </a:lvl7pPr>
             <a:lvl8pPr>
-              <a:defRPr sz="2000"/>
+              <a:defRPr sz="1600"/>
             </a:lvl8pPr>
             <a:lvl9pPr>
-              <a:defRPr sz="2000"/>
+              <a:defRPr sz="1600"/>
             </a:lvl9pPr>
           </a:lstStyle>
           <a:p>
@@ -2286,18 +2576,13 @@
               <a:rPr lang="en-US"/>
               <a:t>Fifth level</a:t>
             </a:r>
-          </a:p>
-        </p:txBody>
-      </p:sp>
-      <p:sp>
-        <p:nvSpPr>
-          <p:cNvPr id="4" name="Text Placeholder 3">
-            <a:extLst>
-              <a:ext uri="{FF2B5EF4-FFF2-40B4-BE49-F238E27FC236}">
-                <a16:creationId xmlns:a16="http://schemas.microsoft.com/office/drawing/2014/main" id="{4C410ADD-5189-A046-8898-389387C370D9}"/>
-              </a:ext>
-            </a:extLst>
-          </p:cNvPr>
+            <a:endParaRPr lang="en-US" dirty="0"/>
+          </a:p>
+        </p:txBody>
+      </p:sp>
+      <p:sp>
+        <p:nvSpPr>
+          <p:cNvPr id="4" name="Text Placeholder 3"/>
           <p:cNvSpPr>
             <a:spLocks noGrp="1"/>
           </p:cNvSpPr>
@@ -2307,14 +2592,23 @@
         </p:nvSpPr>
         <p:spPr>
           <a:xfrm>
-            <a:off x="839788" y="2057400"/>
-            <a:ext cx="3932237" cy="3811588"/>
+            <a:off x="723900" y="2856344"/>
+            <a:ext cx="3855720" cy="3011056"/>
           </a:xfrm>
         </p:spPr>
         <p:txBody>
           <a:bodyPr/>
           <a:lstStyle>
             <a:lvl1pPr marL="0" indent="0">
+              <a:lnSpc>
+                <a:spcPct val="113000"/>
+              </a:lnSpc>
+              <a:spcBef>
+                <a:spcPts val="0"/>
+              </a:spcBef>
+              <a:spcAft>
+                <a:spcPts val="1500"/>
+              </a:spcAft>
               <a:buNone/>
               <a:defRPr sz="1600"/>
             </a:lvl1pPr>
@@ -2362,13 +2656,7 @@
       </p:sp>
       <p:sp>
         <p:nvSpPr>
-          <p:cNvPr id="5" name="Date Placeholder 4">
-            <a:extLst>
-              <a:ext uri="{FF2B5EF4-FFF2-40B4-BE49-F238E27FC236}">
-                <a16:creationId xmlns:a16="http://schemas.microsoft.com/office/drawing/2014/main" id="{1A9E53B0-8734-044D-8C1A-0712C0FA4804}"/>
-              </a:ext>
-            </a:extLst>
-          </p:cNvPr>
+          <p:cNvPr id="5" name="Date Placeholder 4"/>
           <p:cNvSpPr>
             <a:spLocks noGrp="1"/>
           </p:cNvSpPr>
@@ -2376,14 +2664,27 @@
             <p:ph type="dt" sz="half" idx="10"/>
           </p:nvPr>
         </p:nvSpPr>
-        <p:spPr/>
+        <p:spPr>
+          <a:xfrm>
+            <a:off x="723900" y="6453386"/>
+            <a:ext cx="1204572" cy="404614"/>
+          </a:xfrm>
+        </p:spPr>
         <p:txBody>
           <a:bodyPr/>
-          <a:lstStyle/>
+          <a:lstStyle>
+            <a:lvl1pPr>
+              <a:defRPr>
+                <a:solidFill>
+                  <a:schemeClr val="tx2"/>
+                </a:solidFill>
+              </a:defRPr>
+            </a:lvl1pPr>
+          </a:lstStyle>
           <a:p>
             <a:fld id="{D858EF06-04DE-9048-AB9F-32A682F238EA}" type="datetimeFigureOut">
               <a:rPr lang="en-US" smtClean="0"/>
-              <a:t>5/7/18</a:t>
+              <a:t>5/8/18</a:t>
             </a:fld>
             <a:endParaRPr lang="en-US"/>
           </a:p>
@@ -2391,13 +2692,7 @@
       </p:sp>
       <p:sp>
         <p:nvSpPr>
-          <p:cNvPr id="6" name="Footer Placeholder 5">
-            <a:extLst>
-              <a:ext uri="{FF2B5EF4-FFF2-40B4-BE49-F238E27FC236}">
-                <a16:creationId xmlns:a16="http://schemas.microsoft.com/office/drawing/2014/main" id="{0F8C3BA7-38F7-1045-9EEA-1761BF019821}"/>
-              </a:ext>
-            </a:extLst>
-          </p:cNvPr>
+          <p:cNvPr id="6" name="Footer Placeholder 5"/>
           <p:cNvSpPr>
             <a:spLocks noGrp="1"/>
           </p:cNvSpPr>
@@ -2405,10 +2700,23 @@
             <p:ph type="ftr" sz="quarter" idx="11"/>
           </p:nvPr>
         </p:nvSpPr>
-        <p:spPr/>
+        <p:spPr>
+          <a:xfrm>
+            <a:off x="2205945" y="6453386"/>
+            <a:ext cx="2373675" cy="404614"/>
+          </a:xfrm>
+        </p:spPr>
         <p:txBody>
           <a:bodyPr/>
-          <a:lstStyle/>
+          <a:lstStyle>
+            <a:lvl1pPr>
+              <a:defRPr>
+                <a:solidFill>
+                  <a:schemeClr val="tx2"/>
+                </a:solidFill>
+              </a:defRPr>
+            </a:lvl1pPr>
+          </a:lstStyle>
           <a:p>
             <a:endParaRPr lang="en-US"/>
           </a:p>
@@ -2416,13 +2724,7 @@
       </p:sp>
       <p:sp>
         <p:nvSpPr>
-          <p:cNvPr id="7" name="Slide Number Placeholder 6">
-            <a:extLst>
-              <a:ext uri="{FF2B5EF4-FFF2-40B4-BE49-F238E27FC236}">
-                <a16:creationId xmlns:a16="http://schemas.microsoft.com/office/drawing/2014/main" id="{FA8C5DB6-E80B-CD46-B1E5-19CCAC4986B1}"/>
-              </a:ext>
-            </a:extLst>
-          </p:cNvPr>
+          <p:cNvPr id="7" name="Slide Number Placeholder 6"/>
           <p:cNvSpPr>
             <a:spLocks noGrp="1"/>
           </p:cNvSpPr>
@@ -2430,10 +2732,23 @@
             <p:ph type="sldNum" sz="quarter" idx="12"/>
           </p:nvPr>
         </p:nvSpPr>
-        <p:spPr/>
+        <p:spPr>
+          <a:xfrm>
+            <a:off x="9883140" y="6453386"/>
+            <a:ext cx="1596292" cy="404614"/>
+          </a:xfrm>
+        </p:spPr>
         <p:txBody>
           <a:bodyPr/>
-          <a:lstStyle/>
+          <a:lstStyle>
+            <a:lvl1pPr>
+              <a:defRPr>
+                <a:solidFill>
+                  <a:schemeClr val="tx2"/>
+                </a:solidFill>
+              </a:defRPr>
+            </a:lvl1pPr>
+          </a:lstStyle>
           <a:p>
             <a:fld id="{61CA0BAA-152F-944B-B9D5-BB63EA66D2DB}" type="slidenum">
               <a:rPr lang="en-US" smtClean="0"/>
@@ -2443,21 +2758,64 @@
           </a:p>
         </p:txBody>
       </p:sp>
+      <p:sp>
+        <p:nvSpPr>
+          <p:cNvPr id="9" name="Rectangle 8" title="Divider Bar"/>
+          <p:cNvSpPr/>
+          <p:nvPr/>
+        </p:nvSpPr>
+        <p:spPr>
+          <a:xfrm>
+            <a:off x="5303520" y="376"/>
+            <a:ext cx="228600" cy="6858000"/>
+          </a:xfrm>
+          <a:prstGeom prst="rect">
+            <a:avLst/>
+          </a:prstGeom>
+          <a:solidFill>
+            <a:schemeClr val="tx2"/>
+          </a:solidFill>
+          <a:ln>
+            <a:noFill/>
+          </a:ln>
+        </p:spPr>
+        <p:style>
+          <a:lnRef idx="2">
+            <a:schemeClr val="accent1">
+              <a:shade val="50000"/>
+            </a:schemeClr>
+          </a:lnRef>
+          <a:fillRef idx="1">
+            <a:schemeClr val="accent1"/>
+          </a:fillRef>
+          <a:effectRef idx="0">
+            <a:schemeClr val="accent1"/>
+          </a:effectRef>
+          <a:fontRef idx="minor">
+            <a:schemeClr val="lt1"/>
+          </a:fontRef>
+        </p:style>
+      </p:sp>
     </p:spTree>
     <p:extLst>
       <p:ext uri="{BB962C8B-B14F-4D97-AF65-F5344CB8AC3E}">
-        <p14:creationId xmlns:p14="http://schemas.microsoft.com/office/powerpoint/2010/main" val="995422402"/>
+        <p14:creationId xmlns:p14="http://schemas.microsoft.com/office/powerpoint/2010/main" val="654997412"/>
       </p:ext>
     </p:extLst>
   </p:cSld>
   <p:clrMapOvr>
     <a:masterClrMapping/>
   </p:clrMapOvr>
+  <p:extLst>
+    <p:ext uri="{DCECCB84-F9BA-43D5-87BE-67443E8EF086}">
+      <p15:sldGuideLst xmlns:p15="http://schemas.microsoft.com/office/powerpoint/2012/main"/>
+    </p:ext>
+  </p:extLst>
 </p:sldLayout>
 </file>
 
 <file path=ppt/slideLayouts/slideLayout9.xml><?xml version="1.0" encoding="utf-8"?>
-<p:sldLayout xmlns:a="http://schemas.openxmlformats.org/drawingml/2006/main" xmlns:r="http://schemas.openxmlformats.org/officeDocument/2006/relationships" xmlns:p="http://schemas.openxmlformats.org/presentationml/2006/main" type="picTx" preserve="1">
+<p:sldLayout xmlns:a="http://schemas.openxmlformats.org/drawingml/2006/main" xmlns:r="http://schemas.openxmlformats.org/officeDocument/2006/relationships" xmlns:p="http://schemas.openxmlformats.org/presentationml/2006/main" showMasterSp="0" type="picTx" preserve="1">
   <p:cSld name="Picture with Caption">
     <p:spTree>
       <p:nvGrpSpPr>
@@ -2475,13 +2833,45 @@
       </p:grpSpPr>
       <p:sp>
         <p:nvSpPr>
-          <p:cNvPr id="2" name="Title 1">
-            <a:extLst>
-              <a:ext uri="{FF2B5EF4-FFF2-40B4-BE49-F238E27FC236}">
-                <a16:creationId xmlns:a16="http://schemas.microsoft.com/office/drawing/2014/main" id="{47C56F4E-E8C3-644B-8BCD-F430EDB9CD19}"/>
-              </a:ext>
-            </a:extLst>
-          </p:cNvPr>
+          <p:cNvPr id="8" name="Rectangle 7" title="Background Shape"/>
+          <p:cNvSpPr/>
+          <p:nvPr/>
+        </p:nvSpPr>
+        <p:spPr>
+          <a:xfrm>
+            <a:off x="0" y="376"/>
+            <a:ext cx="5303520" cy="6857624"/>
+          </a:xfrm>
+          <a:prstGeom prst="rect">
+            <a:avLst/>
+          </a:prstGeom>
+          <a:solidFill>
+            <a:schemeClr val="accent1"/>
+          </a:solidFill>
+          <a:ln>
+            <a:noFill/>
+          </a:ln>
+        </p:spPr>
+        <p:style>
+          <a:lnRef idx="2">
+            <a:schemeClr val="accent1">
+              <a:shade val="50000"/>
+            </a:schemeClr>
+          </a:lnRef>
+          <a:fillRef idx="1">
+            <a:schemeClr val="accent1"/>
+          </a:fillRef>
+          <a:effectRef idx="0">
+            <a:schemeClr val="accent1"/>
+          </a:effectRef>
+          <a:fontRef idx="minor">
+            <a:schemeClr val="lt1"/>
+          </a:fontRef>
+        </p:style>
+      </p:sp>
+      <p:sp>
+        <p:nvSpPr>
+          <p:cNvPr id="2" name="Title 1"/>
           <p:cNvSpPr>
             <a:spLocks noGrp="1"/>
           </p:cNvSpPr>
@@ -2491,15 +2881,20 @@
         </p:nvSpPr>
         <p:spPr>
           <a:xfrm>
-            <a:off x="839788" y="457200"/>
-            <a:ext cx="3932237" cy="1600200"/>
-          </a:xfrm>
-        </p:spPr>
-        <p:txBody>
-          <a:bodyPr anchor="b"/>
+            <a:off x="723900" y="685800"/>
+            <a:ext cx="3855720" cy="2157884"/>
+          </a:xfrm>
+        </p:spPr>
+        <p:txBody>
+          <a:bodyPr anchor="t">
+            <a:normAutofit/>
+          </a:bodyPr>
           <a:lstStyle>
             <a:lvl1pPr>
-              <a:defRPr sz="3200"/>
+              <a:lnSpc>
+                <a:spcPct val="84000"/>
+              </a:lnSpc>
+              <a:defRPr sz="4800" baseline="0"/>
             </a:lvl1pPr>
           </a:lstStyle>
           <a:p>
@@ -2507,20 +2902,15 @@
               <a:rPr lang="en-US"/>
               <a:t>Click to edit Master title style</a:t>
             </a:r>
-          </a:p>
-        </p:txBody>
-      </p:sp>
-      <p:sp>
-        <p:nvSpPr>
-          <p:cNvPr id="3" name="Picture Placeholder 2">
-            <a:extLst>
-              <a:ext uri="{FF2B5EF4-FFF2-40B4-BE49-F238E27FC236}">
-                <a16:creationId xmlns:a16="http://schemas.microsoft.com/office/drawing/2014/main" id="{AE7C9964-9782-A345-9363-FDF5F5464A3B}"/>
-              </a:ext>
-            </a:extLst>
-          </p:cNvPr>
-          <p:cNvSpPr>
-            <a:spLocks noGrp="1"/>
+            <a:endParaRPr lang="en-US" dirty="0"/>
+          </a:p>
+        </p:txBody>
+      </p:sp>
+      <p:sp>
+        <p:nvSpPr>
+          <p:cNvPr id="3" name="Picture Placeholder 2"/>
+          <p:cNvSpPr>
+            <a:spLocks noGrp="1" noChangeAspect="1"/>
           </p:cNvSpPr>
           <p:nvPr>
             <p:ph type="pic" idx="1"/>
@@ -2528,81 +2918,90 @@
         </p:nvSpPr>
         <p:spPr>
           <a:xfrm>
-            <a:off x="5183188" y="987425"/>
-            <a:ext cx="6172200" cy="4873625"/>
+            <a:off x="5532120" y="0"/>
+            <a:ext cx="6659880" cy="6857999"/>
+          </a:xfrm>
+        </p:spPr>
+        <p:txBody>
+          <a:bodyPr anchor="t">
+            <a:normAutofit/>
+          </a:bodyPr>
+          <a:lstStyle>
+            <a:lvl1pPr marL="0" indent="0">
+              <a:buNone/>
+              <a:defRPr sz="2000"/>
+            </a:lvl1pPr>
+            <a:lvl2pPr marL="457200" indent="0">
+              <a:buNone/>
+              <a:defRPr sz="2000"/>
+            </a:lvl2pPr>
+            <a:lvl3pPr marL="914400" indent="0">
+              <a:buNone/>
+              <a:defRPr sz="2000"/>
+            </a:lvl3pPr>
+            <a:lvl4pPr marL="1371600" indent="0">
+              <a:buNone/>
+              <a:defRPr sz="2000"/>
+            </a:lvl4pPr>
+            <a:lvl5pPr marL="1828800" indent="0">
+              <a:buNone/>
+              <a:defRPr sz="2000"/>
+            </a:lvl5pPr>
+            <a:lvl6pPr marL="2286000" indent="0">
+              <a:buNone/>
+              <a:defRPr sz="2000"/>
+            </a:lvl6pPr>
+            <a:lvl7pPr marL="2743200" indent="0">
+              <a:buNone/>
+              <a:defRPr sz="2000"/>
+            </a:lvl7pPr>
+            <a:lvl8pPr marL="3200400" indent="0">
+              <a:buNone/>
+              <a:defRPr sz="2000"/>
+            </a:lvl8pPr>
+            <a:lvl9pPr marL="3657600" indent="0">
+              <a:buNone/>
+              <a:defRPr sz="2000"/>
+            </a:lvl9pPr>
+          </a:lstStyle>
+          <a:p>
+            <a:r>
+              <a:rPr lang="en-US"/>
+              <a:t>Click icon to add picture</a:t>
+            </a:r>
+            <a:endParaRPr lang="en-US" dirty="0"/>
+          </a:p>
+        </p:txBody>
+      </p:sp>
+      <p:sp>
+        <p:nvSpPr>
+          <p:cNvPr id="4" name="Text Placeholder 3"/>
+          <p:cNvSpPr>
+            <a:spLocks noGrp="1"/>
+          </p:cNvSpPr>
+          <p:nvPr>
+            <p:ph type="body" sz="half" idx="2"/>
+          </p:nvPr>
+        </p:nvSpPr>
+        <p:spPr>
+          <a:xfrm>
+            <a:off x="723900" y="2855968"/>
+            <a:ext cx="3855720" cy="3011432"/>
           </a:xfrm>
         </p:spPr>
         <p:txBody>
           <a:bodyPr/>
           <a:lstStyle>
             <a:lvl1pPr marL="0" indent="0">
-              <a:buNone/>
-              <a:defRPr sz="3200"/>
-            </a:lvl1pPr>
-            <a:lvl2pPr marL="457200" indent="0">
-              <a:buNone/>
-              <a:defRPr sz="2800"/>
-            </a:lvl2pPr>
-            <a:lvl3pPr marL="914400" indent="0">
-              <a:buNone/>
-              <a:defRPr sz="2400"/>
-            </a:lvl3pPr>
-            <a:lvl4pPr marL="1371600" indent="0">
-              <a:buNone/>
-              <a:defRPr sz="2000"/>
-            </a:lvl4pPr>
-            <a:lvl5pPr marL="1828800" indent="0">
-              <a:buNone/>
-              <a:defRPr sz="2000"/>
-            </a:lvl5pPr>
-            <a:lvl6pPr marL="2286000" indent="0">
-              <a:buNone/>
-              <a:defRPr sz="2000"/>
-            </a:lvl6pPr>
-            <a:lvl7pPr marL="2743200" indent="0">
-              <a:buNone/>
-              <a:defRPr sz="2000"/>
-            </a:lvl7pPr>
-            <a:lvl8pPr marL="3200400" indent="0">
-              <a:buNone/>
-              <a:defRPr sz="2000"/>
-            </a:lvl8pPr>
-            <a:lvl9pPr marL="3657600" indent="0">
-              <a:buNone/>
-              <a:defRPr sz="2000"/>
-            </a:lvl9pPr>
-          </a:lstStyle>
-          <a:p>
-            <a:endParaRPr lang="en-US"/>
-          </a:p>
-        </p:txBody>
-      </p:sp>
-      <p:sp>
-        <p:nvSpPr>
-          <p:cNvPr id="4" name="Text Placeholder 3">
-            <a:extLst>
-              <a:ext uri="{FF2B5EF4-FFF2-40B4-BE49-F238E27FC236}">
-                <a16:creationId xmlns:a16="http://schemas.microsoft.com/office/drawing/2014/main" id="{2FDCAE2D-2571-DB43-9BE5-9E5A7BDEE9AD}"/>
-              </a:ext>
-            </a:extLst>
-          </p:cNvPr>
-          <p:cNvSpPr>
-            <a:spLocks noGrp="1"/>
-          </p:cNvSpPr>
-          <p:nvPr>
-            <p:ph type="body" sz="half" idx="2"/>
-          </p:nvPr>
-        </p:nvSpPr>
-        <p:spPr>
-          <a:xfrm>
-            <a:off x="839788" y="2057400"/>
-            <a:ext cx="3932237" cy="3811588"/>
-          </a:xfrm>
-        </p:spPr>
-        <p:txBody>
-          <a:bodyPr/>
-          <a:lstStyle>
-            <a:lvl1pPr marL="0" indent="0">
+              <a:lnSpc>
+                <a:spcPct val="113000"/>
+              </a:lnSpc>
+              <a:spcBef>
+                <a:spcPts val="0"/>
+              </a:spcBef>
+              <a:spcAft>
+                <a:spcPts val="1500"/>
+              </a:spcAft>
               <a:buNone/>
               <a:defRPr sz="1600"/>
             </a:lvl1pPr>
@@ -2650,13 +3049,7 @@
       </p:sp>
       <p:sp>
         <p:nvSpPr>
-          <p:cNvPr id="5" name="Date Placeholder 4">
-            <a:extLst>
-              <a:ext uri="{FF2B5EF4-FFF2-40B4-BE49-F238E27FC236}">
-                <a16:creationId xmlns:a16="http://schemas.microsoft.com/office/drawing/2014/main" id="{A4936926-3FBD-E14E-AF61-F6040A6B56F6}"/>
-              </a:ext>
-            </a:extLst>
-          </p:cNvPr>
+          <p:cNvPr id="5" name="Date Placeholder 4"/>
           <p:cNvSpPr>
             <a:spLocks noGrp="1"/>
           </p:cNvSpPr>
@@ -2664,14 +3057,27 @@
             <p:ph type="dt" sz="half" idx="10"/>
           </p:nvPr>
         </p:nvSpPr>
-        <p:spPr/>
+        <p:spPr>
+          <a:xfrm>
+            <a:off x="723900" y="6453386"/>
+            <a:ext cx="1204572" cy="404614"/>
+          </a:xfrm>
+        </p:spPr>
         <p:txBody>
           <a:bodyPr/>
-          <a:lstStyle/>
+          <a:lstStyle>
+            <a:lvl1pPr>
+              <a:defRPr>
+                <a:solidFill>
+                  <a:schemeClr val="tx2"/>
+                </a:solidFill>
+              </a:defRPr>
+            </a:lvl1pPr>
+          </a:lstStyle>
           <a:p>
             <a:fld id="{D858EF06-04DE-9048-AB9F-32A682F238EA}" type="datetimeFigureOut">
               <a:rPr lang="en-US" smtClean="0"/>
-              <a:t>5/7/18</a:t>
+              <a:t>5/8/18</a:t>
             </a:fld>
             <a:endParaRPr lang="en-US"/>
           </a:p>
@@ -2679,13 +3085,7 @@
       </p:sp>
       <p:sp>
         <p:nvSpPr>
-          <p:cNvPr id="6" name="Footer Placeholder 5">
-            <a:extLst>
-              <a:ext uri="{FF2B5EF4-FFF2-40B4-BE49-F238E27FC236}">
-                <a16:creationId xmlns:a16="http://schemas.microsoft.com/office/drawing/2014/main" id="{CDBB506C-4811-674A-B9F5-067E0EEF4A84}"/>
-              </a:ext>
-            </a:extLst>
-          </p:cNvPr>
+          <p:cNvPr id="6" name="Footer Placeholder 5"/>
           <p:cNvSpPr>
             <a:spLocks noGrp="1"/>
           </p:cNvSpPr>
@@ -2693,24 +3093,31 @@
             <p:ph type="ftr" sz="quarter" idx="11"/>
           </p:nvPr>
         </p:nvSpPr>
-        <p:spPr/>
+        <p:spPr>
+          <a:xfrm>
+            <a:off x="2205945" y="6453386"/>
+            <a:ext cx="2373675" cy="404614"/>
+          </a:xfrm>
+        </p:spPr>
         <p:txBody>
           <a:bodyPr/>
-          <a:lstStyle/>
-          <a:p>
-            <a:endParaRPr lang="en-US"/>
-          </a:p>
-        </p:txBody>
-      </p:sp>
-      <p:sp>
-        <p:nvSpPr>
-          <p:cNvPr id="7" name="Slide Number Placeholder 6">
-            <a:extLst>
-              <a:ext uri="{FF2B5EF4-FFF2-40B4-BE49-F238E27FC236}">
-                <a16:creationId xmlns:a16="http://schemas.microsoft.com/office/drawing/2014/main" id="{F648455C-7D95-F74A-B0B3-EB92CD2E60FA}"/>
-              </a:ext>
-            </a:extLst>
-          </p:cNvPr>
+          <a:lstStyle>
+            <a:lvl1pPr>
+              <a:defRPr>
+                <a:solidFill>
+                  <a:schemeClr val="tx2"/>
+                </a:solidFill>
+              </a:defRPr>
+            </a:lvl1pPr>
+          </a:lstStyle>
+          <a:p>
+            <a:endParaRPr lang="en-US" dirty="0"/>
+          </a:p>
+        </p:txBody>
+      </p:sp>
+      <p:sp>
+        <p:nvSpPr>
+          <p:cNvPr id="7" name="Slide Number Placeholder 6"/>
           <p:cNvSpPr>
             <a:spLocks noGrp="1"/>
           </p:cNvSpPr>
@@ -2718,10 +3125,23 @@
             <p:ph type="sldNum" sz="quarter" idx="12"/>
           </p:nvPr>
         </p:nvSpPr>
-        <p:spPr/>
+        <p:spPr>
+          <a:xfrm>
+            <a:off x="9883140" y="6453386"/>
+            <a:ext cx="1596292" cy="404614"/>
+          </a:xfrm>
+        </p:spPr>
         <p:txBody>
           <a:bodyPr/>
-          <a:lstStyle/>
+          <a:lstStyle>
+            <a:lvl1pPr>
+              <a:defRPr>
+                <a:solidFill>
+                  <a:schemeClr val="tx2"/>
+                </a:solidFill>
+              </a:defRPr>
+            </a:lvl1pPr>
+          </a:lstStyle>
           <a:p>
             <a:fld id="{61CA0BAA-152F-944B-B9D5-BB63EA66D2DB}" type="slidenum">
               <a:rPr lang="en-US" smtClean="0"/>
@@ -2731,10 +3151,48 @@
           </a:p>
         </p:txBody>
       </p:sp>
+      <p:sp>
+        <p:nvSpPr>
+          <p:cNvPr id="9" name="Rectangle 8" title="Divider Bar"/>
+          <p:cNvSpPr/>
+          <p:nvPr/>
+        </p:nvSpPr>
+        <p:spPr>
+          <a:xfrm>
+            <a:off x="5303520" y="376"/>
+            <a:ext cx="228600" cy="6858000"/>
+          </a:xfrm>
+          <a:prstGeom prst="rect">
+            <a:avLst/>
+          </a:prstGeom>
+          <a:solidFill>
+            <a:schemeClr val="tx2"/>
+          </a:solidFill>
+          <a:ln>
+            <a:noFill/>
+          </a:ln>
+        </p:spPr>
+        <p:style>
+          <a:lnRef idx="2">
+            <a:schemeClr val="accent1">
+              <a:shade val="50000"/>
+            </a:schemeClr>
+          </a:lnRef>
+          <a:fillRef idx="1">
+            <a:schemeClr val="accent1"/>
+          </a:fillRef>
+          <a:effectRef idx="0">
+            <a:schemeClr val="accent1"/>
+          </a:effectRef>
+          <a:fontRef idx="minor">
+            <a:schemeClr val="lt1"/>
+          </a:fontRef>
+        </p:style>
+      </p:sp>
     </p:spTree>
     <p:extLst>
       <p:ext uri="{BB962C8B-B14F-4D97-AF65-F5344CB8AC3E}">
-        <p14:creationId xmlns:p14="http://schemas.microsoft.com/office/powerpoint/2010/main" val="3924635267"/>
+        <p14:creationId xmlns:p14="http://schemas.microsoft.com/office/powerpoint/2010/main" val="110122253"/>
       </p:ext>
     </p:extLst>
   </p:cSld>
@@ -2748,9 +3206,12 @@
 <p:sldMaster xmlns:a="http://schemas.openxmlformats.org/drawingml/2006/main" xmlns:r="http://schemas.openxmlformats.org/officeDocument/2006/relationships" xmlns:p="http://schemas.openxmlformats.org/presentationml/2006/main">
   <p:cSld>
     <p:bg>
-      <p:bgRef idx="1001">
-        <a:schemeClr val="bg1"/>
-      </p:bgRef>
+      <p:bgPr>
+        <a:solidFill>
+          <a:schemeClr val="bg2"/>
+        </a:solidFill>
+        <a:effectLst/>
+      </p:bgPr>
     </p:bg>
     <p:spTree>
       <p:nvGrpSpPr>
@@ -2768,13 +3229,7 @@
       </p:grpSpPr>
       <p:sp>
         <p:nvSpPr>
-          <p:cNvPr id="2" name="Title Placeholder 1">
-            <a:extLst>
-              <a:ext uri="{FF2B5EF4-FFF2-40B4-BE49-F238E27FC236}">
-                <a16:creationId xmlns:a16="http://schemas.microsoft.com/office/drawing/2014/main" id="{98970E97-F551-E648-9C97-37E907318148}"/>
-              </a:ext>
-            </a:extLst>
-          </p:cNvPr>
+          <p:cNvPr id="2" name="Title Placeholder 1"/>
           <p:cNvSpPr>
             <a:spLocks noGrp="1"/>
           </p:cNvSpPr>
@@ -2784,15 +3239,15 @@
         </p:nvSpPr>
         <p:spPr>
           <a:xfrm>
-            <a:off x="838200" y="365125"/>
-            <a:ext cx="10515600" cy="1325563"/>
+            <a:off x="1371600" y="685800"/>
+            <a:ext cx="9601200" cy="1485900"/>
           </a:xfrm>
           <a:prstGeom prst="rect">
             <a:avLst/>
           </a:prstGeom>
         </p:spPr>
         <p:txBody>
-          <a:bodyPr vert="horz" lIns="91440" tIns="45720" rIns="91440" bIns="45720" rtlCol="0" anchor="ctr">
+          <a:bodyPr vert="horz" lIns="91440" tIns="45720" rIns="91440" bIns="45720" rtlCol="0" anchor="t">
             <a:normAutofit/>
           </a:bodyPr>
           <a:lstStyle/>
@@ -2801,18 +3256,13 @@
               <a:rPr lang="en-US"/>
               <a:t>Click to edit Master title style</a:t>
             </a:r>
-          </a:p>
-        </p:txBody>
-      </p:sp>
-      <p:sp>
-        <p:nvSpPr>
-          <p:cNvPr id="3" name="Text Placeholder 2">
-            <a:extLst>
-              <a:ext uri="{FF2B5EF4-FFF2-40B4-BE49-F238E27FC236}">
-                <a16:creationId xmlns:a16="http://schemas.microsoft.com/office/drawing/2014/main" id="{A9628787-6E58-9441-BC98-22A1099FC356}"/>
-              </a:ext>
-            </a:extLst>
-          </p:cNvPr>
+            <a:endParaRPr lang="en-US" dirty="0"/>
+          </a:p>
+        </p:txBody>
+      </p:sp>
+      <p:sp>
+        <p:nvSpPr>
+          <p:cNvPr id="3" name="Text Placeholder 2"/>
           <p:cNvSpPr>
             <a:spLocks noGrp="1"/>
           </p:cNvSpPr>
@@ -2822,8 +3272,8 @@
         </p:nvSpPr>
         <p:spPr>
           <a:xfrm>
-            <a:off x="838200" y="1825625"/>
-            <a:ext cx="10515600" cy="4351338"/>
+            <a:off x="1371600" y="2286000"/>
+            <a:ext cx="9601200" cy="3581400"/>
           </a:xfrm>
           <a:prstGeom prst="rect">
             <a:avLst/>
@@ -2868,18 +3318,13 @@
               <a:rPr lang="en-US"/>
               <a:t>Fifth level</a:t>
             </a:r>
-          </a:p>
-        </p:txBody>
-      </p:sp>
-      <p:sp>
-        <p:nvSpPr>
-          <p:cNvPr id="4" name="Date Placeholder 3">
-            <a:extLst>
-              <a:ext uri="{FF2B5EF4-FFF2-40B4-BE49-F238E27FC236}">
-                <a16:creationId xmlns:a16="http://schemas.microsoft.com/office/drawing/2014/main" id="{0614E455-E447-9A4A-ACF7-BED3A5C5E3C5}"/>
-              </a:ext>
-            </a:extLst>
-          </p:cNvPr>
+            <a:endParaRPr lang="en-US" dirty="0"/>
+          </a:p>
+        </p:txBody>
+      </p:sp>
+      <p:sp>
+        <p:nvSpPr>
+          <p:cNvPr id="4" name="Date Placeholder 3"/>
           <p:cNvSpPr>
             <a:spLocks noGrp="1"/>
           </p:cNvSpPr>
@@ -2889,8 +3334,8 @@
         </p:nvSpPr>
         <p:spPr>
           <a:xfrm>
-            <a:off x="838200" y="6356350"/>
-            <a:ext cx="2743200" cy="365125"/>
+            <a:off x="1390650" y="6453386"/>
+            <a:ext cx="1204572" cy="404614"/>
           </a:xfrm>
           <a:prstGeom prst="rect">
             <a:avLst/>
@@ -2900,11 +3345,9 @@
           <a:bodyPr vert="horz" lIns="91440" tIns="45720" rIns="91440" bIns="45720" rtlCol="0" anchor="ctr"/>
           <a:lstStyle>
             <a:lvl1pPr algn="l">
-              <a:defRPr sz="1200">
+              <a:defRPr sz="1200" baseline="0">
                 <a:solidFill>
-                  <a:schemeClr val="tx1">
-                    <a:tint val="75000"/>
-                  </a:schemeClr>
+                  <a:schemeClr val="tx2"/>
                 </a:solidFill>
               </a:defRPr>
             </a:lvl1pPr>
@@ -2912,7 +3355,7 @@
           <a:p>
             <a:fld id="{D858EF06-04DE-9048-AB9F-32A682F238EA}" type="datetimeFigureOut">
               <a:rPr lang="en-US" smtClean="0"/>
-              <a:t>5/7/18</a:t>
+              <a:t>5/8/18</a:t>
             </a:fld>
             <a:endParaRPr lang="en-US"/>
           </a:p>
@@ -2920,13 +3363,7 @@
       </p:sp>
       <p:sp>
         <p:nvSpPr>
-          <p:cNvPr id="5" name="Footer Placeholder 4">
-            <a:extLst>
-              <a:ext uri="{FF2B5EF4-FFF2-40B4-BE49-F238E27FC236}">
-                <a16:creationId xmlns:a16="http://schemas.microsoft.com/office/drawing/2014/main" id="{61D2B9B3-33AB-F446-82B4-66D2C98B377A}"/>
-              </a:ext>
-            </a:extLst>
-          </p:cNvPr>
+          <p:cNvPr id="5" name="Footer Placeholder 4"/>
           <p:cNvSpPr>
             <a:spLocks noGrp="1"/>
           </p:cNvSpPr>
@@ -2936,8 +3373,8 @@
         </p:nvSpPr>
         <p:spPr>
           <a:xfrm>
-            <a:off x="4038600" y="6356350"/>
-            <a:ext cx="4114800" cy="365125"/>
+            <a:off x="2893564" y="6453386"/>
+            <a:ext cx="6280830" cy="404614"/>
           </a:xfrm>
           <a:prstGeom prst="rect">
             <a:avLst/>
@@ -2946,12 +3383,10 @@
         <p:txBody>
           <a:bodyPr vert="horz" lIns="91440" tIns="45720" rIns="91440" bIns="45720" rtlCol="0" anchor="ctr"/>
           <a:lstStyle>
-            <a:lvl1pPr algn="ctr">
-              <a:defRPr sz="1200">
+            <a:lvl1pPr algn="l">
+              <a:defRPr sz="1200" baseline="0">
                 <a:solidFill>
-                  <a:schemeClr val="tx1">
-                    <a:tint val="75000"/>
-                  </a:schemeClr>
+                  <a:schemeClr val="tx2"/>
                 </a:solidFill>
               </a:defRPr>
             </a:lvl1pPr>
@@ -2963,13 +3398,7 @@
       </p:sp>
       <p:sp>
         <p:nvSpPr>
-          <p:cNvPr id="6" name="Slide Number Placeholder 5">
-            <a:extLst>
-              <a:ext uri="{FF2B5EF4-FFF2-40B4-BE49-F238E27FC236}">
-                <a16:creationId xmlns:a16="http://schemas.microsoft.com/office/drawing/2014/main" id="{52B9C9BC-2EFA-E044-9034-FEE7BE41F503}"/>
-              </a:ext>
-            </a:extLst>
-          </p:cNvPr>
+          <p:cNvPr id="6" name="Slide Number Placeholder 5"/>
           <p:cNvSpPr>
             <a:spLocks noGrp="1"/>
           </p:cNvSpPr>
@@ -2979,8 +3408,8 @@
         </p:nvSpPr>
         <p:spPr>
           <a:xfrm>
-            <a:off x="8610600" y="6356350"/>
-            <a:ext cx="2743200" cy="365125"/>
+            <a:off x="9472736" y="6453386"/>
+            <a:ext cx="1596292" cy="404614"/>
           </a:xfrm>
           <a:prstGeom prst="rect">
             <a:avLst/>
@@ -2990,11 +3419,9 @@
           <a:bodyPr vert="horz" lIns="91440" tIns="45720" rIns="91440" bIns="45720" rtlCol="0" anchor="ctr"/>
           <a:lstStyle>
             <a:lvl1pPr algn="r">
-              <a:defRPr sz="1200">
+              <a:defRPr sz="1200" baseline="0">
                 <a:solidFill>
-                  <a:schemeClr val="tx1">
-                    <a:tint val="75000"/>
-                  </a:schemeClr>
+                  <a:schemeClr val="tx2"/>
                 </a:solidFill>
               </a:defRPr>
             </a:lvl1pPr>
@@ -3008,40 +3435,78 @@
           </a:p>
         </p:txBody>
       </p:sp>
+      <p:sp>
+        <p:nvSpPr>
+          <p:cNvPr id="9" name="Rectangle 8" title="Side bar"/>
+          <p:cNvSpPr/>
+          <p:nvPr/>
+        </p:nvSpPr>
+        <p:spPr>
+          <a:xfrm>
+            <a:off x="478095" y="376"/>
+            <a:ext cx="228600" cy="6858000"/>
+          </a:xfrm>
+          <a:prstGeom prst="rect">
+            <a:avLst/>
+          </a:prstGeom>
+          <a:solidFill>
+            <a:schemeClr val="tx2"/>
+          </a:solidFill>
+          <a:ln>
+            <a:noFill/>
+          </a:ln>
+        </p:spPr>
+        <p:style>
+          <a:lnRef idx="2">
+            <a:schemeClr val="accent1">
+              <a:shade val="50000"/>
+            </a:schemeClr>
+          </a:lnRef>
+          <a:fillRef idx="1">
+            <a:schemeClr val="accent1"/>
+          </a:fillRef>
+          <a:effectRef idx="0">
+            <a:schemeClr val="accent1"/>
+          </a:effectRef>
+          <a:fontRef idx="minor">
+            <a:schemeClr val="lt1"/>
+          </a:fontRef>
+        </p:style>
+      </p:sp>
     </p:spTree>
     <p:extLst>
       <p:ext uri="{BB962C8B-B14F-4D97-AF65-F5344CB8AC3E}">
-        <p14:creationId xmlns:p14="http://schemas.microsoft.com/office/powerpoint/2010/main" val="4161515110"/>
+        <p14:creationId xmlns:p14="http://schemas.microsoft.com/office/powerpoint/2010/main" val="3897348069"/>
       </p:ext>
     </p:extLst>
   </p:cSld>
   <p:clrMap bg1="lt1" tx1="dk1" bg2="lt2" tx2="dk2" accent1="accent1" accent2="accent2" accent3="accent3" accent4="accent4" accent5="accent5" accent6="accent6" hlink="hlink" folHlink="folHlink"/>
   <p:sldLayoutIdLst>
-    <p:sldLayoutId id="2147483649" r:id="rId1"/>
-    <p:sldLayoutId id="2147483650" r:id="rId2"/>
-    <p:sldLayoutId id="2147483651" r:id="rId3"/>
-    <p:sldLayoutId id="2147483652" r:id="rId4"/>
-    <p:sldLayoutId id="2147483653" r:id="rId5"/>
-    <p:sldLayoutId id="2147483654" r:id="rId6"/>
-    <p:sldLayoutId id="2147483655" r:id="rId7"/>
-    <p:sldLayoutId id="2147483656" r:id="rId8"/>
-    <p:sldLayoutId id="2147483657" r:id="rId9"/>
-    <p:sldLayoutId id="2147483658" r:id="rId10"/>
-    <p:sldLayoutId id="2147483659" r:id="rId11"/>
+    <p:sldLayoutId id="2147484282" r:id="rId1"/>
+    <p:sldLayoutId id="2147484283" r:id="rId2"/>
+    <p:sldLayoutId id="2147484284" r:id="rId3"/>
+    <p:sldLayoutId id="2147484285" r:id="rId4"/>
+    <p:sldLayoutId id="2147484286" r:id="rId5"/>
+    <p:sldLayoutId id="2147484287" r:id="rId6"/>
+    <p:sldLayoutId id="2147484288" r:id="rId7"/>
+    <p:sldLayoutId id="2147484289" r:id="rId8"/>
+    <p:sldLayoutId id="2147484290" r:id="rId9"/>
+    <p:sldLayoutId id="2147484291" r:id="rId10"/>
+    <p:sldLayoutId id="2147484292" r:id="rId11"/>
   </p:sldLayoutIdLst>
   <p:txStyles>
     <p:titleStyle>
       <a:lvl1pPr algn="l" defTabSz="914400" rtl="0" eaLnBrk="1" latinLnBrk="0" hangingPunct="1">
         <a:lnSpc>
-          <a:spcPct val="90000"/>
+          <a:spcPct val="89000"/>
         </a:lnSpc>
         <a:spcBef>
           <a:spcPct val="0"/>
         </a:spcBef>
         <a:buNone/>
-        <a:defRPr sz="4400" kern="1200">
+        <a:defRPr sz="4400" kern="1200" baseline="0">
           <a:solidFill>
-            <a:schemeClr val="tx1"/>
+            <a:schemeClr val="tx2"/>
           </a:solidFill>
           <a:latin typeface="+mj-lt"/>
           <a:ea typeface="+mj-ea"/>
@@ -3050,162 +3515,189 @@
       </a:lvl1pPr>
     </p:titleStyle>
     <p:bodyStyle>
-      <a:lvl1pPr marL="228600" indent="-228600" algn="l" defTabSz="914400" rtl="0" eaLnBrk="1" latinLnBrk="0" hangingPunct="1">
+      <a:lvl1pPr marL="384048" indent="-384048" algn="l" defTabSz="914400" rtl="0" eaLnBrk="1" latinLnBrk="0" hangingPunct="1">
         <a:lnSpc>
-          <a:spcPct val="90000"/>
+          <a:spcPct val="94000"/>
         </a:lnSpc>
         <a:spcBef>
           <a:spcPts val="1000"/>
         </a:spcBef>
-        <a:buFont typeface="Arial" panose="020B0604020202020204" pitchFamily="34" charset="0"/>
-        <a:buChar char="•"/>
-        <a:defRPr sz="2800" kern="1200">
+        <a:spcAft>
+          <a:spcPts val="200"/>
+        </a:spcAft>
+        <a:buFont typeface="Franklin Gothic Book" panose="020B0503020102020204" pitchFamily="34" charset="0"/>
+        <a:buChar char="■"/>
+        <a:defRPr sz="2000" kern="1200" baseline="0">
           <a:solidFill>
-            <a:schemeClr val="tx1"/>
+            <a:schemeClr val="tx2"/>
           </a:solidFill>
           <a:latin typeface="+mn-lt"/>
           <a:ea typeface="+mn-ea"/>
           <a:cs typeface="+mn-cs"/>
         </a:defRPr>
       </a:lvl1pPr>
-      <a:lvl2pPr marL="685800" indent="-228600" algn="l" defTabSz="914400" rtl="0" eaLnBrk="1" latinLnBrk="0" hangingPunct="1">
+      <a:lvl2pPr marL="914400" indent="-384048" algn="l" defTabSz="914400" rtl="0" eaLnBrk="1" latinLnBrk="0" hangingPunct="1">
         <a:lnSpc>
-          <a:spcPct val="90000"/>
+          <a:spcPct val="94000"/>
         </a:lnSpc>
         <a:spcBef>
           <a:spcPts val="500"/>
         </a:spcBef>
-        <a:buFont typeface="Arial" panose="020B0604020202020204" pitchFamily="34" charset="0"/>
-        <a:buChar char="•"/>
-        <a:defRPr sz="2400" kern="1200">
+        <a:spcAft>
+          <a:spcPts val="200"/>
+        </a:spcAft>
+        <a:buFont typeface="Franklin Gothic Book" panose="020B0503020102020204" pitchFamily="34" charset="0"/>
+        <a:buChar char="–"/>
+        <a:defRPr sz="2000" i="1" kern="1200" baseline="0">
           <a:solidFill>
-            <a:schemeClr val="tx1"/>
+            <a:schemeClr val="tx2"/>
           </a:solidFill>
           <a:latin typeface="+mn-lt"/>
           <a:ea typeface="+mn-ea"/>
           <a:cs typeface="+mn-cs"/>
         </a:defRPr>
       </a:lvl2pPr>
-      <a:lvl3pPr marL="1143000" indent="-228600" algn="l" defTabSz="914400" rtl="0" eaLnBrk="1" latinLnBrk="0" hangingPunct="1">
+      <a:lvl3pPr marL="1371600" indent="-384048" algn="l" defTabSz="914400" rtl="0" eaLnBrk="1" latinLnBrk="0" hangingPunct="1">
         <a:lnSpc>
-          <a:spcPct val="90000"/>
+          <a:spcPct val="94000"/>
         </a:lnSpc>
         <a:spcBef>
           <a:spcPts val="500"/>
         </a:spcBef>
-        <a:buFont typeface="Arial" panose="020B0604020202020204" pitchFamily="34" charset="0"/>
-        <a:buChar char="•"/>
-        <a:defRPr sz="2000" kern="1200">
+        <a:spcAft>
+          <a:spcPts val="200"/>
+        </a:spcAft>
+        <a:buFont typeface="Franklin Gothic Book" panose="020B0503020102020204" pitchFamily="34" charset="0"/>
+        <a:buChar char="■"/>
+        <a:defRPr sz="1800" kern="1200" baseline="0">
           <a:solidFill>
-            <a:schemeClr val="tx1"/>
+            <a:schemeClr val="tx2"/>
           </a:solidFill>
           <a:latin typeface="+mn-lt"/>
           <a:ea typeface="+mn-ea"/>
           <a:cs typeface="+mn-cs"/>
         </a:defRPr>
       </a:lvl3pPr>
-      <a:lvl4pPr marL="1600200" indent="-228600" algn="l" defTabSz="914400" rtl="0" eaLnBrk="1" latinLnBrk="0" hangingPunct="1">
+      <a:lvl4pPr marL="1828800" indent="-384048" algn="l" defTabSz="914400" rtl="0" eaLnBrk="1" latinLnBrk="0" hangingPunct="1">
         <a:lnSpc>
-          <a:spcPct val="90000"/>
+          <a:spcPct val="94000"/>
         </a:lnSpc>
         <a:spcBef>
           <a:spcPts val="500"/>
         </a:spcBef>
-        <a:buFont typeface="Arial" panose="020B0604020202020204" pitchFamily="34" charset="0"/>
-        <a:buChar char="•"/>
-        <a:defRPr sz="1800" kern="1200">
+        <a:spcAft>
+          <a:spcPts val="200"/>
+        </a:spcAft>
+        <a:buFont typeface="Franklin Gothic Book" panose="020B0503020102020204" pitchFamily="34" charset="0"/>
+        <a:buChar char="–"/>
+        <a:defRPr sz="1800" i="1" kern="1200" baseline="0">
           <a:solidFill>
-            <a:schemeClr val="tx1"/>
+            <a:schemeClr val="tx2"/>
           </a:solidFill>
           <a:latin typeface="+mn-lt"/>
           <a:ea typeface="+mn-ea"/>
           <a:cs typeface="+mn-cs"/>
         </a:defRPr>
       </a:lvl4pPr>
-      <a:lvl5pPr marL="2057400" indent="-228600" algn="l" defTabSz="914400" rtl="0" eaLnBrk="1" latinLnBrk="0" hangingPunct="1">
+      <a:lvl5pPr marL="2286000" indent="-384048" algn="l" defTabSz="914400" rtl="0" eaLnBrk="1" latinLnBrk="0" hangingPunct="1">
         <a:lnSpc>
-          <a:spcPct val="90000"/>
+          <a:spcPct val="94000"/>
         </a:lnSpc>
         <a:spcBef>
           <a:spcPts val="500"/>
         </a:spcBef>
-        <a:buFont typeface="Arial" panose="020B0604020202020204" pitchFamily="34" charset="0"/>
-        <a:buChar char="•"/>
-        <a:defRPr sz="1800" kern="1200">
+        <a:spcAft>
+          <a:spcPts val="200"/>
+        </a:spcAft>
+        <a:buFont typeface="Franklin Gothic Book" panose="020B0503020102020204" pitchFamily="34" charset="0"/>
+        <a:buChar char="■"/>
+        <a:defRPr sz="1600" kern="1200" baseline="0">
           <a:solidFill>
-            <a:schemeClr val="tx1"/>
+            <a:schemeClr val="tx2"/>
           </a:solidFill>
           <a:latin typeface="+mn-lt"/>
           <a:ea typeface="+mn-ea"/>
           <a:cs typeface="+mn-cs"/>
         </a:defRPr>
       </a:lvl5pPr>
-      <a:lvl6pPr marL="2514600" indent="-228600" algn="l" defTabSz="914400" rtl="0" eaLnBrk="1" latinLnBrk="0" hangingPunct="1">
+      <a:lvl6pPr marL="2743200" indent="-384048" algn="l" defTabSz="914400" rtl="0" eaLnBrk="1" latinLnBrk="0" hangingPunct="1">
         <a:lnSpc>
-          <a:spcPct val="90000"/>
+          <a:spcPct val="94000"/>
         </a:lnSpc>
         <a:spcBef>
           <a:spcPts val="500"/>
         </a:spcBef>
-        <a:buFont typeface="Arial" panose="020B0604020202020204" pitchFamily="34" charset="0"/>
-        <a:buChar char="•"/>
-        <a:defRPr sz="1800" kern="1200">
+        <a:spcAft>
+          <a:spcPts val="200"/>
+        </a:spcAft>
+        <a:buFont typeface="Franklin Gothic Book" panose="020B0503020102020204" pitchFamily="34" charset="0"/>
+        <a:buChar char="–"/>
+        <a:defRPr sz="1600" i="1" kern="1200" baseline="0">
           <a:solidFill>
-            <a:schemeClr val="tx1"/>
+            <a:schemeClr val="tx2"/>
           </a:solidFill>
           <a:latin typeface="+mn-lt"/>
           <a:ea typeface="+mn-ea"/>
           <a:cs typeface="+mn-cs"/>
         </a:defRPr>
       </a:lvl6pPr>
-      <a:lvl7pPr marL="2971800" indent="-228600" algn="l" defTabSz="914400" rtl="0" eaLnBrk="1" latinLnBrk="0" hangingPunct="1">
+      <a:lvl7pPr marL="3200400" indent="-384048" algn="l" defTabSz="914400" rtl="0" eaLnBrk="1" latinLnBrk="0" hangingPunct="1">
         <a:lnSpc>
-          <a:spcPct val="90000"/>
+          <a:spcPct val="94000"/>
         </a:lnSpc>
         <a:spcBef>
           <a:spcPts val="500"/>
         </a:spcBef>
-        <a:buFont typeface="Arial" panose="020B0604020202020204" pitchFamily="34" charset="0"/>
-        <a:buChar char="•"/>
-        <a:defRPr sz="1800" kern="1200">
+        <a:spcAft>
+          <a:spcPts val="200"/>
+        </a:spcAft>
+        <a:buFont typeface="Franklin Gothic Book" panose="020B0503020102020204" pitchFamily="34" charset="0"/>
+        <a:buChar char="■"/>
+        <a:defRPr sz="1400" kern="1200" baseline="0">
           <a:solidFill>
-            <a:schemeClr val="tx1"/>
+            <a:schemeClr val="tx2"/>
           </a:solidFill>
           <a:latin typeface="+mn-lt"/>
           <a:ea typeface="+mn-ea"/>
           <a:cs typeface="+mn-cs"/>
         </a:defRPr>
       </a:lvl7pPr>
-      <a:lvl8pPr marL="3429000" indent="-228600" algn="l" defTabSz="914400" rtl="0" eaLnBrk="1" latinLnBrk="0" hangingPunct="1">
+      <a:lvl8pPr marL="3657600" indent="-384048" algn="l" defTabSz="914400" rtl="0" eaLnBrk="1" latinLnBrk="0" hangingPunct="1">
         <a:lnSpc>
-          <a:spcPct val="90000"/>
+          <a:spcPct val="94000"/>
         </a:lnSpc>
         <a:spcBef>
           <a:spcPts val="500"/>
         </a:spcBef>
-        <a:buFont typeface="Arial" panose="020B0604020202020204" pitchFamily="34" charset="0"/>
-        <a:buChar char="•"/>
-        <a:defRPr sz="1800" kern="1200">
+        <a:spcAft>
+          <a:spcPts val="200"/>
+        </a:spcAft>
+        <a:buFont typeface="Franklin Gothic Book" panose="020B0503020102020204" pitchFamily="34" charset="0"/>
+        <a:buChar char="–"/>
+        <a:defRPr sz="1400" i="1" kern="1200" baseline="0">
           <a:solidFill>
-            <a:schemeClr val="tx1"/>
+            <a:schemeClr val="tx2"/>
           </a:solidFill>
           <a:latin typeface="+mn-lt"/>
           <a:ea typeface="+mn-ea"/>
           <a:cs typeface="+mn-cs"/>
         </a:defRPr>
       </a:lvl8pPr>
-      <a:lvl9pPr marL="3886200" indent="-228600" algn="l" defTabSz="914400" rtl="0" eaLnBrk="1" latinLnBrk="0" hangingPunct="1">
+      <a:lvl9pPr marL="4114800" indent="-384048" algn="l" defTabSz="914400" rtl="0" eaLnBrk="1" latinLnBrk="0" hangingPunct="1">
         <a:lnSpc>
-          <a:spcPct val="90000"/>
+          <a:spcPct val="94000"/>
         </a:lnSpc>
         <a:spcBef>
           <a:spcPts val="500"/>
         </a:spcBef>
-        <a:buFont typeface="Arial" panose="020B0604020202020204" pitchFamily="34" charset="0"/>
-        <a:buChar char="•"/>
-        <a:defRPr sz="1800" kern="1200">
+        <a:spcAft>
+          <a:spcPts val="200"/>
+        </a:spcAft>
+        <a:buFont typeface="Franklin Gothic Book" panose="020B0503020102020204" pitchFamily="34" charset="0"/>
+        <a:buChar char="■"/>
+        <a:defRPr sz="1400" kern="1200" baseline="0">
           <a:solidFill>
-            <a:schemeClr val="tx1"/>
+            <a:schemeClr val="tx2"/>
           </a:solidFill>
           <a:latin typeface="+mn-lt"/>
           <a:ea typeface="+mn-ea"/>
@@ -3309,6 +3801,52 @@
       </a:lvl9pPr>
     </p:otherStyle>
   </p:txStyles>
+  <p:extLst mod="1">
+    <p:ext uri="{27BBF7A9-308A-43DC-89C8-2F10F3537804}">
+      <p15:sldGuideLst xmlns:p15="http://schemas.microsoft.com/office/powerpoint/2012/main">
+        <p15:guide id="3" orient="horz" pos="1368">
+          <p15:clr>
+            <a:srgbClr val="F26B43"/>
+          </p15:clr>
+        </p15:guide>
+        <p15:guide id="4" orient="horz" pos="1440">
+          <p15:clr>
+            <a:srgbClr val="F26B43"/>
+          </p15:clr>
+        </p15:guide>
+        <p15:guide id="6" orient="horz" pos="3696">
+          <p15:clr>
+            <a:srgbClr val="F26B43"/>
+          </p15:clr>
+        </p15:guide>
+        <p15:guide id="7" orient="horz" pos="432">
+          <p15:clr>
+            <a:srgbClr val="F26B43"/>
+          </p15:clr>
+        </p15:guide>
+        <p15:guide id="8" orient="horz" pos="1512">
+          <p15:clr>
+            <a:srgbClr val="F26B43"/>
+          </p15:clr>
+        </p15:guide>
+        <p15:guide id="9" pos="6912">
+          <p15:clr>
+            <a:srgbClr val="F26B43"/>
+          </p15:clr>
+        </p15:guide>
+        <p15:guide id="10" pos="936">
+          <p15:clr>
+            <a:srgbClr val="F26B43"/>
+          </p15:clr>
+        </p15:guide>
+        <p15:guide id="11" pos="864">
+          <p15:clr>
+            <a:srgbClr val="F26B43"/>
+          </p15:clr>
+        </p15:guide>
+      </p15:sldGuideLst>
+    </p:ext>
+  </p:extLst>
 </p:sldMaster>
 </file>
 
@@ -3540,8 +4078,8 @@
         </p:nvSpPr>
         <p:spPr>
           <a:xfrm>
-            <a:off x="838200" y="365125"/>
-            <a:ext cx="10515600" cy="1325563"/>
+            <a:off x="1371600" y="685800"/>
+            <a:ext cx="9601200" cy="1087244"/>
           </a:xfrm>
         </p:spPr>
         <p:txBody>
@@ -3576,12 +4114,74 @@
             <p:ph idx="1"/>
           </p:nvPr>
         </p:nvSpPr>
-        <p:spPr/>
-        <p:txBody>
-          <a:bodyPr/>
+        <p:spPr>
+          <a:xfrm>
+            <a:off x="1137424" y="1862254"/>
+            <a:ext cx="10727473" cy="4772722"/>
+          </a:xfrm>
+        </p:spPr>
+        <p:txBody>
+          <a:bodyPr>
+            <a:normAutofit/>
+          </a:bodyPr>
           <a:lstStyle/>
           <a:p>
-            <a:endParaRPr lang="en-US"/>
+            <a:r>
+              <a:rPr lang="en-US" sz="2800" dirty="0"/>
+              <a:t>Created </a:t>
+            </a:r>
+            <a:r>
+              <a:rPr lang="en-US" sz="2800" dirty="0" err="1"/>
+              <a:t>SurveyApe</a:t>
+            </a:r>
+            <a:r>
+              <a:rPr lang="en-US" sz="2800" dirty="0"/>
+              <a:t> using Spring Boot, MySQL, React</a:t>
+            </a:r>
+          </a:p>
+          <a:p>
+            <a:r>
+              <a:rPr lang="en-US" sz="2800" dirty="0"/>
+              <a:t>Created Model-View-Controller application</a:t>
+            </a:r>
+          </a:p>
+          <a:p>
+            <a:r>
+              <a:rPr lang="en-US" sz="2800" dirty="0"/>
+              <a:t>Allows user to signup to create a survey</a:t>
+            </a:r>
+          </a:p>
+          <a:p>
+            <a:r>
+              <a:rPr lang="en-US" sz="2800" dirty="0"/>
+              <a:t>Allows </a:t>
+            </a:r>
+            <a:r>
+              <a:rPr lang="en-US" sz="2800" dirty="0" err="1"/>
+              <a:t>surveyees</a:t>
+            </a:r>
+            <a:r>
+              <a:rPr lang="en-US" sz="2800" dirty="0"/>
+              <a:t> to take a survey using participation link</a:t>
+            </a:r>
+          </a:p>
+          <a:p>
+            <a:r>
+              <a:rPr lang="en-US" sz="2800" dirty="0"/>
+              <a:t>Supports creation of text, dropdown, radio, star rating, checkbox type of questions</a:t>
+            </a:r>
+          </a:p>
+          <a:p>
+            <a:r>
+              <a:rPr lang="en-US" sz="2800" dirty="0"/>
+              <a:t>Sends invitation mails and confirmation mail</a:t>
+            </a:r>
+          </a:p>
+          <a:p>
+            <a:r>
+              <a:rPr lang="en-US" sz="2800" dirty="0"/>
+              <a:t>Provides surveyor with stats of surveys created by him</a:t>
+            </a:r>
           </a:p>
         </p:txBody>
       </p:sp>
@@ -3672,8 +4272,8 @@
         </p:blipFill>
         <p:spPr>
           <a:xfrm>
-            <a:off x="322475" y="2207417"/>
-            <a:ext cx="11547049" cy="3221833"/>
+            <a:off x="1041398" y="2323944"/>
+            <a:ext cx="10774719" cy="3006339"/>
           </a:xfrm>
         </p:spPr>
       </p:pic>
@@ -3723,7 +4323,12 @@
             <p:ph type="title"/>
           </p:nvPr>
         </p:nvSpPr>
-        <p:spPr/>
+        <p:spPr>
+          <a:xfrm>
+            <a:off x="838200" y="0"/>
+            <a:ext cx="10515600" cy="1325563"/>
+          </a:xfrm>
+        </p:spPr>
         <p:txBody>
           <a:bodyPr>
             <a:normAutofit/>
@@ -3757,55 +4362,60 @@
             <p:ph idx="1"/>
           </p:nvPr>
         </p:nvSpPr>
-        <p:spPr/>
+        <p:spPr>
+          <a:xfrm>
+            <a:off x="592872" y="655320"/>
+            <a:ext cx="11477208" cy="6057714"/>
+          </a:xfrm>
+        </p:spPr>
         <p:txBody>
           <a:bodyPr/>
           <a:lstStyle/>
           <a:p>
-            <a:r>
-              <a:rPr lang="en-US" dirty="0" err="1"/>
-              <a:t>Signin</a:t>
-            </a:r>
-            <a:r>
+            <a:pPr marL="0" indent="0" algn="ctr">
+              <a:buNone/>
+            </a:pPr>
+            <a:r>
+              <a:rPr lang="en-US" sz="2400" dirty="0"/>
+              <a:t>Create/Edit Survey (General, Closed, Open)</a:t>
+            </a:r>
+            <a:br>
               <a:rPr lang="en-US" dirty="0"/>
-              <a:t> &amp; Signup</a:t>
-            </a:r>
-          </a:p>
-          <a:p>
-            <a:r>
-              <a:rPr lang="en-US" dirty="0"/>
-              <a:t>Create Survey (General, Closed, Open)</a:t>
-            </a:r>
-          </a:p>
-          <a:p>
-            <a:r>
-              <a:rPr lang="en-US" dirty="0"/>
-              <a:t>Get General Survey</a:t>
-            </a:r>
-          </a:p>
-          <a:p>
-            <a:r>
-              <a:rPr lang="en-US" dirty="0"/>
-              <a:t>Get Closed Survey</a:t>
-            </a:r>
-          </a:p>
-          <a:p>
-            <a:r>
-              <a:rPr lang="en-US" dirty="0"/>
-              <a:t>Get Open Survey</a:t>
-            </a:r>
-          </a:p>
-          <a:p>
+            </a:br>
             <a:endParaRPr lang="en-US" dirty="0"/>
           </a:p>
-          <a:p>
-            <a:pPr marL="0" indent="0">
-              <a:buNone/>
-            </a:pPr>
-            <a:endParaRPr lang="en-US" dirty="0"/>
-          </a:p>
-        </p:txBody>
-      </p:sp>
+        </p:txBody>
+      </p:sp>
+      <p:pic>
+        <p:nvPicPr>
+          <p:cNvPr id="7" name="Picture 6">
+            <a:extLst>
+              <a:ext uri="{FF2B5EF4-FFF2-40B4-BE49-F238E27FC236}">
+                <a16:creationId xmlns:a16="http://schemas.microsoft.com/office/drawing/2014/main" id="{18DD8279-8D28-964E-B72F-B27C234A1B0F}"/>
+              </a:ext>
+            </a:extLst>
+          </p:cNvPr>
+          <p:cNvPicPr>
+            <a:picLocks noChangeAspect="1"/>
+          </p:cNvPicPr>
+          <p:nvPr/>
+        </p:nvPicPr>
+        <p:blipFill>
+          <a:blip r:embed="rId2"/>
+          <a:stretch>
+            <a:fillRect/>
+          </a:stretch>
+        </p:blipFill>
+        <p:spPr>
+          <a:xfrm>
+            <a:off x="1824650" y="1352887"/>
+            <a:ext cx="9529150" cy="5360147"/>
+          </a:xfrm>
+          <a:prstGeom prst="rect">
+            <a:avLst/>
+          </a:prstGeom>
+        </p:spPr>
+      </p:pic>
     </p:spTree>
     <p:extLst>
       <p:ext uri="{BB962C8B-B14F-4D97-AF65-F5344CB8AC3E}">
@@ -3838,10 +4448,10 @@
       </p:grpSpPr>
       <p:sp>
         <p:nvSpPr>
-          <p:cNvPr id="2" name="Title 1">
+          <p:cNvPr id="3" name="Content Placeholder 2">
             <a:extLst>
               <a:ext uri="{FF2B5EF4-FFF2-40B4-BE49-F238E27FC236}">
-                <a16:creationId xmlns:a16="http://schemas.microsoft.com/office/drawing/2014/main" id="{CAE7CA57-B3AA-E145-A937-D6169AEAE12A}"/>
+                <a16:creationId xmlns:a16="http://schemas.microsoft.com/office/drawing/2014/main" id="{A62B8F60-B888-9C42-86B2-950BA5C01FD7}"/>
               </a:ext>
             </a:extLst>
           </p:cNvPr>
@@ -3849,47 +4459,65 @@
             <a:spLocks noGrp="1"/>
           </p:cNvSpPr>
           <p:nvPr>
-            <p:ph type="title"/>
-          </p:nvPr>
-        </p:nvSpPr>
-        <p:spPr/>
-        <p:txBody>
-          <a:bodyPr/>
+            <p:ph idx="1"/>
+          </p:nvPr>
+        </p:nvSpPr>
+        <p:spPr>
+          <a:xfrm>
+            <a:off x="379141" y="228600"/>
+            <a:ext cx="11385396" cy="6294863"/>
+          </a:xfrm>
+        </p:spPr>
+        <p:txBody>
+          <a:bodyPr>
+            <a:normAutofit/>
+          </a:bodyPr>
           <a:lstStyle/>
           <a:p>
-            <a:endParaRPr lang="en-US"/>
-          </a:p>
-        </p:txBody>
-      </p:sp>
-      <p:sp>
-        <p:nvSpPr>
-          <p:cNvPr id="3" name="Content Placeholder 2">
+            <a:pPr marL="0" indent="0" algn="ctr">
+              <a:buNone/>
+            </a:pPr>
+            <a:r>
+              <a:rPr lang="en-US" sz="2400" dirty="0"/>
+              <a:t>Give Survey</a:t>
+            </a:r>
+          </a:p>
+        </p:txBody>
+      </p:sp>
+      <p:pic>
+        <p:nvPicPr>
+          <p:cNvPr id="7" name="Picture 6">
             <a:extLst>
               <a:ext uri="{FF2B5EF4-FFF2-40B4-BE49-F238E27FC236}">
-                <a16:creationId xmlns:a16="http://schemas.microsoft.com/office/drawing/2014/main" id="{2451F1BC-1AAE-C940-9880-CA9714EF197D}"/>
+                <a16:creationId xmlns:a16="http://schemas.microsoft.com/office/drawing/2014/main" id="{EDEC189E-D62C-4348-B8C7-2E3B8DE4EC7D}"/>
               </a:ext>
             </a:extLst>
           </p:cNvPr>
-          <p:cNvSpPr>
-            <a:spLocks noGrp="1"/>
-          </p:cNvSpPr>
-          <p:nvPr>
-            <p:ph idx="1"/>
-          </p:nvPr>
-        </p:nvSpPr>
-        <p:spPr/>
-        <p:txBody>
-          <a:bodyPr/>
-          <a:lstStyle/>
-          <a:p>
-            <a:endParaRPr lang="en-US"/>
-          </a:p>
-        </p:txBody>
-      </p:sp>
+          <p:cNvPicPr>
+            <a:picLocks noChangeAspect="1"/>
+          </p:cNvPicPr>
+          <p:nvPr/>
+        </p:nvPicPr>
+        <p:blipFill>
+          <a:blip r:embed="rId2"/>
+          <a:stretch>
+            <a:fillRect/>
+          </a:stretch>
+        </p:blipFill>
+        <p:spPr>
+          <a:xfrm>
+            <a:off x="1153160" y="808463"/>
+            <a:ext cx="10160000" cy="5715000"/>
+          </a:xfrm>
+          <a:prstGeom prst="rect">
+            <a:avLst/>
+          </a:prstGeom>
+        </p:spPr>
+      </p:pic>
     </p:spTree>
     <p:extLst>
       <p:ext uri="{BB962C8B-B14F-4D97-AF65-F5344CB8AC3E}">
-        <p14:creationId xmlns:p14="http://schemas.microsoft.com/office/powerpoint/2010/main" val="2036281311"/>
+        <p14:creationId xmlns:p14="http://schemas.microsoft.com/office/powerpoint/2010/main" val="1663302302"/>
       </p:ext>
     </p:extLst>
   </p:cSld>
@@ -3918,10 +4546,10 @@
       </p:grpSpPr>
       <p:sp>
         <p:nvSpPr>
-          <p:cNvPr id="2" name="Title 1">
+          <p:cNvPr id="3" name="Content Placeholder 2">
             <a:extLst>
               <a:ext uri="{FF2B5EF4-FFF2-40B4-BE49-F238E27FC236}">
-                <a16:creationId xmlns:a16="http://schemas.microsoft.com/office/drawing/2014/main" id="{36A19966-8ECE-FC43-A7FB-8D871BF68538}"/>
+                <a16:creationId xmlns:a16="http://schemas.microsoft.com/office/drawing/2014/main" id="{DD000111-B72B-084B-95BC-11EF485145FF}"/>
               </a:ext>
             </a:extLst>
           </p:cNvPr>
@@ -3929,47 +4557,95 @@
             <a:spLocks noGrp="1"/>
           </p:cNvSpPr>
           <p:nvPr>
-            <p:ph type="title"/>
-          </p:nvPr>
-        </p:nvSpPr>
-        <p:spPr/>
-        <p:txBody>
-          <a:bodyPr/>
+            <p:ph idx="1"/>
+          </p:nvPr>
+        </p:nvSpPr>
+        <p:spPr>
+          <a:xfrm>
+            <a:off x="669073" y="78059"/>
+            <a:ext cx="11363093" cy="6701882"/>
+          </a:xfrm>
+        </p:spPr>
+        <p:txBody>
+          <a:bodyPr>
+            <a:normAutofit/>
+          </a:bodyPr>
           <a:lstStyle/>
           <a:p>
-            <a:endParaRPr lang="en-US"/>
-          </a:p>
-        </p:txBody>
-      </p:sp>
-      <p:sp>
-        <p:nvSpPr>
-          <p:cNvPr id="3" name="Content Placeholder 2">
+            <a:pPr marL="0" indent="0" algn="ctr">
+              <a:buNone/>
+            </a:pPr>
+            <a:r>
+              <a:rPr lang="en-US" sz="2400" dirty="0"/>
+              <a:t>Continue Incomplete Surveys / View Completed Survey</a:t>
+            </a:r>
+          </a:p>
+        </p:txBody>
+      </p:sp>
+      <p:pic>
+        <p:nvPicPr>
+          <p:cNvPr id="7" name="Picture 6">
             <a:extLst>
               <a:ext uri="{FF2B5EF4-FFF2-40B4-BE49-F238E27FC236}">
-                <a16:creationId xmlns:a16="http://schemas.microsoft.com/office/drawing/2014/main" id="{A62B8F60-B888-9C42-86B2-950BA5C01FD7}"/>
+                <a16:creationId xmlns:a16="http://schemas.microsoft.com/office/drawing/2014/main" id="{FEC4CE1C-F1FA-B84D-A396-C0C984E27E72}"/>
               </a:ext>
             </a:extLst>
           </p:cNvPr>
-          <p:cNvSpPr>
-            <a:spLocks noGrp="1"/>
-          </p:cNvSpPr>
-          <p:nvPr>
-            <p:ph idx="1"/>
-          </p:nvPr>
-        </p:nvSpPr>
-        <p:spPr/>
-        <p:txBody>
-          <a:bodyPr/>
-          <a:lstStyle/>
-          <a:p>
-            <a:endParaRPr lang="en-US"/>
-          </a:p>
-        </p:txBody>
-      </p:sp>
+          <p:cNvPicPr>
+            <a:picLocks noChangeAspect="1"/>
+          </p:cNvPicPr>
+          <p:nvPr/>
+        </p:nvPicPr>
+        <p:blipFill>
+          <a:blip r:embed="rId2"/>
+          <a:stretch>
+            <a:fillRect/>
+          </a:stretch>
+        </p:blipFill>
+        <p:spPr>
+          <a:xfrm>
+            <a:off x="106679" y="876299"/>
+            <a:ext cx="5556405" cy="5903641"/>
+          </a:xfrm>
+          <a:prstGeom prst="rect">
+            <a:avLst/>
+          </a:prstGeom>
+        </p:spPr>
+      </p:pic>
+      <p:pic>
+        <p:nvPicPr>
+          <p:cNvPr id="9" name="Picture 8">
+            <a:extLst>
+              <a:ext uri="{FF2B5EF4-FFF2-40B4-BE49-F238E27FC236}">
+                <a16:creationId xmlns:a16="http://schemas.microsoft.com/office/drawing/2014/main" id="{92C8D947-44C2-124E-B02F-94D1E582D9EE}"/>
+              </a:ext>
+            </a:extLst>
+          </p:cNvPr>
+          <p:cNvPicPr>
+            <a:picLocks noChangeAspect="1"/>
+          </p:cNvPicPr>
+          <p:nvPr/>
+        </p:nvPicPr>
+        <p:blipFill>
+          <a:blip r:embed="rId3"/>
+          <a:stretch>
+            <a:fillRect/>
+          </a:stretch>
+        </p:blipFill>
+        <p:spPr>
+          <a:xfrm>
+            <a:off x="5822918" y="876299"/>
+            <a:ext cx="6369081" cy="5981701"/>
+          </a:xfrm>
+          <a:prstGeom prst="rect">
+            <a:avLst/>
+          </a:prstGeom>
+        </p:spPr>
+      </p:pic>
     </p:spTree>
     <p:extLst>
       <p:ext uri="{BB962C8B-B14F-4D97-AF65-F5344CB8AC3E}">
-        <p14:creationId xmlns:p14="http://schemas.microsoft.com/office/powerpoint/2010/main" val="1663302302"/>
+        <p14:creationId xmlns:p14="http://schemas.microsoft.com/office/powerpoint/2010/main" val="3552538544"/>
       </p:ext>
     </p:extLst>
   </p:cSld>
@@ -3998,10 +4674,10 @@
       </p:grpSpPr>
       <p:sp>
         <p:nvSpPr>
-          <p:cNvPr id="2" name="Title 1">
+          <p:cNvPr id="3" name="Content Placeholder 2">
             <a:extLst>
               <a:ext uri="{FF2B5EF4-FFF2-40B4-BE49-F238E27FC236}">
-                <a16:creationId xmlns:a16="http://schemas.microsoft.com/office/drawing/2014/main" id="{65143E2A-6348-EA4D-881B-66F34137BE75}"/>
+                <a16:creationId xmlns:a16="http://schemas.microsoft.com/office/drawing/2014/main" id="{3430DC2E-E456-B642-A6B3-55513E9DF980}"/>
               </a:ext>
             </a:extLst>
           </p:cNvPr>
@@ -4009,205 +4685,75 @@
             <a:spLocks noGrp="1"/>
           </p:cNvSpPr>
           <p:nvPr>
-            <p:ph type="title"/>
-          </p:nvPr>
-        </p:nvSpPr>
-        <p:spPr/>
+            <p:ph idx="1"/>
+          </p:nvPr>
+        </p:nvSpPr>
+        <p:spPr>
+          <a:xfrm>
+            <a:off x="685800" y="0"/>
+            <a:ext cx="11338560" cy="6720840"/>
+          </a:xfrm>
+        </p:spPr>
         <p:txBody>
           <a:bodyPr/>
           <a:lstStyle/>
           <a:p>
-            <a:endParaRPr lang="en-US"/>
-          </a:p>
-        </p:txBody>
-      </p:sp>
-      <p:sp>
-        <p:nvSpPr>
-          <p:cNvPr id="3" name="Content Placeholder 2">
+            <a:pPr marL="0" indent="0" algn="ctr">
+              <a:buNone/>
+            </a:pPr>
+            <a:r>
+              <a:rPr lang="en-US" sz="2400" dirty="0"/>
+              <a:t>Survey Stats</a:t>
+            </a:r>
+          </a:p>
+          <a:p>
+            <a:pPr marL="0" indent="0">
+              <a:buNone/>
+            </a:pPr>
+            <a:endParaRPr lang="en-US" dirty="0"/>
+          </a:p>
+          <a:p>
+            <a:pPr marL="0" indent="0">
+              <a:buNone/>
+            </a:pPr>
+            <a:endParaRPr lang="en-US" dirty="0"/>
+          </a:p>
+        </p:txBody>
+      </p:sp>
+      <p:pic>
+        <p:nvPicPr>
+          <p:cNvPr id="8" name="Picture 7">
             <a:extLst>
               <a:ext uri="{FF2B5EF4-FFF2-40B4-BE49-F238E27FC236}">
-                <a16:creationId xmlns:a16="http://schemas.microsoft.com/office/drawing/2014/main" id="{DD000111-B72B-084B-95BC-11EF485145FF}"/>
+                <a16:creationId xmlns:a16="http://schemas.microsoft.com/office/drawing/2014/main" id="{C8A86D0F-CAAE-4942-9329-3E3049441AF5}"/>
               </a:ext>
             </a:extLst>
           </p:cNvPr>
-          <p:cNvSpPr>
-            <a:spLocks noGrp="1"/>
-          </p:cNvSpPr>
-          <p:nvPr>
-            <p:ph idx="1"/>
-          </p:nvPr>
-        </p:nvSpPr>
-        <p:spPr/>
-        <p:txBody>
-          <a:bodyPr/>
-          <a:lstStyle/>
-          <a:p>
-            <a:endParaRPr lang="en-US"/>
-          </a:p>
-        </p:txBody>
-      </p:sp>
+          <p:cNvPicPr>
+            <a:picLocks noChangeAspect="1"/>
+          </p:cNvPicPr>
+          <p:nvPr/>
+        </p:nvPicPr>
+        <p:blipFill>
+          <a:blip r:embed="rId2"/>
+          <a:stretch>
+            <a:fillRect/>
+          </a:stretch>
+        </p:blipFill>
+        <p:spPr>
+          <a:xfrm>
+            <a:off x="1439128" y="901816"/>
+            <a:ext cx="10160000" cy="5715000"/>
+          </a:xfrm>
+          <a:prstGeom prst="rect">
+            <a:avLst/>
+          </a:prstGeom>
+        </p:spPr>
+      </p:pic>
     </p:spTree>
     <p:extLst>
       <p:ext uri="{BB962C8B-B14F-4D97-AF65-F5344CB8AC3E}">
-        <p14:creationId xmlns:p14="http://schemas.microsoft.com/office/powerpoint/2010/main" val="3552538544"/>
-      </p:ext>
-    </p:extLst>
-  </p:cSld>
-  <p:clrMapOvr>
-    <a:masterClrMapping/>
-  </p:clrMapOvr>
-</p:sld>
-</file>
-
-<file path=ppt/slides/slide8.xml><?xml version="1.0" encoding="utf-8"?>
-<p:sld xmlns:a="http://schemas.openxmlformats.org/drawingml/2006/main" xmlns:r="http://schemas.openxmlformats.org/officeDocument/2006/relationships" xmlns:p="http://schemas.openxmlformats.org/presentationml/2006/main">
-  <p:cSld>
-    <p:spTree>
-      <p:nvGrpSpPr>
-        <p:cNvPr id="1" name=""/>
-        <p:cNvGrpSpPr/>
-        <p:nvPr/>
-      </p:nvGrpSpPr>
-      <p:grpSpPr>
-        <a:xfrm>
-          <a:off x="0" y="0"/>
-          <a:ext cx="0" cy="0"/>
-          <a:chOff x="0" y="0"/>
-          <a:chExt cx="0" cy="0"/>
-        </a:xfrm>
-      </p:grpSpPr>
-      <p:sp>
-        <p:nvSpPr>
-          <p:cNvPr id="2" name="Title 1">
-            <a:extLst>
-              <a:ext uri="{FF2B5EF4-FFF2-40B4-BE49-F238E27FC236}">
-                <a16:creationId xmlns:a16="http://schemas.microsoft.com/office/drawing/2014/main" id="{AD1C988C-4B12-7040-8390-D5FCBEC481E4}"/>
-              </a:ext>
-            </a:extLst>
-          </p:cNvPr>
-          <p:cNvSpPr>
-            <a:spLocks noGrp="1"/>
-          </p:cNvSpPr>
-          <p:nvPr>
-            <p:ph type="title"/>
-          </p:nvPr>
-        </p:nvSpPr>
-        <p:spPr/>
-        <p:txBody>
-          <a:bodyPr/>
-          <a:lstStyle/>
-          <a:p>
-            <a:endParaRPr lang="en-US"/>
-          </a:p>
-        </p:txBody>
-      </p:sp>
-      <p:sp>
-        <p:nvSpPr>
-          <p:cNvPr id="3" name="Content Placeholder 2">
-            <a:extLst>
-              <a:ext uri="{FF2B5EF4-FFF2-40B4-BE49-F238E27FC236}">
-                <a16:creationId xmlns:a16="http://schemas.microsoft.com/office/drawing/2014/main" id="{BBC2B4B7-C5B5-D243-A42E-461F239EC321}"/>
-              </a:ext>
-            </a:extLst>
-          </p:cNvPr>
-          <p:cNvSpPr>
-            <a:spLocks noGrp="1"/>
-          </p:cNvSpPr>
-          <p:nvPr>
-            <p:ph idx="1"/>
-          </p:nvPr>
-        </p:nvSpPr>
-        <p:spPr/>
-        <p:txBody>
-          <a:bodyPr/>
-          <a:lstStyle/>
-          <a:p>
-            <a:endParaRPr lang="en-US"/>
-          </a:p>
-        </p:txBody>
-      </p:sp>
-    </p:spTree>
-    <p:extLst>
-      <p:ext uri="{BB962C8B-B14F-4D97-AF65-F5344CB8AC3E}">
-        <p14:creationId xmlns:p14="http://schemas.microsoft.com/office/powerpoint/2010/main" val="2734645469"/>
-      </p:ext>
-    </p:extLst>
-  </p:cSld>
-  <p:clrMapOvr>
-    <a:masterClrMapping/>
-  </p:clrMapOvr>
-</p:sld>
-</file>
-
-<file path=ppt/slides/slide9.xml><?xml version="1.0" encoding="utf-8"?>
-<p:sld xmlns:a="http://schemas.openxmlformats.org/drawingml/2006/main" xmlns:r="http://schemas.openxmlformats.org/officeDocument/2006/relationships" xmlns:p="http://schemas.openxmlformats.org/presentationml/2006/main">
-  <p:cSld>
-    <p:spTree>
-      <p:nvGrpSpPr>
-        <p:cNvPr id="1" name=""/>
-        <p:cNvGrpSpPr/>
-        <p:nvPr/>
-      </p:nvGrpSpPr>
-      <p:grpSpPr>
-        <a:xfrm>
-          <a:off x="0" y="0"/>
-          <a:ext cx="0" cy="0"/>
-          <a:chOff x="0" y="0"/>
-          <a:chExt cx="0" cy="0"/>
-        </a:xfrm>
-      </p:grpSpPr>
-      <p:sp>
-        <p:nvSpPr>
-          <p:cNvPr id="3" name="Content Placeholder 2">
-            <a:extLst>
-              <a:ext uri="{FF2B5EF4-FFF2-40B4-BE49-F238E27FC236}">
-                <a16:creationId xmlns:a16="http://schemas.microsoft.com/office/drawing/2014/main" id="{B6467569-8CC3-DB4F-9980-299E8A31B34C}"/>
-              </a:ext>
-            </a:extLst>
-          </p:cNvPr>
-          <p:cNvSpPr>
-            <a:spLocks noGrp="1"/>
-          </p:cNvSpPr>
-          <p:nvPr>
-            <p:ph idx="1"/>
-          </p:nvPr>
-        </p:nvSpPr>
-        <p:spPr>
-          <a:xfrm>
-            <a:off x="974835" y="1047859"/>
-            <a:ext cx="10515600" cy="4351338"/>
-          </a:xfrm>
-        </p:spPr>
-        <p:txBody>
-          <a:bodyPr>
-            <a:normAutofit/>
-          </a:bodyPr>
-          <a:lstStyle/>
-          <a:p>
-            <a:pPr marL="0" indent="0" algn="ctr">
-              <a:buNone/>
-            </a:pPr>
-            <a:endParaRPr lang="en-US" sz="6000" dirty="0">
-              <a:latin typeface="Copperplate Gothic Bold" panose="020E0705020206020404" pitchFamily="34" charset="77"/>
-            </a:endParaRPr>
-          </a:p>
-          <a:p>
-            <a:pPr marL="0" indent="0" algn="ctr">
-              <a:buNone/>
-            </a:pPr>
-            <a:r>
-              <a:rPr lang="en-US" sz="6000" dirty="0">
-                <a:latin typeface="Copperplate Gothic Bold" panose="020E0705020206020404" pitchFamily="34" charset="77"/>
-              </a:rPr>
-              <a:t>Thank you!</a:t>
-            </a:r>
-          </a:p>
-        </p:txBody>
-      </p:sp>
-    </p:spTree>
-    <p:extLst>
-      <p:ext uri="{BB962C8B-B14F-4D97-AF65-F5344CB8AC3E}">
-        <p14:creationId xmlns:p14="http://schemas.microsoft.com/office/powerpoint/2010/main" val="1389268469"/>
+        <p14:creationId xmlns:p14="http://schemas.microsoft.com/office/powerpoint/2010/main" val="2986809461"/>
       </p:ext>
     </p:extLst>
   </p:cSld>
@@ -4218,9 +4764,9 @@
 </file>
 
 <file path=ppt/theme/theme1.xml><?xml version="1.0" encoding="utf-8"?>
-<a:theme xmlns:a="http://schemas.openxmlformats.org/drawingml/2006/main" name="Office Theme">
+<a:theme xmlns:a="http://schemas.openxmlformats.org/drawingml/2006/main" name="Crop">
   <a:themeElements>
-    <a:clrScheme name="Office">
+    <a:clrScheme name="Crop">
       <a:dk1>
         <a:sysClr val="windowText" lastClr="000000"/>
       </a:dk1>
@@ -4228,100 +4774,48 @@
         <a:sysClr val="window" lastClr="FFFFFF"/>
       </a:lt1>
       <a:dk2>
-        <a:srgbClr val="44546A"/>
+        <a:srgbClr val="191B0E"/>
       </a:dk2>
       <a:lt2>
-        <a:srgbClr val="E7E6E6"/>
+        <a:srgbClr val="EFEDE3"/>
       </a:lt2>
       <a:accent1>
-        <a:srgbClr val="4472C4"/>
+        <a:srgbClr val="8C8D86"/>
       </a:accent1>
       <a:accent2>
-        <a:srgbClr val="ED7D31"/>
+        <a:srgbClr val="E6C069"/>
       </a:accent2>
       <a:accent3>
-        <a:srgbClr val="A5A5A5"/>
+        <a:srgbClr val="897B61"/>
       </a:accent3>
       <a:accent4>
-        <a:srgbClr val="FFC000"/>
+        <a:srgbClr val="8DAB8E"/>
       </a:accent4>
       <a:accent5>
-        <a:srgbClr val="5B9BD5"/>
+        <a:srgbClr val="77A2BB"/>
       </a:accent5>
       <a:accent6>
-        <a:srgbClr val="70AD47"/>
+        <a:srgbClr val="E28394"/>
       </a:accent6>
       <a:hlink>
-        <a:srgbClr val="0563C1"/>
+        <a:srgbClr val="77A2BB"/>
       </a:hlink>
       <a:folHlink>
-        <a:srgbClr val="954F72"/>
+        <a:srgbClr val="957A99"/>
       </a:folHlink>
     </a:clrScheme>
-    <a:fontScheme name="Office">
+    <a:fontScheme name="Crop">
       <a:majorFont>
-        <a:latin typeface="Calibri Light" panose="020F0302020204030204"/>
+        <a:latin typeface="Franklin Gothic Book" panose="020B0503020102020204"/>
         <a:ea typeface=""/>
         <a:cs typeface=""/>
-        <a:font script="Jpan" typeface="游ゴシック Light"/>
-        <a:font script="Hang" typeface="맑은 고딕"/>
-        <a:font script="Hans" typeface="等线 Light"/>
-        <a:font script="Hant" typeface="新細明體"/>
-        <a:font script="Arab" typeface="Times New Roman"/>
-        <a:font script="Hebr" typeface="Times New Roman"/>
-        <a:font script="Thai" typeface="Angsana New"/>
-        <a:font script="Ethi" typeface="Nyala"/>
-        <a:font script="Beng" typeface="Vrinda"/>
-        <a:font script="Gujr" typeface="Shruti"/>
-        <a:font script="Khmr" typeface="MoolBoran"/>
-        <a:font script="Knda" typeface="Tunga"/>
-        <a:font script="Guru" typeface="Raavi"/>
-        <a:font script="Cans" typeface="Euphemia"/>
-        <a:font script="Cher" typeface="Plantagenet Cherokee"/>
-        <a:font script="Yiii" typeface="Microsoft Yi Baiti"/>
-        <a:font script="Tibt" typeface="Microsoft Himalaya"/>
-        <a:font script="Thaa" typeface="MV Boli"/>
-        <a:font script="Deva" typeface="Mangal"/>
-        <a:font script="Telu" typeface="Gautami"/>
-        <a:font script="Taml" typeface="Latha"/>
-        <a:font script="Syrc" typeface="Estrangelo Edessa"/>
-        <a:font script="Orya" typeface="Kalinga"/>
-        <a:font script="Mlym" typeface="Kartika"/>
-        <a:font script="Laoo" typeface="DokChampa"/>
-        <a:font script="Sinh" typeface="Iskoola Pota"/>
-        <a:font script="Mong" typeface="Mongolian Baiti"/>
-        <a:font script="Viet" typeface="Times New Roman"/>
-        <a:font script="Uigh" typeface="Microsoft Uighur"/>
-        <a:font script="Geor" typeface="Sylfaen"/>
-        <a:font script="Armn" typeface="Arial"/>
-        <a:font script="Bugi" typeface="Leelawadee UI"/>
-        <a:font script="Bopo" typeface="Microsoft JhengHei"/>
-        <a:font script="Java" typeface="Javanese Text"/>
-        <a:font script="Lisu" typeface="Segoe UI"/>
-        <a:font script="Mymr" typeface="Myanmar Text"/>
-        <a:font script="Nkoo" typeface="Ebrima"/>
-        <a:font script="Olck" typeface="Nirmala UI"/>
-        <a:font script="Osma" typeface="Ebrima"/>
-        <a:font script="Phag" typeface="Phagspa"/>
-        <a:font script="Syrn" typeface="Estrangelo Edessa"/>
-        <a:font script="Syrj" typeface="Estrangelo Edessa"/>
-        <a:font script="Syre" typeface="Estrangelo Edessa"/>
-        <a:font script="Sora" typeface="Nirmala UI"/>
-        <a:font script="Tale" typeface="Microsoft Tai Le"/>
-        <a:font script="Talu" typeface="Microsoft New Tai Lue"/>
-        <a:font script="Tfng" typeface="Ebrima"/>
-      </a:majorFont>
-      <a:minorFont>
-        <a:latin typeface="Calibri" panose="020F0502020204030204"/>
-        <a:ea typeface=""/>
-        <a:cs typeface=""/>
-        <a:font script="Jpan" typeface="游ゴシック"/>
-        <a:font script="Hang" typeface="맑은 고딕"/>
-        <a:font script="Hans" typeface="等线"/>
-        <a:font script="Hant" typeface="新細明體"/>
-        <a:font script="Arab" typeface="Arial"/>
-        <a:font script="Hebr" typeface="Arial"/>
-        <a:font script="Thai" typeface="Cordia New"/>
+        <a:font script="Jpan" typeface="メイリオ"/>
+        <a:font script="Hang" typeface="돋움"/>
+        <a:font script="Hans" typeface="华文楷体"/>
+        <a:font script="Hant" typeface="微軟正黑體"/>
+        <a:font script="Arab" typeface="Tahoma"/>
+        <a:font script="Hebr" typeface="Aharoni"/>
+        <a:font script="Thai" typeface="LilyUPC"/>
         <a:font script="Ethi" typeface="Nyala"/>
         <a:font script="Beng" typeface="Vrinda"/>
         <a:font script="Gujr" typeface="Shruti"/>
@@ -4342,29 +4836,47 @@
         <a:font script="Laoo" typeface="DokChampa"/>
         <a:font script="Sinh" typeface="Iskoola Pota"/>
         <a:font script="Mong" typeface="Mongolian Baiti"/>
-        <a:font script="Viet" typeface="Arial"/>
+        <a:font script="Viet" typeface="Tahoma"/>
         <a:font script="Uigh" typeface="Microsoft Uighur"/>
         <a:font script="Geor" typeface="Sylfaen"/>
-        <a:font script="Armn" typeface="Arial"/>
-        <a:font script="Bugi" typeface="Leelawadee UI"/>
-        <a:font script="Bopo" typeface="Microsoft JhengHei"/>
-        <a:font script="Java" typeface="Javanese Text"/>
-        <a:font script="Lisu" typeface="Segoe UI"/>
-        <a:font script="Mymr" typeface="Myanmar Text"/>
-        <a:font script="Nkoo" typeface="Ebrima"/>
-        <a:font script="Olck" typeface="Nirmala UI"/>
-        <a:font script="Osma" typeface="Ebrima"/>
-        <a:font script="Phag" typeface="Phagspa"/>
-        <a:font script="Syrn" typeface="Estrangelo Edessa"/>
-        <a:font script="Syrj" typeface="Estrangelo Edessa"/>
-        <a:font script="Syre" typeface="Estrangelo Edessa"/>
-        <a:font script="Sora" typeface="Nirmala UI"/>
-        <a:font script="Tale" typeface="Microsoft Tai Le"/>
-        <a:font script="Talu" typeface="Microsoft New Tai Lue"/>
-        <a:font script="Tfng" typeface="Ebrima"/>
+      </a:majorFont>
+      <a:minorFont>
+        <a:latin typeface="Franklin Gothic Book" panose="020B0503020102020204"/>
+        <a:ea typeface=""/>
+        <a:cs typeface=""/>
+        <a:font script="Jpan" typeface="メイリオ"/>
+        <a:font script="Hang" typeface="돋움"/>
+        <a:font script="Hans" typeface="华文楷体"/>
+        <a:font script="Hant" typeface="微軟正黑體"/>
+        <a:font script="Arab" typeface="Tahoma"/>
+        <a:font script="Hebr" typeface="Aharoni"/>
+        <a:font script="Thai" typeface="LilyUPC"/>
+        <a:font script="Ethi" typeface="Nyala"/>
+        <a:font script="Beng" typeface="Vrinda"/>
+        <a:font script="Gujr" typeface="Shruti"/>
+        <a:font script="Khmr" typeface="DaunPenh"/>
+        <a:font script="Knda" typeface="Tunga"/>
+        <a:font script="Guru" typeface="Raavi"/>
+        <a:font script="Cans" typeface="Euphemia"/>
+        <a:font script="Cher" typeface="Plantagenet Cherokee"/>
+        <a:font script="Yiii" typeface="Microsoft Yi Baiti"/>
+        <a:font script="Tibt" typeface="Microsoft Himalaya"/>
+        <a:font script="Thaa" typeface="MV Boli"/>
+        <a:font script="Deva" typeface="Mangal"/>
+        <a:font script="Telu" typeface="Gautami"/>
+        <a:font script="Taml" typeface="Latha"/>
+        <a:font script="Syrc" typeface="Estrangelo Edessa"/>
+        <a:font script="Orya" typeface="Kalinga"/>
+        <a:font script="Mlym" typeface="Kartika"/>
+        <a:font script="Laoo" typeface="DokChampa"/>
+        <a:font script="Sinh" typeface="Iskoola Pota"/>
+        <a:font script="Mong" typeface="Mongolian Baiti"/>
+        <a:font script="Viet" typeface="Tahoma"/>
+        <a:font script="Uigh" typeface="Microsoft Uighur"/>
+        <a:font script="Geor" typeface="Sylfaen"/>
       </a:minorFont>
     </a:fontScheme>
-    <a:fmtScheme name="Office">
+    <a:fmtScheme name="Crop">
       <a:fillStyleLst>
         <a:solidFill>
           <a:schemeClr val="phClr"/>
@@ -4373,23 +4885,23 @@
           <a:gsLst>
             <a:gs pos="0">
               <a:schemeClr val="phClr">
+                <a:tint val="67000"/>
+                <a:satMod val="105000"/>
                 <a:lumMod val="110000"/>
-                <a:satMod val="105000"/>
-                <a:tint val="67000"/>
               </a:schemeClr>
             </a:gs>
             <a:gs pos="50000">
               <a:schemeClr val="phClr">
+                <a:tint val="73000"/>
+                <a:satMod val="103000"/>
                 <a:lumMod val="105000"/>
-                <a:satMod val="103000"/>
-                <a:tint val="73000"/>
               </a:schemeClr>
             </a:gs>
             <a:gs pos="100000">
               <a:schemeClr val="phClr">
+                <a:tint val="81000"/>
+                <a:satMod val="109000"/>
                 <a:lumMod val="105000"/>
-                <a:satMod val="109000"/>
-                <a:tint val="81000"/>
               </a:schemeClr>
             </a:gs>
           </a:gsLst>
@@ -4399,23 +4911,23 @@
           <a:gsLst>
             <a:gs pos="0">
               <a:schemeClr val="phClr">
+                <a:tint val="94000"/>
                 <a:satMod val="103000"/>
                 <a:lumMod val="102000"/>
-                <a:tint val="94000"/>
               </a:schemeClr>
             </a:gs>
             <a:gs pos="50000">
               <a:schemeClr val="phClr">
+                <a:shade val="100000"/>
                 <a:satMod val="110000"/>
                 <a:lumMod val="100000"/>
-                <a:shade val="100000"/>
               </a:schemeClr>
             </a:gs>
             <a:gs pos="100000">
               <a:schemeClr val="phClr">
+                <a:shade val="78000"/>
+                <a:satMod val="120000"/>
                 <a:lumMod val="99000"/>
-                <a:satMod val="120000"/>
-                <a:shade val="78000"/>
               </a:schemeClr>
             </a:gs>
           </a:gsLst>
@@ -4423,26 +4935,23 @@
         </a:gradFill>
       </a:fillStyleLst>
       <a:lnStyleLst>
-        <a:ln w="6350" cap="flat" cmpd="sng" algn="ctr">
+        <a:ln w="6350" cap="flat" cmpd="sng" algn="in">
           <a:solidFill>
             <a:schemeClr val="phClr"/>
           </a:solidFill>
           <a:prstDash val="solid"/>
-          <a:miter lim="800000"/>
         </a:ln>
-        <a:ln w="12700" cap="flat" cmpd="sng" algn="ctr">
+        <a:ln w="34925" cap="flat" cmpd="sng" algn="in">
           <a:solidFill>
             <a:schemeClr val="phClr"/>
           </a:solidFill>
           <a:prstDash val="solid"/>
-          <a:miter lim="800000"/>
         </a:ln>
-        <a:ln w="19050" cap="flat" cmpd="sng" algn="ctr">
+        <a:ln w="19050" cap="flat" cmpd="sng" algn="in">
           <a:solidFill>
             <a:schemeClr val="phClr"/>
           </a:solidFill>
           <a:prstDash val="solid"/>
-          <a:miter lim="800000"/>
         </a:ln>
       </a:lnStyleLst>
       <a:effectStyleLst>
@@ -4456,7 +4965,7 @@
           <a:effectLst>
             <a:outerShdw blurRad="57150" dist="19050" dir="5400000" algn="ctr" rotWithShape="0">
               <a:srgbClr val="000000">
-                <a:alpha val="63000"/>
+                <a:alpha val="35000"/>
               </a:srgbClr>
             </a:outerShdw>
           </a:effectLst>
@@ -4477,16 +4986,16 @@
             <a:gs pos="0">
               <a:schemeClr val="phClr">
                 <a:tint val="93000"/>
+                <a:shade val="98000"/>
                 <a:satMod val="150000"/>
-                <a:shade val="98000"/>
                 <a:lumMod val="102000"/>
               </a:schemeClr>
             </a:gs>
             <a:gs pos="50000">
               <a:schemeClr val="phClr">
                 <a:tint val="98000"/>
+                <a:shade val="90000"/>
                 <a:satMod val="130000"/>
-                <a:shade val="90000"/>
                 <a:lumMod val="103000"/>
               </a:schemeClr>
             </a:gs>
@@ -4506,7 +5015,7 @@
   <a:extraClrSchemeLst/>
   <a:extLst>
     <a:ext uri="{05A4C25C-085E-4340-85A3-A5531E510DB2}">
-      <thm15:themeFamily xmlns:thm15="http://schemas.microsoft.com/office/thememl/2012/main" name="Office Theme" id="{62F939B6-93AF-4DB8-9C6B-D6C7DFDC589F}" vid="{4A3C46E8-61CC-4603-A589-7422A47A8E4A}"/>
+      <thm15:themeFamily xmlns:thm15="http://schemas.microsoft.com/office/thememl/2012/main" name="Crop" id="{EC9488ED-E761-4D60-9AC4-764D1FE2C171}" vid="{CE19780C-D67D-4C13-9DE9-A52BC3BA51B4}"/>
     </a:ext>
   </a:extLst>
 </a:theme>

</xml_diff>

<commit_message>
corrected open survey logged in user
</commit_message>
<xml_diff>
--- a/cmpe275-Ppt.pptx
+++ b/cmpe275-Ppt.pptx
@@ -287,7 +287,7 @@
           <a:p>
             <a:fld id="{D858EF06-04DE-9048-AB9F-32A682F238EA}" type="datetimeFigureOut">
               <a:rPr lang="en-US" smtClean="0"/>
-              <a:t>5/8/18</a:t>
+              <a:t>5/9/18</a:t>
             </a:fld>
             <a:endParaRPr lang="en-US"/>
           </a:p>
@@ -617,7 +617,7 @@
           <a:p>
             <a:fld id="{D858EF06-04DE-9048-AB9F-32A682F238EA}" type="datetimeFigureOut">
               <a:rPr lang="en-US" smtClean="0"/>
-              <a:t>5/8/18</a:t>
+              <a:t>5/9/18</a:t>
             </a:fld>
             <a:endParaRPr lang="en-US"/>
           </a:p>
@@ -797,7 +797,7 @@
           <a:p>
             <a:fld id="{D858EF06-04DE-9048-AB9F-32A682F238EA}" type="datetimeFigureOut">
               <a:rPr lang="en-US" smtClean="0"/>
-              <a:t>5/8/18</a:t>
+              <a:t>5/9/18</a:t>
             </a:fld>
             <a:endParaRPr lang="en-US"/>
           </a:p>
@@ -967,7 +967,7 @@
           <a:p>
             <a:fld id="{D858EF06-04DE-9048-AB9F-32A682F238EA}" type="datetimeFigureOut">
               <a:rPr lang="en-US" smtClean="0"/>
-              <a:t>5/8/18</a:t>
+              <a:t>5/9/18</a:t>
             </a:fld>
             <a:endParaRPr lang="en-US"/>
           </a:p>
@@ -1244,7 +1244,7 @@
           <a:p>
             <a:fld id="{D858EF06-04DE-9048-AB9F-32A682F238EA}" type="datetimeFigureOut">
               <a:rPr lang="en-US" smtClean="0"/>
-              <a:t>5/8/18</a:t>
+              <a:t>5/9/18</a:t>
             </a:fld>
             <a:endParaRPr lang="en-US"/>
           </a:p>
@@ -1638,7 +1638,7 @@
           <a:p>
             <a:fld id="{D858EF06-04DE-9048-AB9F-32A682F238EA}" type="datetimeFigureOut">
               <a:rPr lang="en-US" smtClean="0"/>
-              <a:t>5/8/18</a:t>
+              <a:t>5/9/18</a:t>
             </a:fld>
             <a:endParaRPr lang="en-US"/>
           </a:p>
@@ -2120,7 +2120,7 @@
           <a:p>
             <a:fld id="{D858EF06-04DE-9048-AB9F-32A682F238EA}" type="datetimeFigureOut">
               <a:rPr lang="en-US" smtClean="0"/>
-              <a:t>5/8/18</a:t>
+              <a:t>5/9/18</a:t>
             </a:fld>
             <a:endParaRPr lang="en-US"/>
           </a:p>
@@ -2243,7 +2243,7 @@
           <a:p>
             <a:fld id="{D858EF06-04DE-9048-AB9F-32A682F238EA}" type="datetimeFigureOut">
               <a:rPr lang="en-US" smtClean="0"/>
-              <a:t>5/8/18</a:t>
+              <a:t>5/9/18</a:t>
             </a:fld>
             <a:endParaRPr lang="en-US"/>
           </a:p>
@@ -2338,7 +2338,7 @@
           <a:p>
             <a:fld id="{D858EF06-04DE-9048-AB9F-32A682F238EA}" type="datetimeFigureOut">
               <a:rPr lang="en-US" smtClean="0"/>
-              <a:t>5/8/18</a:t>
+              <a:t>5/9/18</a:t>
             </a:fld>
             <a:endParaRPr lang="en-US"/>
           </a:p>
@@ -2684,7 +2684,7 @@
           <a:p>
             <a:fld id="{D858EF06-04DE-9048-AB9F-32A682F238EA}" type="datetimeFigureOut">
               <a:rPr lang="en-US" smtClean="0"/>
-              <a:t>5/8/18</a:t>
+              <a:t>5/9/18</a:t>
             </a:fld>
             <a:endParaRPr lang="en-US"/>
           </a:p>
@@ -3077,7 +3077,7 @@
           <a:p>
             <a:fld id="{D858EF06-04DE-9048-AB9F-32A682F238EA}" type="datetimeFigureOut">
               <a:rPr lang="en-US" smtClean="0"/>
-              <a:t>5/8/18</a:t>
+              <a:t>5/9/18</a:t>
             </a:fld>
             <a:endParaRPr lang="en-US"/>
           </a:p>
@@ -3355,7 +3355,7 @@
           <a:p>
             <a:fld id="{D858EF06-04DE-9048-AB9F-32A682F238EA}" type="datetimeFigureOut">
               <a:rPr lang="en-US" smtClean="0"/>
-              <a:t>5/8/18</a:t>
+              <a:t>5/9/18</a:t>
             </a:fld>
             <a:endParaRPr lang="en-US"/>
           </a:p>
@@ -4264,16 +4264,15 @@
             <p:ph idx="1"/>
           </p:nvPr>
         </p:nvPicPr>
-        <p:blipFill>
+        <p:blipFill rotWithShape="1">
           <a:blip r:embed="rId2"/>
-          <a:stretch>
-            <a:fillRect/>
-          </a:stretch>
+          <a:srcRect b="6973"/>
+          <a:stretch/>
         </p:blipFill>
         <p:spPr>
           <a:xfrm>
-            <a:off x="1041398" y="2323944"/>
-            <a:ext cx="10774719" cy="3006339"/>
+            <a:off x="1041398" y="2323945"/>
+            <a:ext cx="10774719" cy="2796696"/>
           </a:xfrm>
         </p:spPr>
       </p:pic>

</xml_diff>